<commit_message>
add new architecture images and update documentation
</commit_message>
<xml_diff>
--- a/azureaiagent-with-semantickernel/images/figures.pptx
+++ b/azureaiagent-with-semantickernel/images/figures.pptx
@@ -6,6 +6,10 @@
   </p:sldMasterIdLst>
   <p:sldIdLst>
     <p:sldId id="256" r:id="rId2"/>
+    <p:sldId id="257" r:id="rId3"/>
+    <p:sldId id="258" r:id="rId4"/>
+    <p:sldId id="259" r:id="rId5"/>
+    <p:sldId id="260" r:id="rId6"/>
   </p:sldIdLst>
   <p:sldSz cx="12192000" cy="6858000"/>
   <p:notesSz cx="6858000" cy="9144000"/>
@@ -104,6 +108,11 @@
       </a:defRPr>
     </a:lvl9pPr>
   </p:defaultTextStyle>
+  <p:extLst>
+    <p:ext uri="{EFAFB233-063F-42B5-8137-9DF3F51BA10A}">
+      <p15:sldGuideLst xmlns:p15="http://schemas.microsoft.com/office/powerpoint/2012/main"/>
+    </p:ext>
+  </p:extLst>
 </p:presentation>
 </file>
 
@@ -254,7 +263,7 @@
           <a:p>
             <a:fld id="{6EEB1EBD-88AC-4466-A821-C2BE9B33574F}" type="datetimeFigureOut">
               <a:rPr kumimoji="1" lang="ja-JP" altLang="en-US" smtClean="0"/>
-              <a:t>2025/2/14</a:t>
+              <a:t>2025/2/21</a:t>
             </a:fld>
             <a:endParaRPr kumimoji="1" lang="ja-JP" altLang="en-US"/>
           </a:p>
@@ -484,7 +493,7 @@
           <a:p>
             <a:fld id="{6EEB1EBD-88AC-4466-A821-C2BE9B33574F}" type="datetimeFigureOut">
               <a:rPr kumimoji="1" lang="ja-JP" altLang="en-US" smtClean="0"/>
-              <a:t>2025/2/14</a:t>
+              <a:t>2025/2/21</a:t>
             </a:fld>
             <a:endParaRPr kumimoji="1" lang="ja-JP" altLang="en-US"/>
           </a:p>
@@ -724,7 +733,7 @@
           <a:p>
             <a:fld id="{6EEB1EBD-88AC-4466-A821-C2BE9B33574F}" type="datetimeFigureOut">
               <a:rPr kumimoji="1" lang="ja-JP" altLang="en-US" smtClean="0"/>
-              <a:t>2025/2/14</a:t>
+              <a:t>2025/2/21</a:t>
             </a:fld>
             <a:endParaRPr kumimoji="1" lang="ja-JP" altLang="en-US"/>
           </a:p>
@@ -954,7 +963,7 @@
           <a:p>
             <a:fld id="{6EEB1EBD-88AC-4466-A821-C2BE9B33574F}" type="datetimeFigureOut">
               <a:rPr kumimoji="1" lang="ja-JP" altLang="en-US" smtClean="0"/>
-              <a:t>2025/2/14</a:t>
+              <a:t>2025/2/21</a:t>
             </a:fld>
             <a:endParaRPr kumimoji="1" lang="ja-JP" altLang="en-US"/>
           </a:p>
@@ -1229,7 +1238,7 @@
           <a:p>
             <a:fld id="{6EEB1EBD-88AC-4466-A821-C2BE9B33574F}" type="datetimeFigureOut">
               <a:rPr kumimoji="1" lang="ja-JP" altLang="en-US" smtClean="0"/>
-              <a:t>2025/2/14</a:t>
+              <a:t>2025/2/21</a:t>
             </a:fld>
             <a:endParaRPr kumimoji="1" lang="ja-JP" altLang="en-US"/>
           </a:p>
@@ -1558,7 +1567,7 @@
           <a:p>
             <a:fld id="{6EEB1EBD-88AC-4466-A821-C2BE9B33574F}" type="datetimeFigureOut">
               <a:rPr kumimoji="1" lang="ja-JP" altLang="en-US" smtClean="0"/>
-              <a:t>2025/2/14</a:t>
+              <a:t>2025/2/21</a:t>
             </a:fld>
             <a:endParaRPr kumimoji="1" lang="ja-JP" altLang="en-US"/>
           </a:p>
@@ -2034,7 +2043,7 @@
           <a:p>
             <a:fld id="{6EEB1EBD-88AC-4466-A821-C2BE9B33574F}" type="datetimeFigureOut">
               <a:rPr kumimoji="1" lang="ja-JP" altLang="en-US" smtClean="0"/>
-              <a:t>2025/2/14</a:t>
+              <a:t>2025/2/21</a:t>
             </a:fld>
             <a:endParaRPr kumimoji="1" lang="ja-JP" altLang="en-US"/>
           </a:p>
@@ -2175,7 +2184,7 @@
           <a:p>
             <a:fld id="{6EEB1EBD-88AC-4466-A821-C2BE9B33574F}" type="datetimeFigureOut">
               <a:rPr kumimoji="1" lang="ja-JP" altLang="en-US" smtClean="0"/>
-              <a:t>2025/2/14</a:t>
+              <a:t>2025/2/21</a:t>
             </a:fld>
             <a:endParaRPr kumimoji="1" lang="ja-JP" altLang="en-US"/>
           </a:p>
@@ -2288,7 +2297,7 @@
           <a:p>
             <a:fld id="{6EEB1EBD-88AC-4466-A821-C2BE9B33574F}" type="datetimeFigureOut">
               <a:rPr kumimoji="1" lang="ja-JP" altLang="en-US" smtClean="0"/>
-              <a:t>2025/2/14</a:t>
+              <a:t>2025/2/21</a:t>
             </a:fld>
             <a:endParaRPr kumimoji="1" lang="ja-JP" altLang="en-US"/>
           </a:p>
@@ -2631,7 +2640,7 @@
           <a:p>
             <a:fld id="{6EEB1EBD-88AC-4466-A821-C2BE9B33574F}" type="datetimeFigureOut">
               <a:rPr kumimoji="1" lang="ja-JP" altLang="en-US" smtClean="0"/>
-              <a:t>2025/2/14</a:t>
+              <a:t>2025/2/21</a:t>
             </a:fld>
             <a:endParaRPr kumimoji="1" lang="ja-JP" altLang="en-US"/>
           </a:p>
@@ -2919,7 +2928,7 @@
           <a:p>
             <a:fld id="{6EEB1EBD-88AC-4466-A821-C2BE9B33574F}" type="datetimeFigureOut">
               <a:rPr kumimoji="1" lang="ja-JP" altLang="en-US" smtClean="0"/>
-              <a:t>2025/2/14</a:t>
+              <a:t>2025/2/21</a:t>
             </a:fld>
             <a:endParaRPr kumimoji="1" lang="ja-JP" altLang="en-US"/>
           </a:p>
@@ -3192,7 +3201,7 @@
           <a:p>
             <a:fld id="{6EEB1EBD-88AC-4466-A821-C2BE9B33574F}" type="datetimeFigureOut">
               <a:rPr kumimoji="1" lang="ja-JP" altLang="en-US" smtClean="0"/>
-              <a:t>2025/2/14</a:t>
+              <a:t>2025/2/21</a:t>
             </a:fld>
             <a:endParaRPr kumimoji="1" lang="ja-JP" altLang="en-US"/>
           </a:p>
@@ -4766,6 +4775,3928 @@
     <p:extLst>
       <p:ext uri="{BB962C8B-B14F-4D97-AF65-F5344CB8AC3E}">
         <p14:creationId xmlns:p14="http://schemas.microsoft.com/office/powerpoint/2010/main" val="2587521437"/>
+      </p:ext>
+    </p:extLst>
+  </p:cSld>
+  <p:clrMapOvr>
+    <a:masterClrMapping/>
+  </p:clrMapOvr>
+</p:sld>
+</file>
+
+<file path=ppt/slides/slide2.xml><?xml version="1.0" encoding="utf-8"?>
+<p:sld xmlns:a="http://schemas.openxmlformats.org/drawingml/2006/main" xmlns:r="http://schemas.openxmlformats.org/officeDocument/2006/relationships" xmlns:p="http://schemas.openxmlformats.org/presentationml/2006/main">
+  <p:cSld>
+    <p:spTree>
+      <p:nvGrpSpPr>
+        <p:cNvPr id="1" name=""/>
+        <p:cNvGrpSpPr/>
+        <p:nvPr/>
+      </p:nvGrpSpPr>
+      <p:grpSpPr>
+        <a:xfrm>
+          <a:off x="0" y="0"/>
+          <a:ext cx="0" cy="0"/>
+          <a:chOff x="0" y="0"/>
+          <a:chExt cx="0" cy="0"/>
+        </a:xfrm>
+      </p:grpSpPr>
+      <p:sp>
+        <p:nvSpPr>
+          <p:cNvPr id="2" name="正方形/長方形 1">
+            <a:extLst>
+              <a:ext uri="{FF2B5EF4-FFF2-40B4-BE49-F238E27FC236}">
+                <a16:creationId xmlns:a16="http://schemas.microsoft.com/office/drawing/2014/main" id="{38E30D1A-BE6E-F78C-C418-E7B454C0BA57}"/>
+              </a:ext>
+            </a:extLst>
+          </p:cNvPr>
+          <p:cNvSpPr/>
+          <p:nvPr/>
+        </p:nvSpPr>
+        <p:spPr>
+          <a:xfrm>
+            <a:off x="320954" y="397292"/>
+            <a:ext cx="9705917" cy="2364827"/>
+          </a:xfrm>
+          <a:prstGeom prst="rect">
+            <a:avLst/>
+          </a:prstGeom>
+          <a:solidFill>
+            <a:schemeClr val="bg1"/>
+          </a:solidFill>
+          <a:ln>
+            <a:noFill/>
+          </a:ln>
+          <a:effectLst>
+            <a:outerShdw blurRad="50800" dist="38100" dir="2700000" algn="tl" rotWithShape="0">
+              <a:prstClr val="black">
+                <a:alpha val="40000"/>
+              </a:prstClr>
+            </a:outerShdw>
+          </a:effectLst>
+        </p:spPr>
+        <p:style>
+          <a:lnRef idx="2">
+            <a:schemeClr val="accent1">
+              <a:shade val="15000"/>
+            </a:schemeClr>
+          </a:lnRef>
+          <a:fillRef idx="1">
+            <a:schemeClr val="accent1"/>
+          </a:fillRef>
+          <a:effectRef idx="0">
+            <a:schemeClr val="accent1"/>
+          </a:effectRef>
+          <a:fontRef idx="minor">
+            <a:schemeClr val="lt1"/>
+          </a:fontRef>
+        </p:style>
+        <p:txBody>
+          <a:bodyPr rtlCol="0" anchor="ctr"/>
+          <a:lstStyle/>
+          <a:p>
+            <a:pPr algn="ctr"/>
+            <a:endParaRPr kumimoji="1" lang="ja-JP" altLang="en-US"/>
+          </a:p>
+        </p:txBody>
+      </p:sp>
+      <p:pic>
+        <p:nvPicPr>
+          <p:cNvPr id="3" name="図 2" descr="建物, 橋, ミラー が含まれている画像&#10;&#10;自動的に生成された説明">
+            <a:extLst>
+              <a:ext uri="{FF2B5EF4-FFF2-40B4-BE49-F238E27FC236}">
+                <a16:creationId xmlns:a16="http://schemas.microsoft.com/office/drawing/2014/main" id="{59198F40-83DB-A38D-A1E2-C1FD3C9A0E01}"/>
+              </a:ext>
+            </a:extLst>
+          </p:cNvPr>
+          <p:cNvPicPr>
+            <a:picLocks noChangeAspect="1"/>
+          </p:cNvPicPr>
+          <p:nvPr/>
+        </p:nvPicPr>
+        <p:blipFill>
+          <a:blip r:embed="rId2"/>
+          <a:stretch>
+            <a:fillRect/>
+          </a:stretch>
+        </p:blipFill>
+        <p:spPr>
+          <a:xfrm>
+            <a:off x="540027" y="1531162"/>
+            <a:ext cx="490606" cy="490606"/>
+          </a:xfrm>
+          <a:prstGeom prst="rect">
+            <a:avLst/>
+          </a:prstGeom>
+        </p:spPr>
+      </p:pic>
+      <p:sp>
+        <p:nvSpPr>
+          <p:cNvPr id="4" name="四角形: 角を丸くする 3">
+            <a:extLst>
+              <a:ext uri="{FF2B5EF4-FFF2-40B4-BE49-F238E27FC236}">
+                <a16:creationId xmlns:a16="http://schemas.microsoft.com/office/drawing/2014/main" id="{975D27DA-2997-F60B-C8FF-14CBA8606244}"/>
+              </a:ext>
+            </a:extLst>
+          </p:cNvPr>
+          <p:cNvSpPr/>
+          <p:nvPr/>
+        </p:nvSpPr>
+        <p:spPr>
+          <a:xfrm>
+            <a:off x="1490322" y="699989"/>
+            <a:ext cx="2828931" cy="1633308"/>
+          </a:xfrm>
+          <a:prstGeom prst="roundRect">
+            <a:avLst>
+              <a:gd name="adj" fmla="val 11262"/>
+            </a:avLst>
+          </a:prstGeom>
+          <a:noFill/>
+          <a:ln>
+            <a:solidFill>
+              <a:schemeClr val="accent1"/>
+            </a:solidFill>
+          </a:ln>
+        </p:spPr>
+        <p:style>
+          <a:lnRef idx="2">
+            <a:schemeClr val="accent6"/>
+          </a:lnRef>
+          <a:fillRef idx="1">
+            <a:schemeClr val="lt1"/>
+          </a:fillRef>
+          <a:effectRef idx="0">
+            <a:schemeClr val="accent6"/>
+          </a:effectRef>
+          <a:fontRef idx="minor">
+            <a:schemeClr val="dk1"/>
+          </a:fontRef>
+        </p:style>
+        <p:txBody>
+          <a:bodyPr rtlCol="0" anchor="t"/>
+          <a:lstStyle/>
+          <a:p>
+            <a:r>
+              <a:rPr lang="en-US" altLang="ja-JP" sz="1400" dirty="0"/>
+              <a:t>App</a:t>
+            </a:r>
+            <a:endParaRPr lang="ja-JP" altLang="en-US" sz="1400" dirty="0"/>
+          </a:p>
+        </p:txBody>
+      </p:sp>
+      <p:sp>
+        <p:nvSpPr>
+          <p:cNvPr id="6" name="四角形: メモ 5">
+            <a:extLst>
+              <a:ext uri="{FF2B5EF4-FFF2-40B4-BE49-F238E27FC236}">
+                <a16:creationId xmlns:a16="http://schemas.microsoft.com/office/drawing/2014/main" id="{1B6FEF35-D758-ECF8-88E3-CE995FD3F0FC}"/>
+              </a:ext>
+            </a:extLst>
+          </p:cNvPr>
+          <p:cNvSpPr/>
+          <p:nvPr/>
+        </p:nvSpPr>
+        <p:spPr>
+          <a:xfrm>
+            <a:off x="6217921" y="1080149"/>
+            <a:ext cx="755703" cy="755703"/>
+          </a:xfrm>
+          <a:prstGeom prst="foldedCorner">
+            <a:avLst/>
+          </a:prstGeom>
+          <a:ln>
+            <a:headEnd type="none" w="med" len="med"/>
+            <a:tailEnd type="none" w="med" len="med"/>
+          </a:ln>
+        </p:spPr>
+        <p:style>
+          <a:lnRef idx="1">
+            <a:schemeClr val="accent1"/>
+          </a:lnRef>
+          <a:fillRef idx="2">
+            <a:schemeClr val="accent1"/>
+          </a:fillRef>
+          <a:effectRef idx="1">
+            <a:schemeClr val="accent1"/>
+          </a:effectRef>
+          <a:fontRef idx="minor">
+            <a:schemeClr val="dk1"/>
+          </a:fontRef>
+        </p:style>
+        <p:txBody>
+          <a:bodyPr wrap="none" rtlCol="0" anchor="ctr"/>
+          <a:lstStyle/>
+          <a:p>
+            <a:pPr algn="ctr"/>
+            <a:r>
+              <a:rPr kumimoji="1" lang="en-US" altLang="ja-JP" sz="1200" dirty="0">
+                <a:solidFill>
+                  <a:schemeClr val="dk1"/>
+                </a:solidFill>
+              </a:rPr>
+              <a:t>Instruct</a:t>
+            </a:r>
+          </a:p>
+        </p:txBody>
+      </p:sp>
+      <p:sp>
+        <p:nvSpPr>
+          <p:cNvPr id="7" name="四角形: 角を丸くする 6">
+            <a:extLst>
+              <a:ext uri="{FF2B5EF4-FFF2-40B4-BE49-F238E27FC236}">
+                <a16:creationId xmlns:a16="http://schemas.microsoft.com/office/drawing/2014/main" id="{CB0298F3-E1EE-6F87-9605-26F839723B59}"/>
+              </a:ext>
+            </a:extLst>
+          </p:cNvPr>
+          <p:cNvSpPr/>
+          <p:nvPr/>
+        </p:nvSpPr>
+        <p:spPr>
+          <a:xfrm>
+            <a:off x="5758232" y="706295"/>
+            <a:ext cx="3997303" cy="1633308"/>
+          </a:xfrm>
+          <a:prstGeom prst="roundRect">
+            <a:avLst>
+              <a:gd name="adj" fmla="val 7301"/>
+            </a:avLst>
+          </a:prstGeom>
+          <a:noFill/>
+          <a:ln>
+            <a:solidFill>
+              <a:schemeClr val="accent1"/>
+            </a:solidFill>
+          </a:ln>
+        </p:spPr>
+        <p:style>
+          <a:lnRef idx="2">
+            <a:schemeClr val="accent6"/>
+          </a:lnRef>
+          <a:fillRef idx="1">
+            <a:schemeClr val="lt1"/>
+          </a:fillRef>
+          <a:effectRef idx="0">
+            <a:schemeClr val="accent6"/>
+          </a:effectRef>
+          <a:fontRef idx="minor">
+            <a:schemeClr val="dk1"/>
+          </a:fontRef>
+        </p:style>
+        <p:txBody>
+          <a:bodyPr rtlCol="0" anchor="t"/>
+          <a:lstStyle/>
+          <a:p>
+            <a:r>
+              <a:rPr lang="ja-JP" altLang="en-US" sz="1400" dirty="0"/>
+              <a:t>お天気エージェント</a:t>
+            </a:r>
+            <a:endParaRPr kumimoji="1" lang="ja-JP" altLang="en-US" sz="1400" dirty="0"/>
+          </a:p>
+        </p:txBody>
+      </p:sp>
+      <p:pic>
+        <p:nvPicPr>
+          <p:cNvPr id="1026" name="Picture 2" descr="Bingの評判を全7件のユーザーレビュー・口コミで紹介">
+            <a:extLst>
+              <a:ext uri="{FF2B5EF4-FFF2-40B4-BE49-F238E27FC236}">
+                <a16:creationId xmlns:a16="http://schemas.microsoft.com/office/drawing/2014/main" id="{93E9C217-DEF1-A804-B216-29E5C7A57EE4}"/>
+              </a:ext>
+            </a:extLst>
+          </p:cNvPr>
+          <p:cNvPicPr>
+            <a:picLocks noChangeAspect="1" noChangeArrowheads="1"/>
+          </p:cNvPicPr>
+          <p:nvPr/>
+        </p:nvPicPr>
+        <p:blipFill>
+          <a:blip r:embed="rId3">
+            <a:clrChange>
+              <a:clrFrom>
+                <a:srgbClr val="FFFFFF"/>
+              </a:clrFrom>
+              <a:clrTo>
+                <a:srgbClr val="FFFFFF">
+                  <a:alpha val="0"/>
+                </a:srgbClr>
+              </a:clrTo>
+            </a:clrChange>
+            <a:extLst>
+              <a:ext uri="{28A0092B-C50C-407E-A947-70E740481C1C}">
+                <a14:useLocalDpi xmlns:a14="http://schemas.microsoft.com/office/drawing/2010/main" val="0"/>
+              </a:ext>
+            </a:extLst>
+          </a:blip>
+          <a:srcRect/>
+          <a:stretch>
+            <a:fillRect/>
+          </a:stretch>
+        </p:blipFill>
+        <p:spPr bwMode="auto">
+          <a:xfrm>
+            <a:off x="8278088" y="1672449"/>
+            <a:ext cx="1185151" cy="474061"/>
+          </a:xfrm>
+          <a:prstGeom prst="rect">
+            <a:avLst/>
+          </a:prstGeom>
+          <a:noFill/>
+          <a:extLst>
+            <a:ext uri="{909E8E84-426E-40DD-AFC4-6F175D3DCCD1}">
+              <a14:hiddenFill xmlns:a14="http://schemas.microsoft.com/office/drawing/2010/main">
+                <a:solidFill>
+                  <a:srgbClr val="FFFFFF"/>
+                </a:solidFill>
+              </a14:hiddenFill>
+            </a:ext>
+          </a:extLst>
+        </p:spPr>
+      </p:pic>
+      <p:pic>
+        <p:nvPicPr>
+          <p:cNvPr id="8" name="Picture 2" descr="Using Azure Search for vector search with Azure OpenAI and LangChain ·  Clemens Siebler's Blog">
+            <a:extLst>
+              <a:ext uri="{FF2B5EF4-FFF2-40B4-BE49-F238E27FC236}">
+                <a16:creationId xmlns:a16="http://schemas.microsoft.com/office/drawing/2014/main" id="{0DACA03E-A093-F766-1451-A9185F979216}"/>
+              </a:ext>
+            </a:extLst>
+          </p:cNvPr>
+          <p:cNvPicPr>
+            <a:picLocks noChangeAspect="1" noChangeArrowheads="1"/>
+          </p:cNvPicPr>
+          <p:nvPr/>
+        </p:nvPicPr>
+        <p:blipFill rotWithShape="1">
+          <a:blip r:embed="rId4">
+            <a:clrChange>
+              <a:clrFrom>
+                <a:srgbClr val="FFFFFF"/>
+              </a:clrFrom>
+              <a:clrTo>
+                <a:srgbClr val="FFFFFF">
+                  <a:alpha val="0"/>
+                </a:srgbClr>
+              </a:clrTo>
+            </a:clrChange>
+            <a:extLst>
+              <a:ext uri="{28A0092B-C50C-407E-A947-70E740481C1C}">
+                <a14:useLocalDpi xmlns:a14="http://schemas.microsoft.com/office/drawing/2010/main"/>
+              </a:ext>
+            </a:extLst>
+          </a:blip>
+          <a:srcRect/>
+          <a:stretch/>
+        </p:blipFill>
+        <p:spPr bwMode="auto">
+          <a:xfrm>
+            <a:off x="8144263" y="1033160"/>
+            <a:ext cx="647531" cy="489772"/>
+          </a:xfrm>
+          <a:prstGeom prst="rect">
+            <a:avLst/>
+          </a:prstGeom>
+          <a:noFill/>
+          <a:extLst>
+            <a:ext uri="{909E8E84-426E-40DD-AFC4-6F175D3DCCD1}">
+              <a14:hiddenFill xmlns:a14="http://schemas.microsoft.com/office/drawing/2010/main">
+                <a:solidFill>
+                  <a:srgbClr val="FFFFFF"/>
+                </a:solidFill>
+              </a14:hiddenFill>
+            </a:ext>
+          </a:extLst>
+        </p:spPr>
+      </p:pic>
+      <p:sp>
+        <p:nvSpPr>
+          <p:cNvPr id="9" name="テキスト ボックス 8">
+            <a:extLst>
+              <a:ext uri="{FF2B5EF4-FFF2-40B4-BE49-F238E27FC236}">
+                <a16:creationId xmlns:a16="http://schemas.microsoft.com/office/drawing/2014/main" id="{98507EE8-1D6E-22C5-B133-1F29AEAD88CA}"/>
+              </a:ext>
+            </a:extLst>
+          </p:cNvPr>
+          <p:cNvSpPr txBox="1"/>
+          <p:nvPr/>
+        </p:nvSpPr>
+        <p:spPr>
+          <a:xfrm>
+            <a:off x="8791794" y="1056616"/>
+            <a:ext cx="886781" cy="369332"/>
+          </a:xfrm>
+          <a:prstGeom prst="rect">
+            <a:avLst/>
+          </a:prstGeom>
+          <a:noFill/>
+        </p:spPr>
+        <p:txBody>
+          <a:bodyPr wrap="none" rtlCol="0">
+            <a:spAutoFit/>
+          </a:bodyPr>
+          <a:lstStyle/>
+          <a:p>
+            <a:r>
+              <a:rPr lang="en-US" altLang="ja-JP" dirty="0"/>
+              <a:t>g</a:t>
+            </a:r>
+            <a:r>
+              <a:rPr kumimoji="1" lang="en-US" altLang="ja-JP" dirty="0"/>
+              <a:t>pt-4o</a:t>
+            </a:r>
+            <a:endParaRPr kumimoji="1" lang="ja-JP" altLang="en-US" dirty="0"/>
+          </a:p>
+        </p:txBody>
+      </p:sp>
+      <p:cxnSp>
+        <p:nvCxnSpPr>
+          <p:cNvPr id="10" name="直線矢印コネクタ 9">
+            <a:extLst>
+              <a:ext uri="{FF2B5EF4-FFF2-40B4-BE49-F238E27FC236}">
+                <a16:creationId xmlns:a16="http://schemas.microsoft.com/office/drawing/2014/main" id="{0CCC1D17-2B71-9B3F-3734-12A3AE024A51}"/>
+              </a:ext>
+            </a:extLst>
+          </p:cNvPr>
+          <p:cNvCxnSpPr>
+            <a:cxnSpLocks/>
+          </p:cNvCxnSpPr>
+          <p:nvPr/>
+        </p:nvCxnSpPr>
+        <p:spPr>
+          <a:xfrm flipV="1">
+            <a:off x="7139390" y="1427785"/>
+            <a:ext cx="921326" cy="190294"/>
+          </a:xfrm>
+          <a:prstGeom prst="straightConnector1">
+            <a:avLst/>
+          </a:prstGeom>
+          <a:ln w="28575">
+            <a:solidFill>
+              <a:schemeClr val="accent1"/>
+            </a:solidFill>
+            <a:prstDash val="dash"/>
+            <a:headEnd type="none" w="med" len="med"/>
+            <a:tailEnd type="arrow" w="med" len="med"/>
+          </a:ln>
+        </p:spPr>
+        <p:style>
+          <a:lnRef idx="1">
+            <a:schemeClr val="accent1"/>
+          </a:lnRef>
+          <a:fillRef idx="0">
+            <a:schemeClr val="accent1"/>
+          </a:fillRef>
+          <a:effectRef idx="0">
+            <a:schemeClr val="accent1"/>
+          </a:effectRef>
+          <a:fontRef idx="minor">
+            <a:schemeClr val="tx1"/>
+          </a:fontRef>
+        </p:style>
+      </p:cxnSp>
+      <p:pic>
+        <p:nvPicPr>
+          <p:cNvPr id="5" name="Graphic 54" descr="ソリッドフィル付きロボット">
+            <a:extLst>
+              <a:ext uri="{FF2B5EF4-FFF2-40B4-BE49-F238E27FC236}">
+                <a16:creationId xmlns:a16="http://schemas.microsoft.com/office/drawing/2014/main" id="{853448FB-1C3C-A03F-4AE7-0A85A996CDBA}"/>
+              </a:ext>
+            </a:extLst>
+          </p:cNvPr>
+          <p:cNvPicPr>
+            <a:picLocks noChangeAspect="1"/>
+          </p:cNvPicPr>
+          <p:nvPr/>
+        </p:nvPicPr>
+        <p:blipFill>
+          <a:blip r:embed="rId5">
+            <a:extLst>
+              <a:ext uri="{96DAC541-7B7A-43D3-8B79-37D633B846F1}">
+                <asvg:svgBlip xmlns:asvg="http://schemas.microsoft.com/office/drawing/2016/SVG/main" r:embed="rId6"/>
+              </a:ext>
+            </a:extLst>
+          </a:blip>
+          <a:stretch>
+            <a:fillRect/>
+          </a:stretch>
+        </p:blipFill>
+        <p:spPr>
+          <a:xfrm>
+            <a:off x="5779978" y="1368326"/>
+            <a:ext cx="718873" cy="718873"/>
+          </a:xfrm>
+          <a:prstGeom prst="rect">
+            <a:avLst/>
+          </a:prstGeom>
+        </p:spPr>
+      </p:pic>
+      <p:cxnSp>
+        <p:nvCxnSpPr>
+          <p:cNvPr id="12" name="直線矢印コネクタ 11">
+            <a:extLst>
+              <a:ext uri="{FF2B5EF4-FFF2-40B4-BE49-F238E27FC236}">
+                <a16:creationId xmlns:a16="http://schemas.microsoft.com/office/drawing/2014/main" id="{83688A17-8B22-9DF1-23C3-EF23E1309DE0}"/>
+              </a:ext>
+            </a:extLst>
+          </p:cNvPr>
+          <p:cNvCxnSpPr>
+            <a:cxnSpLocks/>
+          </p:cNvCxnSpPr>
+          <p:nvPr/>
+        </p:nvCxnSpPr>
+        <p:spPr>
+          <a:xfrm>
+            <a:off x="7146962" y="1736850"/>
+            <a:ext cx="921326" cy="190294"/>
+          </a:xfrm>
+          <a:prstGeom prst="straightConnector1">
+            <a:avLst/>
+          </a:prstGeom>
+          <a:ln w="28575">
+            <a:solidFill>
+              <a:schemeClr val="accent1"/>
+            </a:solidFill>
+            <a:prstDash val="dash"/>
+            <a:headEnd type="none" w="med" len="med"/>
+            <a:tailEnd type="arrow" w="med" len="med"/>
+          </a:ln>
+        </p:spPr>
+        <p:style>
+          <a:lnRef idx="1">
+            <a:schemeClr val="accent1"/>
+          </a:lnRef>
+          <a:fillRef idx="0">
+            <a:schemeClr val="accent1"/>
+          </a:fillRef>
+          <a:effectRef idx="0">
+            <a:schemeClr val="accent1"/>
+          </a:effectRef>
+          <a:fontRef idx="minor">
+            <a:schemeClr val="tx1"/>
+          </a:fontRef>
+        </p:style>
+      </p:cxnSp>
+      <p:sp>
+        <p:nvSpPr>
+          <p:cNvPr id="15" name="四角形: 角を丸くする 14">
+            <a:extLst>
+              <a:ext uri="{FF2B5EF4-FFF2-40B4-BE49-F238E27FC236}">
+                <a16:creationId xmlns:a16="http://schemas.microsoft.com/office/drawing/2014/main" id="{27D5FCD9-FFFF-30AF-B30C-F46E168A8B05}"/>
+              </a:ext>
+            </a:extLst>
+          </p:cNvPr>
+          <p:cNvSpPr/>
+          <p:nvPr/>
+        </p:nvSpPr>
+        <p:spPr>
+          <a:xfrm>
+            <a:off x="2927538" y="1451694"/>
+            <a:ext cx="1223404" cy="604237"/>
+          </a:xfrm>
+          <a:prstGeom prst="roundRect">
+            <a:avLst/>
+          </a:prstGeom>
+        </p:spPr>
+        <p:style>
+          <a:lnRef idx="1">
+            <a:schemeClr val="accent1"/>
+          </a:lnRef>
+          <a:fillRef idx="2">
+            <a:schemeClr val="accent1"/>
+          </a:fillRef>
+          <a:effectRef idx="1">
+            <a:schemeClr val="accent1"/>
+          </a:effectRef>
+          <a:fontRef idx="minor">
+            <a:schemeClr val="dk1"/>
+          </a:fontRef>
+        </p:style>
+        <p:txBody>
+          <a:bodyPr rtlCol="0" anchor="ctr"/>
+          <a:lstStyle/>
+          <a:p>
+            <a:pPr algn="ctr"/>
+            <a:r>
+              <a:rPr kumimoji="1" lang="en-US" altLang="ja-JP" sz="1400" dirty="0"/>
+              <a:t>AI Foundry</a:t>
+            </a:r>
+            <a:br>
+              <a:rPr kumimoji="1" lang="en-US" altLang="ja-JP" sz="1400" dirty="0"/>
+            </a:br>
+            <a:r>
+              <a:rPr kumimoji="1" lang="en-US" altLang="ja-JP" sz="1400" dirty="0"/>
+              <a:t>SDK</a:t>
+            </a:r>
+            <a:endParaRPr kumimoji="1" lang="ja-JP" altLang="en-US" sz="1400" dirty="0"/>
+          </a:p>
+        </p:txBody>
+      </p:sp>
+      <p:sp>
+        <p:nvSpPr>
+          <p:cNvPr id="16" name="四角形: メモ 15">
+            <a:extLst>
+              <a:ext uri="{FF2B5EF4-FFF2-40B4-BE49-F238E27FC236}">
+                <a16:creationId xmlns:a16="http://schemas.microsoft.com/office/drawing/2014/main" id="{C57830F8-EECB-37CF-8012-11BA8912D48B}"/>
+              </a:ext>
+            </a:extLst>
+          </p:cNvPr>
+          <p:cNvSpPr/>
+          <p:nvPr/>
+        </p:nvSpPr>
+        <p:spPr>
+          <a:xfrm>
+            <a:off x="1783111" y="1340144"/>
+            <a:ext cx="755703" cy="755703"/>
+          </a:xfrm>
+          <a:prstGeom prst="foldedCorner">
+            <a:avLst/>
+          </a:prstGeom>
+          <a:ln>
+            <a:headEnd type="none" w="med" len="med"/>
+            <a:tailEnd type="none" w="med" len="med"/>
+          </a:ln>
+        </p:spPr>
+        <p:style>
+          <a:lnRef idx="1">
+            <a:schemeClr val="accent1"/>
+          </a:lnRef>
+          <a:fillRef idx="2">
+            <a:schemeClr val="accent1"/>
+          </a:fillRef>
+          <a:effectRef idx="1">
+            <a:schemeClr val="accent1"/>
+          </a:effectRef>
+          <a:fontRef idx="minor">
+            <a:schemeClr val="dk1"/>
+          </a:fontRef>
+        </p:style>
+        <p:txBody>
+          <a:bodyPr wrap="none" rtlCol="0" anchor="ctr"/>
+          <a:lstStyle/>
+          <a:p>
+            <a:pPr algn="ctr"/>
+            <a:r>
+              <a:rPr lang="en-US" altLang="ja-JP" sz="1200" dirty="0"/>
+              <a:t>Code</a:t>
+            </a:r>
+            <a:endParaRPr kumimoji="1" lang="en-US" altLang="ja-JP" sz="1200" dirty="0">
+              <a:solidFill>
+                <a:schemeClr val="dk1"/>
+              </a:solidFill>
+            </a:endParaRPr>
+          </a:p>
+        </p:txBody>
+      </p:sp>
+      <p:cxnSp>
+        <p:nvCxnSpPr>
+          <p:cNvPr id="17" name="直線矢印コネクタ 16">
+            <a:extLst>
+              <a:ext uri="{FF2B5EF4-FFF2-40B4-BE49-F238E27FC236}">
+                <a16:creationId xmlns:a16="http://schemas.microsoft.com/office/drawing/2014/main" id="{10E79FAA-2F8F-12F2-67E1-EE1D033A7088}"/>
+              </a:ext>
+            </a:extLst>
+          </p:cNvPr>
+          <p:cNvCxnSpPr>
+            <a:cxnSpLocks/>
+          </p:cNvCxnSpPr>
+          <p:nvPr/>
+        </p:nvCxnSpPr>
+        <p:spPr>
+          <a:xfrm>
+            <a:off x="4150942" y="1812508"/>
+            <a:ext cx="1764685" cy="0"/>
+          </a:xfrm>
+          <a:prstGeom prst="straightConnector1">
+            <a:avLst/>
+          </a:prstGeom>
+          <a:ln w="28575">
+            <a:solidFill>
+              <a:schemeClr val="accent1"/>
+            </a:solidFill>
+            <a:headEnd type="none" w="med" len="med"/>
+            <a:tailEnd type="arrow" w="med" len="med"/>
+          </a:ln>
+        </p:spPr>
+        <p:style>
+          <a:lnRef idx="1">
+            <a:schemeClr val="accent1"/>
+          </a:lnRef>
+          <a:fillRef idx="0">
+            <a:schemeClr val="accent1"/>
+          </a:fillRef>
+          <a:effectRef idx="0">
+            <a:schemeClr val="accent1"/>
+          </a:effectRef>
+          <a:fontRef idx="minor">
+            <a:schemeClr val="tx1"/>
+          </a:fontRef>
+        </p:style>
+      </p:cxnSp>
+      <p:cxnSp>
+        <p:nvCxnSpPr>
+          <p:cNvPr id="19" name="直線矢印コネクタ 18">
+            <a:extLst>
+              <a:ext uri="{FF2B5EF4-FFF2-40B4-BE49-F238E27FC236}">
+                <a16:creationId xmlns:a16="http://schemas.microsoft.com/office/drawing/2014/main" id="{D490F7ED-6B56-95CB-1AC1-DD9F6D82F3A2}"/>
+              </a:ext>
+            </a:extLst>
+          </p:cNvPr>
+          <p:cNvCxnSpPr>
+            <a:cxnSpLocks/>
+          </p:cNvCxnSpPr>
+          <p:nvPr/>
+        </p:nvCxnSpPr>
+        <p:spPr>
+          <a:xfrm>
+            <a:off x="2473192" y="1792010"/>
+            <a:ext cx="572070" cy="181"/>
+          </a:xfrm>
+          <a:prstGeom prst="straightConnector1">
+            <a:avLst/>
+          </a:prstGeom>
+          <a:ln w="28575">
+            <a:solidFill>
+              <a:schemeClr val="accent1"/>
+            </a:solidFill>
+            <a:prstDash val="dash"/>
+            <a:headEnd type="none" w="med" len="med"/>
+            <a:tailEnd type="arrow" w="med" len="med"/>
+          </a:ln>
+        </p:spPr>
+        <p:style>
+          <a:lnRef idx="1">
+            <a:schemeClr val="accent1"/>
+          </a:lnRef>
+          <a:fillRef idx="0">
+            <a:schemeClr val="accent1"/>
+          </a:fillRef>
+          <a:effectRef idx="0">
+            <a:schemeClr val="accent1"/>
+          </a:effectRef>
+          <a:fontRef idx="minor">
+            <a:schemeClr val="tx1"/>
+          </a:fontRef>
+        </p:style>
+      </p:cxnSp>
+      <p:pic>
+        <p:nvPicPr>
+          <p:cNvPr id="23" name="図 22">
+            <a:extLst>
+              <a:ext uri="{FF2B5EF4-FFF2-40B4-BE49-F238E27FC236}">
+                <a16:creationId xmlns:a16="http://schemas.microsoft.com/office/drawing/2014/main" id="{3303C799-AF8D-7B66-FD50-C28D16E3387B}"/>
+              </a:ext>
+            </a:extLst>
+          </p:cNvPr>
+          <p:cNvPicPr>
+            <a:picLocks noChangeAspect="1"/>
+          </p:cNvPicPr>
+          <p:nvPr/>
+        </p:nvPicPr>
+        <p:blipFill>
+          <a:blip r:embed="rId7">
+            <a:extLst>
+              <a:ext uri="{28A0092B-C50C-407E-A947-70E740481C1C}">
+                <a14:useLocalDpi xmlns:a14="http://schemas.microsoft.com/office/drawing/2010/main" val="0"/>
+              </a:ext>
+            </a:extLst>
+          </a:blip>
+          <a:stretch>
+            <a:fillRect/>
+          </a:stretch>
+        </p:blipFill>
+        <p:spPr>
+          <a:xfrm>
+            <a:off x="4724820" y="1525876"/>
+            <a:ext cx="484499" cy="484499"/>
+          </a:xfrm>
+          <a:prstGeom prst="rect">
+            <a:avLst/>
+          </a:prstGeom>
+        </p:spPr>
+      </p:pic>
+    </p:spTree>
+    <p:extLst>
+      <p:ext uri="{BB962C8B-B14F-4D97-AF65-F5344CB8AC3E}">
+        <p14:creationId xmlns:p14="http://schemas.microsoft.com/office/powerpoint/2010/main" val="2326112487"/>
+      </p:ext>
+    </p:extLst>
+  </p:cSld>
+  <p:clrMapOvr>
+    <a:masterClrMapping/>
+  </p:clrMapOvr>
+</p:sld>
+</file>
+
+<file path=ppt/slides/slide3.xml><?xml version="1.0" encoding="utf-8"?>
+<p:sld xmlns:a="http://schemas.openxmlformats.org/drawingml/2006/main" xmlns:r="http://schemas.openxmlformats.org/officeDocument/2006/relationships" xmlns:p="http://schemas.openxmlformats.org/presentationml/2006/main">
+  <p:cSld>
+    <p:spTree>
+      <p:nvGrpSpPr>
+        <p:cNvPr id="1" name="">
+          <a:extLst>
+            <a:ext uri="{FF2B5EF4-FFF2-40B4-BE49-F238E27FC236}">
+              <a16:creationId xmlns:a16="http://schemas.microsoft.com/office/drawing/2014/main" id="{623E27D9-BF20-30BB-4081-53A8EA325A46}"/>
+            </a:ext>
+          </a:extLst>
+        </p:cNvPr>
+        <p:cNvGrpSpPr/>
+        <p:nvPr/>
+      </p:nvGrpSpPr>
+      <p:grpSpPr>
+        <a:xfrm>
+          <a:off x="0" y="0"/>
+          <a:ext cx="0" cy="0"/>
+          <a:chOff x="0" y="0"/>
+          <a:chExt cx="0" cy="0"/>
+        </a:xfrm>
+      </p:grpSpPr>
+      <p:sp>
+        <p:nvSpPr>
+          <p:cNvPr id="2" name="正方形/長方形 1">
+            <a:extLst>
+              <a:ext uri="{FF2B5EF4-FFF2-40B4-BE49-F238E27FC236}">
+                <a16:creationId xmlns:a16="http://schemas.microsoft.com/office/drawing/2014/main" id="{01F52772-0DEA-DE85-9B0D-F4EAEEE555E7}"/>
+              </a:ext>
+            </a:extLst>
+          </p:cNvPr>
+          <p:cNvSpPr/>
+          <p:nvPr/>
+        </p:nvSpPr>
+        <p:spPr>
+          <a:xfrm>
+            <a:off x="320954" y="397293"/>
+            <a:ext cx="9705917" cy="3695436"/>
+          </a:xfrm>
+          <a:prstGeom prst="rect">
+            <a:avLst/>
+          </a:prstGeom>
+          <a:solidFill>
+            <a:schemeClr val="bg1"/>
+          </a:solidFill>
+          <a:ln>
+            <a:noFill/>
+          </a:ln>
+          <a:effectLst>
+            <a:outerShdw blurRad="50800" dist="38100" dir="2700000" algn="tl" rotWithShape="0">
+              <a:prstClr val="black">
+                <a:alpha val="40000"/>
+              </a:prstClr>
+            </a:outerShdw>
+          </a:effectLst>
+        </p:spPr>
+        <p:style>
+          <a:lnRef idx="2">
+            <a:schemeClr val="accent1">
+              <a:shade val="15000"/>
+            </a:schemeClr>
+          </a:lnRef>
+          <a:fillRef idx="1">
+            <a:schemeClr val="accent1"/>
+          </a:fillRef>
+          <a:effectRef idx="0">
+            <a:schemeClr val="accent1"/>
+          </a:effectRef>
+          <a:fontRef idx="minor">
+            <a:schemeClr val="lt1"/>
+          </a:fontRef>
+        </p:style>
+        <p:txBody>
+          <a:bodyPr rtlCol="0" anchor="ctr"/>
+          <a:lstStyle/>
+          <a:p>
+            <a:pPr algn="ctr"/>
+            <a:endParaRPr kumimoji="1" lang="ja-JP" altLang="en-US"/>
+          </a:p>
+        </p:txBody>
+      </p:sp>
+      <p:pic>
+        <p:nvPicPr>
+          <p:cNvPr id="3" name="図 2" descr="建物, 橋, ミラー が含まれている画像&#10;&#10;自動的に生成された説明">
+            <a:extLst>
+              <a:ext uri="{FF2B5EF4-FFF2-40B4-BE49-F238E27FC236}">
+                <a16:creationId xmlns:a16="http://schemas.microsoft.com/office/drawing/2014/main" id="{5467F223-C974-72FF-71E6-6EC0A0A32B97}"/>
+              </a:ext>
+            </a:extLst>
+          </p:cNvPr>
+          <p:cNvPicPr>
+            <a:picLocks noChangeAspect="1"/>
+          </p:cNvPicPr>
+          <p:nvPr/>
+        </p:nvPicPr>
+        <p:blipFill>
+          <a:blip r:embed="rId2"/>
+          <a:stretch>
+            <a:fillRect/>
+          </a:stretch>
+        </p:blipFill>
+        <p:spPr>
+          <a:xfrm>
+            <a:off x="611560" y="2374241"/>
+            <a:ext cx="490606" cy="490606"/>
+          </a:xfrm>
+          <a:prstGeom prst="rect">
+            <a:avLst/>
+          </a:prstGeom>
+        </p:spPr>
+      </p:pic>
+      <p:sp>
+        <p:nvSpPr>
+          <p:cNvPr id="4" name="四角形: 角を丸くする 3">
+            <a:extLst>
+              <a:ext uri="{FF2B5EF4-FFF2-40B4-BE49-F238E27FC236}">
+                <a16:creationId xmlns:a16="http://schemas.microsoft.com/office/drawing/2014/main" id="{29BA0671-C2A7-E74B-7C4D-AFF15FD3216A}"/>
+              </a:ext>
+            </a:extLst>
+          </p:cNvPr>
+          <p:cNvSpPr/>
+          <p:nvPr/>
+        </p:nvSpPr>
+        <p:spPr>
+          <a:xfrm>
+            <a:off x="1561855" y="1543068"/>
+            <a:ext cx="2828931" cy="1633308"/>
+          </a:xfrm>
+          <a:prstGeom prst="roundRect">
+            <a:avLst>
+              <a:gd name="adj" fmla="val 11262"/>
+            </a:avLst>
+          </a:prstGeom>
+          <a:noFill/>
+          <a:ln>
+            <a:solidFill>
+              <a:schemeClr val="accent1"/>
+            </a:solidFill>
+          </a:ln>
+        </p:spPr>
+        <p:style>
+          <a:lnRef idx="2">
+            <a:schemeClr val="accent6"/>
+          </a:lnRef>
+          <a:fillRef idx="1">
+            <a:schemeClr val="lt1"/>
+          </a:fillRef>
+          <a:effectRef idx="0">
+            <a:schemeClr val="accent6"/>
+          </a:effectRef>
+          <a:fontRef idx="minor">
+            <a:schemeClr val="dk1"/>
+          </a:fontRef>
+        </p:style>
+        <p:txBody>
+          <a:bodyPr rtlCol="0" anchor="t"/>
+          <a:lstStyle/>
+          <a:p>
+            <a:r>
+              <a:rPr lang="en-US" altLang="ja-JP" sz="1400" dirty="0"/>
+              <a:t>App</a:t>
+            </a:r>
+            <a:endParaRPr lang="ja-JP" altLang="en-US" sz="1400" dirty="0"/>
+          </a:p>
+        </p:txBody>
+      </p:sp>
+      <p:sp>
+        <p:nvSpPr>
+          <p:cNvPr id="6" name="四角形: メモ 5">
+            <a:extLst>
+              <a:ext uri="{FF2B5EF4-FFF2-40B4-BE49-F238E27FC236}">
+                <a16:creationId xmlns:a16="http://schemas.microsoft.com/office/drawing/2014/main" id="{E2B70597-C7A2-9C2D-D0B6-5A37ECF26275}"/>
+              </a:ext>
+            </a:extLst>
+          </p:cNvPr>
+          <p:cNvSpPr/>
+          <p:nvPr/>
+        </p:nvSpPr>
+        <p:spPr>
+          <a:xfrm>
+            <a:off x="6217921" y="1080149"/>
+            <a:ext cx="755703" cy="755703"/>
+          </a:xfrm>
+          <a:prstGeom prst="foldedCorner">
+            <a:avLst/>
+          </a:prstGeom>
+          <a:ln>
+            <a:headEnd type="none" w="med" len="med"/>
+            <a:tailEnd type="none" w="med" len="med"/>
+          </a:ln>
+        </p:spPr>
+        <p:style>
+          <a:lnRef idx="1">
+            <a:schemeClr val="accent1"/>
+          </a:lnRef>
+          <a:fillRef idx="2">
+            <a:schemeClr val="accent1"/>
+          </a:fillRef>
+          <a:effectRef idx="1">
+            <a:schemeClr val="accent1"/>
+          </a:effectRef>
+          <a:fontRef idx="minor">
+            <a:schemeClr val="dk1"/>
+          </a:fontRef>
+        </p:style>
+        <p:txBody>
+          <a:bodyPr wrap="none" rtlCol="0" anchor="ctr"/>
+          <a:lstStyle/>
+          <a:p>
+            <a:pPr algn="ctr"/>
+            <a:r>
+              <a:rPr kumimoji="1" lang="en-US" altLang="ja-JP" sz="1200" dirty="0">
+                <a:solidFill>
+                  <a:schemeClr val="dk1"/>
+                </a:solidFill>
+              </a:rPr>
+              <a:t>Instruct</a:t>
+            </a:r>
+          </a:p>
+        </p:txBody>
+      </p:sp>
+      <p:sp>
+        <p:nvSpPr>
+          <p:cNvPr id="7" name="四角形: 角を丸くする 6">
+            <a:extLst>
+              <a:ext uri="{FF2B5EF4-FFF2-40B4-BE49-F238E27FC236}">
+                <a16:creationId xmlns:a16="http://schemas.microsoft.com/office/drawing/2014/main" id="{88F5743B-4A94-4429-0EFE-3A01306BF987}"/>
+              </a:ext>
+            </a:extLst>
+          </p:cNvPr>
+          <p:cNvSpPr/>
+          <p:nvPr/>
+        </p:nvSpPr>
+        <p:spPr>
+          <a:xfrm>
+            <a:off x="5758232" y="706295"/>
+            <a:ext cx="3997303" cy="1633308"/>
+          </a:xfrm>
+          <a:prstGeom prst="roundRect">
+            <a:avLst>
+              <a:gd name="adj" fmla="val 7301"/>
+            </a:avLst>
+          </a:prstGeom>
+          <a:noFill/>
+          <a:ln>
+            <a:solidFill>
+              <a:schemeClr val="accent1"/>
+            </a:solidFill>
+          </a:ln>
+        </p:spPr>
+        <p:style>
+          <a:lnRef idx="2">
+            <a:schemeClr val="accent6"/>
+          </a:lnRef>
+          <a:fillRef idx="1">
+            <a:schemeClr val="lt1"/>
+          </a:fillRef>
+          <a:effectRef idx="0">
+            <a:schemeClr val="accent6"/>
+          </a:effectRef>
+          <a:fontRef idx="minor">
+            <a:schemeClr val="dk1"/>
+          </a:fontRef>
+        </p:style>
+        <p:txBody>
+          <a:bodyPr rtlCol="0" anchor="t"/>
+          <a:lstStyle/>
+          <a:p>
+            <a:r>
+              <a:rPr lang="ja-JP" altLang="en-US" sz="1400" dirty="0"/>
+              <a:t>お天気エージェント</a:t>
+            </a:r>
+            <a:endParaRPr kumimoji="1" lang="ja-JP" altLang="en-US" sz="1400" dirty="0"/>
+          </a:p>
+        </p:txBody>
+      </p:sp>
+      <p:pic>
+        <p:nvPicPr>
+          <p:cNvPr id="1026" name="Picture 2" descr="Bingの評判を全7件のユーザーレビュー・口コミで紹介">
+            <a:extLst>
+              <a:ext uri="{FF2B5EF4-FFF2-40B4-BE49-F238E27FC236}">
+                <a16:creationId xmlns:a16="http://schemas.microsoft.com/office/drawing/2014/main" id="{9B981825-9673-546B-1144-FFF47F5AF109}"/>
+              </a:ext>
+            </a:extLst>
+          </p:cNvPr>
+          <p:cNvPicPr>
+            <a:picLocks noChangeAspect="1" noChangeArrowheads="1"/>
+          </p:cNvPicPr>
+          <p:nvPr/>
+        </p:nvPicPr>
+        <p:blipFill>
+          <a:blip r:embed="rId3">
+            <a:clrChange>
+              <a:clrFrom>
+                <a:srgbClr val="FFFFFF"/>
+              </a:clrFrom>
+              <a:clrTo>
+                <a:srgbClr val="FFFFFF">
+                  <a:alpha val="0"/>
+                </a:srgbClr>
+              </a:clrTo>
+            </a:clrChange>
+            <a:extLst>
+              <a:ext uri="{28A0092B-C50C-407E-A947-70E740481C1C}">
+                <a14:useLocalDpi xmlns:a14="http://schemas.microsoft.com/office/drawing/2010/main" val="0"/>
+              </a:ext>
+            </a:extLst>
+          </a:blip>
+          <a:srcRect/>
+          <a:stretch>
+            <a:fillRect/>
+          </a:stretch>
+        </p:blipFill>
+        <p:spPr bwMode="auto">
+          <a:xfrm>
+            <a:off x="8278088" y="1672449"/>
+            <a:ext cx="1185151" cy="474061"/>
+          </a:xfrm>
+          <a:prstGeom prst="rect">
+            <a:avLst/>
+          </a:prstGeom>
+          <a:noFill/>
+          <a:extLst>
+            <a:ext uri="{909E8E84-426E-40DD-AFC4-6F175D3DCCD1}">
+              <a14:hiddenFill xmlns:a14="http://schemas.microsoft.com/office/drawing/2010/main">
+                <a:solidFill>
+                  <a:srgbClr val="FFFFFF"/>
+                </a:solidFill>
+              </a14:hiddenFill>
+            </a:ext>
+          </a:extLst>
+        </p:spPr>
+      </p:pic>
+      <p:pic>
+        <p:nvPicPr>
+          <p:cNvPr id="8" name="Picture 2" descr="Using Azure Search for vector search with Azure OpenAI and LangChain ·  Clemens Siebler's Blog">
+            <a:extLst>
+              <a:ext uri="{FF2B5EF4-FFF2-40B4-BE49-F238E27FC236}">
+                <a16:creationId xmlns:a16="http://schemas.microsoft.com/office/drawing/2014/main" id="{D3BCEDF0-4D00-F4C7-022B-491B21BF24E7}"/>
+              </a:ext>
+            </a:extLst>
+          </p:cNvPr>
+          <p:cNvPicPr>
+            <a:picLocks noChangeAspect="1" noChangeArrowheads="1"/>
+          </p:cNvPicPr>
+          <p:nvPr/>
+        </p:nvPicPr>
+        <p:blipFill rotWithShape="1">
+          <a:blip r:embed="rId4">
+            <a:clrChange>
+              <a:clrFrom>
+                <a:srgbClr val="FFFFFF"/>
+              </a:clrFrom>
+              <a:clrTo>
+                <a:srgbClr val="FFFFFF">
+                  <a:alpha val="0"/>
+                </a:srgbClr>
+              </a:clrTo>
+            </a:clrChange>
+            <a:extLst>
+              <a:ext uri="{28A0092B-C50C-407E-A947-70E740481C1C}">
+                <a14:useLocalDpi xmlns:a14="http://schemas.microsoft.com/office/drawing/2010/main"/>
+              </a:ext>
+            </a:extLst>
+          </a:blip>
+          <a:srcRect/>
+          <a:stretch/>
+        </p:blipFill>
+        <p:spPr bwMode="auto">
+          <a:xfrm>
+            <a:off x="8144263" y="1033160"/>
+            <a:ext cx="647531" cy="489772"/>
+          </a:xfrm>
+          <a:prstGeom prst="rect">
+            <a:avLst/>
+          </a:prstGeom>
+          <a:noFill/>
+          <a:extLst>
+            <a:ext uri="{909E8E84-426E-40DD-AFC4-6F175D3DCCD1}">
+              <a14:hiddenFill xmlns:a14="http://schemas.microsoft.com/office/drawing/2010/main">
+                <a:solidFill>
+                  <a:srgbClr val="FFFFFF"/>
+                </a:solidFill>
+              </a14:hiddenFill>
+            </a:ext>
+          </a:extLst>
+        </p:spPr>
+      </p:pic>
+      <p:sp>
+        <p:nvSpPr>
+          <p:cNvPr id="9" name="テキスト ボックス 8">
+            <a:extLst>
+              <a:ext uri="{FF2B5EF4-FFF2-40B4-BE49-F238E27FC236}">
+                <a16:creationId xmlns:a16="http://schemas.microsoft.com/office/drawing/2014/main" id="{ED9DFC8B-5860-0F2E-15A7-03A2104849E4}"/>
+              </a:ext>
+            </a:extLst>
+          </p:cNvPr>
+          <p:cNvSpPr txBox="1"/>
+          <p:nvPr/>
+        </p:nvSpPr>
+        <p:spPr>
+          <a:xfrm>
+            <a:off x="8791794" y="1056616"/>
+            <a:ext cx="886781" cy="369332"/>
+          </a:xfrm>
+          <a:prstGeom prst="rect">
+            <a:avLst/>
+          </a:prstGeom>
+          <a:noFill/>
+        </p:spPr>
+        <p:txBody>
+          <a:bodyPr wrap="none" rtlCol="0">
+            <a:spAutoFit/>
+          </a:bodyPr>
+          <a:lstStyle/>
+          <a:p>
+            <a:r>
+              <a:rPr lang="en-US" altLang="ja-JP" dirty="0"/>
+              <a:t>g</a:t>
+            </a:r>
+            <a:r>
+              <a:rPr kumimoji="1" lang="en-US" altLang="ja-JP" dirty="0"/>
+              <a:t>pt-4o</a:t>
+            </a:r>
+            <a:endParaRPr kumimoji="1" lang="ja-JP" altLang="en-US" dirty="0"/>
+          </a:p>
+        </p:txBody>
+      </p:sp>
+      <p:cxnSp>
+        <p:nvCxnSpPr>
+          <p:cNvPr id="10" name="直線矢印コネクタ 9">
+            <a:extLst>
+              <a:ext uri="{FF2B5EF4-FFF2-40B4-BE49-F238E27FC236}">
+                <a16:creationId xmlns:a16="http://schemas.microsoft.com/office/drawing/2014/main" id="{D73FBAAD-ED03-A7EE-E960-23A24A1303E8}"/>
+              </a:ext>
+            </a:extLst>
+          </p:cNvPr>
+          <p:cNvCxnSpPr>
+            <a:cxnSpLocks/>
+          </p:cNvCxnSpPr>
+          <p:nvPr/>
+        </p:nvCxnSpPr>
+        <p:spPr>
+          <a:xfrm flipV="1">
+            <a:off x="7139390" y="1427785"/>
+            <a:ext cx="921326" cy="190294"/>
+          </a:xfrm>
+          <a:prstGeom prst="straightConnector1">
+            <a:avLst/>
+          </a:prstGeom>
+          <a:ln w="28575">
+            <a:solidFill>
+              <a:schemeClr val="accent1"/>
+            </a:solidFill>
+            <a:prstDash val="dash"/>
+            <a:headEnd type="none" w="med" len="med"/>
+            <a:tailEnd type="arrow" w="med" len="med"/>
+          </a:ln>
+        </p:spPr>
+        <p:style>
+          <a:lnRef idx="1">
+            <a:schemeClr val="accent1"/>
+          </a:lnRef>
+          <a:fillRef idx="0">
+            <a:schemeClr val="accent1"/>
+          </a:fillRef>
+          <a:effectRef idx="0">
+            <a:schemeClr val="accent1"/>
+          </a:effectRef>
+          <a:fontRef idx="minor">
+            <a:schemeClr val="tx1"/>
+          </a:fontRef>
+        </p:style>
+      </p:cxnSp>
+      <p:pic>
+        <p:nvPicPr>
+          <p:cNvPr id="5" name="Graphic 54" descr="ソリッドフィル付きロボット">
+            <a:extLst>
+              <a:ext uri="{FF2B5EF4-FFF2-40B4-BE49-F238E27FC236}">
+                <a16:creationId xmlns:a16="http://schemas.microsoft.com/office/drawing/2014/main" id="{86040671-1DFF-AFDD-46E7-3297C1D4AE1A}"/>
+              </a:ext>
+            </a:extLst>
+          </p:cNvPr>
+          <p:cNvPicPr>
+            <a:picLocks noChangeAspect="1"/>
+          </p:cNvPicPr>
+          <p:nvPr/>
+        </p:nvPicPr>
+        <p:blipFill>
+          <a:blip r:embed="rId5">
+            <a:extLst>
+              <a:ext uri="{96DAC541-7B7A-43D3-8B79-37D633B846F1}">
+                <asvg:svgBlip xmlns:asvg="http://schemas.microsoft.com/office/drawing/2016/SVG/main" r:embed="rId6"/>
+              </a:ext>
+            </a:extLst>
+          </a:blip>
+          <a:stretch>
+            <a:fillRect/>
+          </a:stretch>
+        </p:blipFill>
+        <p:spPr>
+          <a:xfrm>
+            <a:off x="5779978" y="1368326"/>
+            <a:ext cx="718873" cy="718873"/>
+          </a:xfrm>
+          <a:prstGeom prst="rect">
+            <a:avLst/>
+          </a:prstGeom>
+        </p:spPr>
+      </p:pic>
+      <p:cxnSp>
+        <p:nvCxnSpPr>
+          <p:cNvPr id="12" name="直線矢印コネクタ 11">
+            <a:extLst>
+              <a:ext uri="{FF2B5EF4-FFF2-40B4-BE49-F238E27FC236}">
+                <a16:creationId xmlns:a16="http://schemas.microsoft.com/office/drawing/2014/main" id="{E734E147-F32F-872B-104F-13BD03559552}"/>
+              </a:ext>
+            </a:extLst>
+          </p:cNvPr>
+          <p:cNvCxnSpPr>
+            <a:cxnSpLocks/>
+          </p:cNvCxnSpPr>
+          <p:nvPr/>
+        </p:nvCxnSpPr>
+        <p:spPr>
+          <a:xfrm>
+            <a:off x="7146962" y="1736850"/>
+            <a:ext cx="921326" cy="190294"/>
+          </a:xfrm>
+          <a:prstGeom prst="straightConnector1">
+            <a:avLst/>
+          </a:prstGeom>
+          <a:ln w="28575">
+            <a:solidFill>
+              <a:schemeClr val="accent1"/>
+            </a:solidFill>
+            <a:prstDash val="dash"/>
+            <a:headEnd type="none" w="med" len="med"/>
+            <a:tailEnd type="arrow" w="med" len="med"/>
+          </a:ln>
+        </p:spPr>
+        <p:style>
+          <a:lnRef idx="1">
+            <a:schemeClr val="accent1"/>
+          </a:lnRef>
+          <a:fillRef idx="0">
+            <a:schemeClr val="accent1"/>
+          </a:fillRef>
+          <a:effectRef idx="0">
+            <a:schemeClr val="accent1"/>
+          </a:effectRef>
+          <a:fontRef idx="minor">
+            <a:schemeClr val="tx1"/>
+          </a:fontRef>
+        </p:style>
+      </p:cxnSp>
+      <p:sp>
+        <p:nvSpPr>
+          <p:cNvPr id="15" name="四角形: 角を丸くする 14">
+            <a:extLst>
+              <a:ext uri="{FF2B5EF4-FFF2-40B4-BE49-F238E27FC236}">
+                <a16:creationId xmlns:a16="http://schemas.microsoft.com/office/drawing/2014/main" id="{E53E5D55-05DA-841E-6330-2C89E5719BBF}"/>
+              </a:ext>
+            </a:extLst>
+          </p:cNvPr>
+          <p:cNvSpPr/>
+          <p:nvPr/>
+        </p:nvSpPr>
+        <p:spPr>
+          <a:xfrm>
+            <a:off x="2999071" y="2294773"/>
+            <a:ext cx="1223404" cy="604237"/>
+          </a:xfrm>
+          <a:prstGeom prst="roundRect">
+            <a:avLst/>
+          </a:prstGeom>
+        </p:spPr>
+        <p:style>
+          <a:lnRef idx="1">
+            <a:schemeClr val="accent1"/>
+          </a:lnRef>
+          <a:fillRef idx="2">
+            <a:schemeClr val="accent1"/>
+          </a:fillRef>
+          <a:effectRef idx="1">
+            <a:schemeClr val="accent1"/>
+          </a:effectRef>
+          <a:fontRef idx="minor">
+            <a:schemeClr val="dk1"/>
+          </a:fontRef>
+        </p:style>
+        <p:txBody>
+          <a:bodyPr rtlCol="0" anchor="ctr"/>
+          <a:lstStyle/>
+          <a:p>
+            <a:pPr algn="ctr"/>
+            <a:r>
+              <a:rPr kumimoji="1" lang="en-US" altLang="ja-JP" sz="1400" dirty="0"/>
+              <a:t>AI Foundry</a:t>
+            </a:r>
+            <a:br>
+              <a:rPr kumimoji="1" lang="en-US" altLang="ja-JP" sz="1400" dirty="0"/>
+            </a:br>
+            <a:r>
+              <a:rPr kumimoji="1" lang="en-US" altLang="ja-JP" sz="1400" dirty="0"/>
+              <a:t>SDK</a:t>
+            </a:r>
+            <a:endParaRPr kumimoji="1" lang="ja-JP" altLang="en-US" sz="1400" dirty="0"/>
+          </a:p>
+        </p:txBody>
+      </p:sp>
+      <p:sp>
+        <p:nvSpPr>
+          <p:cNvPr id="16" name="四角形: メモ 15">
+            <a:extLst>
+              <a:ext uri="{FF2B5EF4-FFF2-40B4-BE49-F238E27FC236}">
+                <a16:creationId xmlns:a16="http://schemas.microsoft.com/office/drawing/2014/main" id="{F2C2B7A4-BFF7-A1DD-9B3A-38D86B4141ED}"/>
+              </a:ext>
+            </a:extLst>
+          </p:cNvPr>
+          <p:cNvSpPr/>
+          <p:nvPr/>
+        </p:nvSpPr>
+        <p:spPr>
+          <a:xfrm>
+            <a:off x="1854644" y="2183223"/>
+            <a:ext cx="755703" cy="755703"/>
+          </a:xfrm>
+          <a:prstGeom prst="foldedCorner">
+            <a:avLst/>
+          </a:prstGeom>
+          <a:ln>
+            <a:headEnd type="none" w="med" len="med"/>
+            <a:tailEnd type="none" w="med" len="med"/>
+          </a:ln>
+        </p:spPr>
+        <p:style>
+          <a:lnRef idx="1">
+            <a:schemeClr val="accent1"/>
+          </a:lnRef>
+          <a:fillRef idx="2">
+            <a:schemeClr val="accent1"/>
+          </a:fillRef>
+          <a:effectRef idx="1">
+            <a:schemeClr val="accent1"/>
+          </a:effectRef>
+          <a:fontRef idx="minor">
+            <a:schemeClr val="dk1"/>
+          </a:fontRef>
+        </p:style>
+        <p:txBody>
+          <a:bodyPr wrap="none" rtlCol="0" anchor="ctr"/>
+          <a:lstStyle/>
+          <a:p>
+            <a:pPr algn="ctr"/>
+            <a:r>
+              <a:rPr lang="en-US" altLang="ja-JP" sz="1200" dirty="0"/>
+              <a:t>Code</a:t>
+            </a:r>
+            <a:endParaRPr kumimoji="1" lang="en-US" altLang="ja-JP" sz="1200" dirty="0">
+              <a:solidFill>
+                <a:schemeClr val="dk1"/>
+              </a:solidFill>
+            </a:endParaRPr>
+          </a:p>
+        </p:txBody>
+      </p:sp>
+      <p:cxnSp>
+        <p:nvCxnSpPr>
+          <p:cNvPr id="17" name="直線矢印コネクタ 16">
+            <a:extLst>
+              <a:ext uri="{FF2B5EF4-FFF2-40B4-BE49-F238E27FC236}">
+                <a16:creationId xmlns:a16="http://schemas.microsoft.com/office/drawing/2014/main" id="{84D3ADB9-748E-5693-F56E-9AF245B5225C}"/>
+              </a:ext>
+            </a:extLst>
+          </p:cNvPr>
+          <p:cNvCxnSpPr>
+            <a:cxnSpLocks/>
+            <a:stCxn id="15" idx="3"/>
+          </p:cNvCxnSpPr>
+          <p:nvPr/>
+        </p:nvCxnSpPr>
+        <p:spPr>
+          <a:xfrm flipV="1">
+            <a:off x="4222475" y="1812508"/>
+            <a:ext cx="1693152" cy="784384"/>
+          </a:xfrm>
+          <a:prstGeom prst="straightConnector1">
+            <a:avLst/>
+          </a:prstGeom>
+          <a:ln w="28575">
+            <a:solidFill>
+              <a:schemeClr val="accent1"/>
+            </a:solidFill>
+            <a:headEnd type="none" w="med" len="med"/>
+            <a:tailEnd type="arrow" w="med" len="med"/>
+          </a:ln>
+        </p:spPr>
+        <p:style>
+          <a:lnRef idx="1">
+            <a:schemeClr val="accent1"/>
+          </a:lnRef>
+          <a:fillRef idx="0">
+            <a:schemeClr val="accent1"/>
+          </a:fillRef>
+          <a:effectRef idx="0">
+            <a:schemeClr val="accent1"/>
+          </a:effectRef>
+          <a:fontRef idx="minor">
+            <a:schemeClr val="tx1"/>
+          </a:fontRef>
+        </p:style>
+      </p:cxnSp>
+      <p:cxnSp>
+        <p:nvCxnSpPr>
+          <p:cNvPr id="19" name="直線矢印コネクタ 18">
+            <a:extLst>
+              <a:ext uri="{FF2B5EF4-FFF2-40B4-BE49-F238E27FC236}">
+                <a16:creationId xmlns:a16="http://schemas.microsoft.com/office/drawing/2014/main" id="{0993F481-0299-77E8-3B41-FE1DBBDAD6E0}"/>
+              </a:ext>
+            </a:extLst>
+          </p:cNvPr>
+          <p:cNvCxnSpPr>
+            <a:cxnSpLocks/>
+          </p:cNvCxnSpPr>
+          <p:nvPr/>
+        </p:nvCxnSpPr>
+        <p:spPr>
+          <a:xfrm>
+            <a:off x="2544725" y="2635089"/>
+            <a:ext cx="572070" cy="181"/>
+          </a:xfrm>
+          <a:prstGeom prst="straightConnector1">
+            <a:avLst/>
+          </a:prstGeom>
+          <a:ln w="28575">
+            <a:solidFill>
+              <a:schemeClr val="accent1"/>
+            </a:solidFill>
+            <a:prstDash val="dash"/>
+            <a:headEnd type="none" w="med" len="med"/>
+            <a:tailEnd type="arrow" w="med" len="med"/>
+          </a:ln>
+        </p:spPr>
+        <p:style>
+          <a:lnRef idx="1">
+            <a:schemeClr val="accent1"/>
+          </a:lnRef>
+          <a:fillRef idx="0">
+            <a:schemeClr val="accent1"/>
+          </a:fillRef>
+          <a:effectRef idx="0">
+            <a:schemeClr val="accent1"/>
+          </a:effectRef>
+          <a:fontRef idx="minor">
+            <a:schemeClr val="tx1"/>
+          </a:fontRef>
+        </p:style>
+      </p:cxnSp>
+      <p:pic>
+        <p:nvPicPr>
+          <p:cNvPr id="23" name="図 22">
+            <a:extLst>
+              <a:ext uri="{FF2B5EF4-FFF2-40B4-BE49-F238E27FC236}">
+                <a16:creationId xmlns:a16="http://schemas.microsoft.com/office/drawing/2014/main" id="{B2C8774C-1079-B143-2D63-3803EFC736DC}"/>
+              </a:ext>
+            </a:extLst>
+          </p:cNvPr>
+          <p:cNvPicPr>
+            <a:picLocks noChangeAspect="1"/>
+          </p:cNvPicPr>
+          <p:nvPr/>
+        </p:nvPicPr>
+        <p:blipFill>
+          <a:blip r:embed="rId7">
+            <a:extLst>
+              <a:ext uri="{28A0092B-C50C-407E-A947-70E740481C1C}">
+                <a14:useLocalDpi xmlns:a14="http://schemas.microsoft.com/office/drawing/2010/main" val="0"/>
+              </a:ext>
+            </a:extLst>
+          </a:blip>
+          <a:stretch>
+            <a:fillRect/>
+          </a:stretch>
+        </p:blipFill>
+        <p:spPr>
+          <a:xfrm>
+            <a:off x="4737605" y="2193802"/>
+            <a:ext cx="644868" cy="644868"/>
+          </a:xfrm>
+          <a:prstGeom prst="rect">
+            <a:avLst/>
+          </a:prstGeom>
+        </p:spPr>
+      </p:pic>
+      <p:sp>
+        <p:nvSpPr>
+          <p:cNvPr id="11" name="四角形: メモ 10">
+            <a:extLst>
+              <a:ext uri="{FF2B5EF4-FFF2-40B4-BE49-F238E27FC236}">
+                <a16:creationId xmlns:a16="http://schemas.microsoft.com/office/drawing/2014/main" id="{1FFAE955-1A84-B6F5-30C5-29760EF822E3}"/>
+              </a:ext>
+            </a:extLst>
+          </p:cNvPr>
+          <p:cNvSpPr/>
+          <p:nvPr/>
+        </p:nvSpPr>
+        <p:spPr>
+          <a:xfrm>
+            <a:off x="6217921" y="2862974"/>
+            <a:ext cx="755703" cy="755703"/>
+          </a:xfrm>
+          <a:prstGeom prst="foldedCorner">
+            <a:avLst/>
+          </a:prstGeom>
+          <a:ln>
+            <a:headEnd type="none" w="med" len="med"/>
+            <a:tailEnd type="none" w="med" len="med"/>
+          </a:ln>
+        </p:spPr>
+        <p:style>
+          <a:lnRef idx="1">
+            <a:schemeClr val="accent6"/>
+          </a:lnRef>
+          <a:fillRef idx="2">
+            <a:schemeClr val="accent6"/>
+          </a:fillRef>
+          <a:effectRef idx="1">
+            <a:schemeClr val="accent6"/>
+          </a:effectRef>
+          <a:fontRef idx="minor">
+            <a:schemeClr val="dk1"/>
+          </a:fontRef>
+        </p:style>
+        <p:txBody>
+          <a:bodyPr wrap="none" rtlCol="0" anchor="ctr"/>
+          <a:lstStyle/>
+          <a:p>
+            <a:pPr algn="ctr"/>
+            <a:r>
+              <a:rPr kumimoji="1" lang="en-US" altLang="ja-JP" sz="1200" dirty="0">
+                <a:solidFill>
+                  <a:schemeClr val="dk1"/>
+                </a:solidFill>
+              </a:rPr>
+              <a:t>Instruct</a:t>
+            </a:r>
+          </a:p>
+        </p:txBody>
+      </p:sp>
+      <p:sp>
+        <p:nvSpPr>
+          <p:cNvPr id="13" name="四角形: 角を丸くする 12">
+            <a:extLst>
+              <a:ext uri="{FF2B5EF4-FFF2-40B4-BE49-F238E27FC236}">
+                <a16:creationId xmlns:a16="http://schemas.microsoft.com/office/drawing/2014/main" id="{C49A3A60-A368-8AC0-3865-6D6FE94A3C6E}"/>
+              </a:ext>
+            </a:extLst>
+          </p:cNvPr>
+          <p:cNvSpPr/>
+          <p:nvPr/>
+        </p:nvSpPr>
+        <p:spPr>
+          <a:xfrm>
+            <a:off x="5758232" y="2489120"/>
+            <a:ext cx="3997303" cy="1427034"/>
+          </a:xfrm>
+          <a:prstGeom prst="roundRect">
+            <a:avLst>
+              <a:gd name="adj" fmla="val 7301"/>
+            </a:avLst>
+          </a:prstGeom>
+          <a:noFill/>
+          <a:ln>
+            <a:solidFill>
+              <a:schemeClr val="accent1"/>
+            </a:solidFill>
+          </a:ln>
+        </p:spPr>
+        <p:style>
+          <a:lnRef idx="2">
+            <a:schemeClr val="accent6"/>
+          </a:lnRef>
+          <a:fillRef idx="1">
+            <a:schemeClr val="lt1"/>
+          </a:fillRef>
+          <a:effectRef idx="0">
+            <a:schemeClr val="accent6"/>
+          </a:effectRef>
+          <a:fontRef idx="minor">
+            <a:schemeClr val="dk1"/>
+          </a:fontRef>
+        </p:style>
+        <p:txBody>
+          <a:bodyPr rtlCol="0" anchor="t"/>
+          <a:lstStyle/>
+          <a:p>
+            <a:r>
+              <a:rPr lang="ja-JP" altLang="en-US" sz="1400" dirty="0"/>
+              <a:t>服装コーディネーターエージェント</a:t>
+            </a:r>
+            <a:endParaRPr kumimoji="1" lang="ja-JP" altLang="en-US" sz="1400" dirty="0"/>
+          </a:p>
+        </p:txBody>
+      </p:sp>
+      <p:pic>
+        <p:nvPicPr>
+          <p:cNvPr id="18" name="Picture 2" descr="Using Azure Search for vector search with Azure OpenAI and LangChain ·  Clemens Siebler's Blog">
+            <a:extLst>
+              <a:ext uri="{FF2B5EF4-FFF2-40B4-BE49-F238E27FC236}">
+                <a16:creationId xmlns:a16="http://schemas.microsoft.com/office/drawing/2014/main" id="{EF46826E-A069-0668-CFC9-F9811044E2BA}"/>
+              </a:ext>
+            </a:extLst>
+          </p:cNvPr>
+          <p:cNvPicPr>
+            <a:picLocks noChangeAspect="1" noChangeArrowheads="1"/>
+          </p:cNvPicPr>
+          <p:nvPr/>
+        </p:nvPicPr>
+        <p:blipFill rotWithShape="1">
+          <a:blip r:embed="rId4">
+            <a:clrChange>
+              <a:clrFrom>
+                <a:srgbClr val="FFFFFF"/>
+              </a:clrFrom>
+              <a:clrTo>
+                <a:srgbClr val="FFFFFF">
+                  <a:alpha val="0"/>
+                </a:srgbClr>
+              </a:clrTo>
+            </a:clrChange>
+            <a:extLst>
+              <a:ext uri="{28A0092B-C50C-407E-A947-70E740481C1C}">
+                <a14:useLocalDpi xmlns:a14="http://schemas.microsoft.com/office/drawing/2010/main"/>
+              </a:ext>
+            </a:extLst>
+          </a:blip>
+          <a:srcRect/>
+          <a:stretch/>
+        </p:blipFill>
+        <p:spPr bwMode="auto">
+          <a:xfrm>
+            <a:off x="8223132" y="2868518"/>
+            <a:ext cx="647531" cy="489772"/>
+          </a:xfrm>
+          <a:prstGeom prst="rect">
+            <a:avLst/>
+          </a:prstGeom>
+          <a:noFill/>
+          <a:extLst>
+            <a:ext uri="{909E8E84-426E-40DD-AFC4-6F175D3DCCD1}">
+              <a14:hiddenFill xmlns:a14="http://schemas.microsoft.com/office/drawing/2010/main">
+                <a:solidFill>
+                  <a:srgbClr val="FFFFFF"/>
+                </a:solidFill>
+              </a14:hiddenFill>
+            </a:ext>
+          </a:extLst>
+        </p:spPr>
+      </p:pic>
+      <p:sp>
+        <p:nvSpPr>
+          <p:cNvPr id="20" name="テキスト ボックス 19">
+            <a:extLst>
+              <a:ext uri="{FF2B5EF4-FFF2-40B4-BE49-F238E27FC236}">
+                <a16:creationId xmlns:a16="http://schemas.microsoft.com/office/drawing/2014/main" id="{713E04C1-1AE8-AED7-EB72-B7E90BC3BA69}"/>
+              </a:ext>
+            </a:extLst>
+          </p:cNvPr>
+          <p:cNvSpPr txBox="1"/>
+          <p:nvPr/>
+        </p:nvSpPr>
+        <p:spPr>
+          <a:xfrm>
+            <a:off x="8223132" y="3291141"/>
+            <a:ext cx="1443024" cy="369332"/>
+          </a:xfrm>
+          <a:prstGeom prst="rect">
+            <a:avLst/>
+          </a:prstGeom>
+          <a:noFill/>
+        </p:spPr>
+        <p:txBody>
+          <a:bodyPr wrap="none" rtlCol="0">
+            <a:spAutoFit/>
+          </a:bodyPr>
+          <a:lstStyle/>
+          <a:p>
+            <a:r>
+              <a:rPr lang="en-US" altLang="ja-JP" dirty="0"/>
+              <a:t>g</a:t>
+            </a:r>
+            <a:r>
+              <a:rPr kumimoji="1" lang="en-US" altLang="ja-JP" dirty="0"/>
+              <a:t>pt-4o-mini</a:t>
+            </a:r>
+            <a:endParaRPr kumimoji="1" lang="ja-JP" altLang="en-US" dirty="0"/>
+          </a:p>
+        </p:txBody>
+      </p:sp>
+      <p:cxnSp>
+        <p:nvCxnSpPr>
+          <p:cNvPr id="21" name="直線矢印コネクタ 20">
+            <a:extLst>
+              <a:ext uri="{FF2B5EF4-FFF2-40B4-BE49-F238E27FC236}">
+                <a16:creationId xmlns:a16="http://schemas.microsoft.com/office/drawing/2014/main" id="{E6242083-90EF-975B-26B3-D8905711DD16}"/>
+              </a:ext>
+            </a:extLst>
+          </p:cNvPr>
+          <p:cNvCxnSpPr>
+            <a:cxnSpLocks/>
+          </p:cNvCxnSpPr>
+          <p:nvPr/>
+        </p:nvCxnSpPr>
+        <p:spPr>
+          <a:xfrm flipV="1">
+            <a:off x="7139390" y="3305706"/>
+            <a:ext cx="921326" cy="103"/>
+          </a:xfrm>
+          <a:prstGeom prst="straightConnector1">
+            <a:avLst/>
+          </a:prstGeom>
+          <a:ln w="28575">
+            <a:solidFill>
+              <a:schemeClr val="accent1"/>
+            </a:solidFill>
+            <a:prstDash val="dash"/>
+            <a:headEnd type="none" w="med" len="med"/>
+            <a:tailEnd type="arrow" w="med" len="med"/>
+          </a:ln>
+        </p:spPr>
+        <p:style>
+          <a:lnRef idx="1">
+            <a:schemeClr val="accent1"/>
+          </a:lnRef>
+          <a:fillRef idx="0">
+            <a:schemeClr val="accent1"/>
+          </a:fillRef>
+          <a:effectRef idx="0">
+            <a:schemeClr val="accent1"/>
+          </a:effectRef>
+          <a:fontRef idx="minor">
+            <a:schemeClr val="tx1"/>
+          </a:fontRef>
+        </p:style>
+      </p:cxnSp>
+      <p:pic>
+        <p:nvPicPr>
+          <p:cNvPr id="22" name="Graphic 54" descr="ソリッドフィル付きロボット">
+            <a:extLst>
+              <a:ext uri="{FF2B5EF4-FFF2-40B4-BE49-F238E27FC236}">
+                <a16:creationId xmlns:a16="http://schemas.microsoft.com/office/drawing/2014/main" id="{94B09771-6AD4-716F-C296-D7DDE262F384}"/>
+              </a:ext>
+            </a:extLst>
+          </p:cNvPr>
+          <p:cNvPicPr>
+            <a:picLocks noChangeAspect="1"/>
+          </p:cNvPicPr>
+          <p:nvPr/>
+        </p:nvPicPr>
+        <p:blipFill>
+          <a:blip r:embed="rId8">
+            <a:extLst>
+              <a:ext uri="{96DAC541-7B7A-43D3-8B79-37D633B846F1}">
+                <asvg:svgBlip xmlns:asvg="http://schemas.microsoft.com/office/drawing/2016/SVG/main" r:embed="rId9"/>
+              </a:ext>
+            </a:extLst>
+          </a:blip>
+          <a:stretch>
+            <a:fillRect/>
+          </a:stretch>
+        </p:blipFill>
+        <p:spPr>
+          <a:xfrm>
+            <a:off x="5779978" y="3151151"/>
+            <a:ext cx="718873" cy="718873"/>
+          </a:xfrm>
+          <a:prstGeom prst="rect">
+            <a:avLst/>
+          </a:prstGeom>
+        </p:spPr>
+      </p:pic>
+      <p:cxnSp>
+        <p:nvCxnSpPr>
+          <p:cNvPr id="26" name="直線矢印コネクタ 25">
+            <a:extLst>
+              <a:ext uri="{FF2B5EF4-FFF2-40B4-BE49-F238E27FC236}">
+                <a16:creationId xmlns:a16="http://schemas.microsoft.com/office/drawing/2014/main" id="{568A8556-0E8F-D965-C9DD-4722D3EB6827}"/>
+              </a:ext>
+            </a:extLst>
+          </p:cNvPr>
+          <p:cNvCxnSpPr>
+            <a:cxnSpLocks/>
+            <a:stCxn id="15" idx="3"/>
+          </p:cNvCxnSpPr>
+          <p:nvPr/>
+        </p:nvCxnSpPr>
+        <p:spPr>
+          <a:xfrm>
+            <a:off x="4222475" y="2596892"/>
+            <a:ext cx="1693152" cy="923123"/>
+          </a:xfrm>
+          <a:prstGeom prst="straightConnector1">
+            <a:avLst/>
+          </a:prstGeom>
+          <a:ln w="28575">
+            <a:solidFill>
+              <a:schemeClr val="accent1"/>
+            </a:solidFill>
+            <a:headEnd type="none" w="med" len="med"/>
+            <a:tailEnd type="arrow" w="med" len="med"/>
+          </a:ln>
+        </p:spPr>
+        <p:style>
+          <a:lnRef idx="1">
+            <a:schemeClr val="accent1"/>
+          </a:lnRef>
+          <a:fillRef idx="0">
+            <a:schemeClr val="accent1"/>
+          </a:fillRef>
+          <a:effectRef idx="0">
+            <a:schemeClr val="accent1"/>
+          </a:effectRef>
+          <a:fontRef idx="minor">
+            <a:schemeClr val="tx1"/>
+          </a:fontRef>
+        </p:style>
+      </p:cxnSp>
+    </p:spTree>
+    <p:extLst>
+      <p:ext uri="{BB962C8B-B14F-4D97-AF65-F5344CB8AC3E}">
+        <p14:creationId xmlns:p14="http://schemas.microsoft.com/office/powerpoint/2010/main" val="1603292419"/>
+      </p:ext>
+    </p:extLst>
+  </p:cSld>
+  <p:clrMapOvr>
+    <a:masterClrMapping/>
+  </p:clrMapOvr>
+</p:sld>
+</file>
+
+<file path=ppt/slides/slide4.xml><?xml version="1.0" encoding="utf-8"?>
+<p:sld xmlns:a="http://schemas.openxmlformats.org/drawingml/2006/main" xmlns:r="http://schemas.openxmlformats.org/officeDocument/2006/relationships" xmlns:p="http://schemas.openxmlformats.org/presentationml/2006/main">
+  <p:cSld>
+    <p:spTree>
+      <p:nvGrpSpPr>
+        <p:cNvPr id="1" name="">
+          <a:extLst>
+            <a:ext uri="{FF2B5EF4-FFF2-40B4-BE49-F238E27FC236}">
+              <a16:creationId xmlns:a16="http://schemas.microsoft.com/office/drawing/2014/main" id="{C3A169C6-7816-BEBB-6149-8F9DAC6F47F1}"/>
+            </a:ext>
+          </a:extLst>
+        </p:cNvPr>
+        <p:cNvGrpSpPr/>
+        <p:nvPr/>
+      </p:nvGrpSpPr>
+      <p:grpSpPr>
+        <a:xfrm>
+          <a:off x="0" y="0"/>
+          <a:ext cx="0" cy="0"/>
+          <a:chOff x="0" y="0"/>
+          <a:chExt cx="0" cy="0"/>
+        </a:xfrm>
+      </p:grpSpPr>
+      <p:sp>
+        <p:nvSpPr>
+          <p:cNvPr id="2" name="正方形/長方形 1">
+            <a:extLst>
+              <a:ext uri="{FF2B5EF4-FFF2-40B4-BE49-F238E27FC236}">
+                <a16:creationId xmlns:a16="http://schemas.microsoft.com/office/drawing/2014/main" id="{7B5A582F-A8F8-272A-00A2-4578D32D86FD}"/>
+              </a:ext>
+            </a:extLst>
+          </p:cNvPr>
+          <p:cNvSpPr/>
+          <p:nvPr/>
+        </p:nvSpPr>
+        <p:spPr>
+          <a:xfrm>
+            <a:off x="359454" y="1368447"/>
+            <a:ext cx="9736119" cy="2028365"/>
+          </a:xfrm>
+          <a:prstGeom prst="rect">
+            <a:avLst/>
+          </a:prstGeom>
+          <a:solidFill>
+            <a:schemeClr val="bg1"/>
+          </a:solidFill>
+          <a:ln>
+            <a:noFill/>
+          </a:ln>
+          <a:effectLst>
+            <a:outerShdw blurRad="50800" dist="38100" dir="2700000" algn="tl" rotWithShape="0">
+              <a:prstClr val="black">
+                <a:alpha val="40000"/>
+              </a:prstClr>
+            </a:outerShdw>
+          </a:effectLst>
+        </p:spPr>
+        <p:style>
+          <a:lnRef idx="2">
+            <a:schemeClr val="accent1">
+              <a:shade val="15000"/>
+            </a:schemeClr>
+          </a:lnRef>
+          <a:fillRef idx="1">
+            <a:schemeClr val="accent1"/>
+          </a:fillRef>
+          <a:effectRef idx="0">
+            <a:schemeClr val="accent1"/>
+          </a:effectRef>
+          <a:fontRef idx="minor">
+            <a:schemeClr val="lt1"/>
+          </a:fontRef>
+        </p:style>
+        <p:txBody>
+          <a:bodyPr rtlCol="0" anchor="ctr"/>
+          <a:lstStyle/>
+          <a:p>
+            <a:pPr algn="ctr"/>
+            <a:endParaRPr kumimoji="1" lang="ja-JP" altLang="en-US"/>
+          </a:p>
+        </p:txBody>
+      </p:sp>
+      <p:pic>
+        <p:nvPicPr>
+          <p:cNvPr id="3" name="図 2" descr="建物, 橋, ミラー が含まれている画像&#10;&#10;自動的に生成された説明">
+            <a:extLst>
+              <a:ext uri="{FF2B5EF4-FFF2-40B4-BE49-F238E27FC236}">
+                <a16:creationId xmlns:a16="http://schemas.microsoft.com/office/drawing/2014/main" id="{4A6AAF30-2FAE-87FB-9CA3-296A73B08330}"/>
+              </a:ext>
+            </a:extLst>
+          </p:cNvPr>
+          <p:cNvPicPr>
+            <a:picLocks noChangeAspect="1"/>
+          </p:cNvPicPr>
+          <p:nvPr/>
+        </p:nvPicPr>
+        <p:blipFill>
+          <a:blip r:embed="rId2"/>
+          <a:stretch>
+            <a:fillRect/>
+          </a:stretch>
+        </p:blipFill>
+        <p:spPr>
+          <a:xfrm>
+            <a:off x="611560" y="2374241"/>
+            <a:ext cx="490606" cy="490606"/>
+          </a:xfrm>
+          <a:prstGeom prst="rect">
+            <a:avLst/>
+          </a:prstGeom>
+        </p:spPr>
+      </p:pic>
+      <p:sp>
+        <p:nvSpPr>
+          <p:cNvPr id="4" name="四角形: 角を丸くする 3">
+            <a:extLst>
+              <a:ext uri="{FF2B5EF4-FFF2-40B4-BE49-F238E27FC236}">
+                <a16:creationId xmlns:a16="http://schemas.microsoft.com/office/drawing/2014/main" id="{C35DDC12-6BED-DE45-9BDB-0F5A360342B1}"/>
+              </a:ext>
+            </a:extLst>
+          </p:cNvPr>
+          <p:cNvSpPr/>
+          <p:nvPr/>
+        </p:nvSpPr>
+        <p:spPr>
+          <a:xfrm>
+            <a:off x="1561855" y="1543068"/>
+            <a:ext cx="5280379" cy="1633308"/>
+          </a:xfrm>
+          <a:prstGeom prst="roundRect">
+            <a:avLst>
+              <a:gd name="adj" fmla="val 11262"/>
+            </a:avLst>
+          </a:prstGeom>
+          <a:noFill/>
+          <a:ln>
+            <a:solidFill>
+              <a:schemeClr val="accent1"/>
+            </a:solidFill>
+          </a:ln>
+        </p:spPr>
+        <p:style>
+          <a:lnRef idx="2">
+            <a:schemeClr val="accent6"/>
+          </a:lnRef>
+          <a:fillRef idx="1">
+            <a:schemeClr val="lt1"/>
+          </a:fillRef>
+          <a:effectRef idx="0">
+            <a:schemeClr val="accent6"/>
+          </a:effectRef>
+          <a:fontRef idx="minor">
+            <a:schemeClr val="dk1"/>
+          </a:fontRef>
+        </p:style>
+        <p:txBody>
+          <a:bodyPr rtlCol="0" anchor="t"/>
+          <a:lstStyle/>
+          <a:p>
+            <a:r>
+              <a:rPr lang="en-US" altLang="ja-JP" sz="1400" dirty="0"/>
+              <a:t>App</a:t>
+            </a:r>
+            <a:endParaRPr lang="ja-JP" altLang="en-US" sz="1400" dirty="0"/>
+          </a:p>
+        </p:txBody>
+      </p:sp>
+      <p:sp>
+        <p:nvSpPr>
+          <p:cNvPr id="15" name="四角形: 角を丸くする 14">
+            <a:extLst>
+              <a:ext uri="{FF2B5EF4-FFF2-40B4-BE49-F238E27FC236}">
+                <a16:creationId xmlns:a16="http://schemas.microsoft.com/office/drawing/2014/main" id="{78620892-6EEB-6852-A521-584D053E538C}"/>
+              </a:ext>
+            </a:extLst>
+          </p:cNvPr>
+          <p:cNvSpPr/>
+          <p:nvPr/>
+        </p:nvSpPr>
+        <p:spPr>
+          <a:xfrm>
+            <a:off x="2999071" y="2294773"/>
+            <a:ext cx="1223404" cy="604237"/>
+          </a:xfrm>
+          <a:prstGeom prst="roundRect">
+            <a:avLst/>
+          </a:prstGeom>
+        </p:spPr>
+        <p:style>
+          <a:lnRef idx="1">
+            <a:schemeClr val="accent1"/>
+          </a:lnRef>
+          <a:fillRef idx="2">
+            <a:schemeClr val="accent1"/>
+          </a:fillRef>
+          <a:effectRef idx="1">
+            <a:schemeClr val="accent1"/>
+          </a:effectRef>
+          <a:fontRef idx="minor">
+            <a:schemeClr val="dk1"/>
+          </a:fontRef>
+        </p:style>
+        <p:txBody>
+          <a:bodyPr rtlCol="0" anchor="ctr"/>
+          <a:lstStyle/>
+          <a:p>
+            <a:pPr algn="ctr"/>
+            <a:r>
+              <a:rPr kumimoji="1" lang="en-US" altLang="ja-JP" sz="1400" dirty="0"/>
+              <a:t>Semantic</a:t>
+            </a:r>
+            <a:br>
+              <a:rPr kumimoji="1" lang="en-US" altLang="ja-JP" sz="1400" dirty="0"/>
+            </a:br>
+            <a:r>
+              <a:rPr kumimoji="1" lang="en-US" altLang="ja-JP" sz="1400" dirty="0"/>
+              <a:t>Kernel</a:t>
+            </a:r>
+            <a:endParaRPr kumimoji="1" lang="ja-JP" altLang="en-US" sz="1400" dirty="0"/>
+          </a:p>
+        </p:txBody>
+      </p:sp>
+      <p:sp>
+        <p:nvSpPr>
+          <p:cNvPr id="16" name="四角形: メモ 15">
+            <a:extLst>
+              <a:ext uri="{FF2B5EF4-FFF2-40B4-BE49-F238E27FC236}">
+                <a16:creationId xmlns:a16="http://schemas.microsoft.com/office/drawing/2014/main" id="{BCF02957-4C45-3214-BC29-837AD24AD173}"/>
+              </a:ext>
+            </a:extLst>
+          </p:cNvPr>
+          <p:cNvSpPr/>
+          <p:nvPr/>
+        </p:nvSpPr>
+        <p:spPr>
+          <a:xfrm>
+            <a:off x="1854644" y="2183223"/>
+            <a:ext cx="755703" cy="755703"/>
+          </a:xfrm>
+          <a:prstGeom prst="foldedCorner">
+            <a:avLst/>
+          </a:prstGeom>
+          <a:ln>
+            <a:headEnd type="none" w="med" len="med"/>
+            <a:tailEnd type="none" w="med" len="med"/>
+          </a:ln>
+        </p:spPr>
+        <p:style>
+          <a:lnRef idx="1">
+            <a:schemeClr val="accent1"/>
+          </a:lnRef>
+          <a:fillRef idx="2">
+            <a:schemeClr val="accent1"/>
+          </a:fillRef>
+          <a:effectRef idx="1">
+            <a:schemeClr val="accent1"/>
+          </a:effectRef>
+          <a:fontRef idx="minor">
+            <a:schemeClr val="dk1"/>
+          </a:fontRef>
+        </p:style>
+        <p:txBody>
+          <a:bodyPr wrap="none" rtlCol="0" anchor="ctr"/>
+          <a:lstStyle/>
+          <a:p>
+            <a:pPr algn="ctr"/>
+            <a:r>
+              <a:rPr lang="en-US" altLang="ja-JP" sz="1200" dirty="0"/>
+              <a:t>Code</a:t>
+            </a:r>
+            <a:endParaRPr kumimoji="1" lang="en-US" altLang="ja-JP" sz="1200" dirty="0">
+              <a:solidFill>
+                <a:schemeClr val="dk1"/>
+              </a:solidFill>
+            </a:endParaRPr>
+          </a:p>
+        </p:txBody>
+      </p:sp>
+      <p:cxnSp>
+        <p:nvCxnSpPr>
+          <p:cNvPr id="19" name="直線矢印コネクタ 18">
+            <a:extLst>
+              <a:ext uri="{FF2B5EF4-FFF2-40B4-BE49-F238E27FC236}">
+                <a16:creationId xmlns:a16="http://schemas.microsoft.com/office/drawing/2014/main" id="{FF697F2C-91AB-D2AC-27CD-3EC7E7641F37}"/>
+              </a:ext>
+            </a:extLst>
+          </p:cNvPr>
+          <p:cNvCxnSpPr>
+            <a:cxnSpLocks/>
+          </p:cNvCxnSpPr>
+          <p:nvPr/>
+        </p:nvCxnSpPr>
+        <p:spPr>
+          <a:xfrm>
+            <a:off x="2544725" y="2635089"/>
+            <a:ext cx="572070" cy="181"/>
+          </a:xfrm>
+          <a:prstGeom prst="straightConnector1">
+            <a:avLst/>
+          </a:prstGeom>
+          <a:ln w="28575">
+            <a:solidFill>
+              <a:schemeClr val="accent1"/>
+            </a:solidFill>
+            <a:prstDash val="dash"/>
+            <a:headEnd type="none" w="med" len="med"/>
+            <a:tailEnd type="arrow" w="med" len="med"/>
+          </a:ln>
+        </p:spPr>
+        <p:style>
+          <a:lnRef idx="1">
+            <a:schemeClr val="accent1"/>
+          </a:lnRef>
+          <a:fillRef idx="0">
+            <a:schemeClr val="accent1"/>
+          </a:fillRef>
+          <a:effectRef idx="0">
+            <a:schemeClr val="accent1"/>
+          </a:effectRef>
+          <a:fontRef idx="minor">
+            <a:schemeClr val="tx1"/>
+          </a:fontRef>
+        </p:style>
+      </p:cxnSp>
+      <p:sp>
+        <p:nvSpPr>
+          <p:cNvPr id="11" name="四角形: メモ 10">
+            <a:extLst>
+              <a:ext uri="{FF2B5EF4-FFF2-40B4-BE49-F238E27FC236}">
+                <a16:creationId xmlns:a16="http://schemas.microsoft.com/office/drawing/2014/main" id="{CFDD132E-1D06-04E9-8882-FAA9DDA07E40}"/>
+              </a:ext>
+            </a:extLst>
+          </p:cNvPr>
+          <p:cNvSpPr/>
+          <p:nvPr/>
+        </p:nvSpPr>
+        <p:spPr>
+          <a:xfrm>
+            <a:off x="5678505" y="2109144"/>
+            <a:ext cx="755703" cy="755703"/>
+          </a:xfrm>
+          <a:prstGeom prst="foldedCorner">
+            <a:avLst/>
+          </a:prstGeom>
+          <a:ln>
+            <a:headEnd type="none" w="med" len="med"/>
+            <a:tailEnd type="none" w="med" len="med"/>
+          </a:ln>
+        </p:spPr>
+        <p:style>
+          <a:lnRef idx="1">
+            <a:schemeClr val="accent6"/>
+          </a:lnRef>
+          <a:fillRef idx="2">
+            <a:schemeClr val="accent6"/>
+          </a:fillRef>
+          <a:effectRef idx="1">
+            <a:schemeClr val="accent6"/>
+          </a:effectRef>
+          <a:fontRef idx="minor">
+            <a:schemeClr val="dk1"/>
+          </a:fontRef>
+        </p:style>
+        <p:txBody>
+          <a:bodyPr wrap="none" rtlCol="0" anchor="ctr"/>
+          <a:lstStyle/>
+          <a:p>
+            <a:pPr algn="ctr"/>
+            <a:r>
+              <a:rPr kumimoji="1" lang="en-US" altLang="ja-JP" sz="1200" dirty="0">
+                <a:solidFill>
+                  <a:schemeClr val="dk1"/>
+                </a:solidFill>
+              </a:rPr>
+              <a:t>Instruct</a:t>
+            </a:r>
+          </a:p>
+        </p:txBody>
+      </p:sp>
+      <p:pic>
+        <p:nvPicPr>
+          <p:cNvPr id="18" name="Picture 2" descr="Using Azure Search for vector search with Azure OpenAI and LangChain ·  Clemens Siebler's Blog">
+            <a:extLst>
+              <a:ext uri="{FF2B5EF4-FFF2-40B4-BE49-F238E27FC236}">
+                <a16:creationId xmlns:a16="http://schemas.microsoft.com/office/drawing/2014/main" id="{6D8C36B2-7F8F-6657-865B-F8C68DF162C8}"/>
+              </a:ext>
+            </a:extLst>
+          </p:cNvPr>
+          <p:cNvPicPr>
+            <a:picLocks noChangeAspect="1" noChangeArrowheads="1"/>
+          </p:cNvPicPr>
+          <p:nvPr/>
+        </p:nvPicPr>
+        <p:blipFill rotWithShape="1">
+          <a:blip r:embed="rId3">
+            <a:clrChange>
+              <a:clrFrom>
+                <a:srgbClr val="FFFFFF"/>
+              </a:clrFrom>
+              <a:clrTo>
+                <a:srgbClr val="FFFFFF">
+                  <a:alpha val="0"/>
+                </a:srgbClr>
+              </a:clrTo>
+            </a:clrChange>
+            <a:extLst>
+              <a:ext uri="{28A0092B-C50C-407E-A947-70E740481C1C}">
+                <a14:useLocalDpi xmlns:a14="http://schemas.microsoft.com/office/drawing/2010/main"/>
+              </a:ext>
+            </a:extLst>
+          </a:blip>
+          <a:srcRect/>
+          <a:stretch/>
+        </p:blipFill>
+        <p:spPr bwMode="auto">
+          <a:xfrm>
+            <a:off x="8866246" y="2242109"/>
+            <a:ext cx="647531" cy="489772"/>
+          </a:xfrm>
+          <a:prstGeom prst="rect">
+            <a:avLst/>
+          </a:prstGeom>
+          <a:noFill/>
+          <a:extLst>
+            <a:ext uri="{909E8E84-426E-40DD-AFC4-6F175D3DCCD1}">
+              <a14:hiddenFill xmlns:a14="http://schemas.microsoft.com/office/drawing/2010/main">
+                <a:solidFill>
+                  <a:srgbClr val="FFFFFF"/>
+                </a:solidFill>
+              </a14:hiddenFill>
+            </a:ext>
+          </a:extLst>
+        </p:spPr>
+      </p:pic>
+      <p:sp>
+        <p:nvSpPr>
+          <p:cNvPr id="20" name="テキスト ボックス 19">
+            <a:extLst>
+              <a:ext uri="{FF2B5EF4-FFF2-40B4-BE49-F238E27FC236}">
+                <a16:creationId xmlns:a16="http://schemas.microsoft.com/office/drawing/2014/main" id="{F7E9B75B-81B3-4265-163F-3190C9188D06}"/>
+              </a:ext>
+            </a:extLst>
+          </p:cNvPr>
+          <p:cNvSpPr txBox="1"/>
+          <p:nvPr/>
+        </p:nvSpPr>
+        <p:spPr>
+          <a:xfrm>
+            <a:off x="8463423" y="2754260"/>
+            <a:ext cx="1443024" cy="369332"/>
+          </a:xfrm>
+          <a:prstGeom prst="rect">
+            <a:avLst/>
+          </a:prstGeom>
+          <a:noFill/>
+        </p:spPr>
+        <p:txBody>
+          <a:bodyPr wrap="none" rtlCol="0">
+            <a:spAutoFit/>
+          </a:bodyPr>
+          <a:lstStyle/>
+          <a:p>
+            <a:r>
+              <a:rPr lang="en-US" altLang="ja-JP" dirty="0"/>
+              <a:t>g</a:t>
+            </a:r>
+            <a:r>
+              <a:rPr kumimoji="1" lang="en-US" altLang="ja-JP" dirty="0"/>
+              <a:t>pt-4o-mini</a:t>
+            </a:r>
+            <a:endParaRPr kumimoji="1" lang="ja-JP" altLang="en-US" dirty="0"/>
+          </a:p>
+        </p:txBody>
+      </p:sp>
+      <p:pic>
+        <p:nvPicPr>
+          <p:cNvPr id="22" name="Graphic 54" descr="ソリッドフィル付きロボット">
+            <a:extLst>
+              <a:ext uri="{FF2B5EF4-FFF2-40B4-BE49-F238E27FC236}">
+                <a16:creationId xmlns:a16="http://schemas.microsoft.com/office/drawing/2014/main" id="{FCBD070E-394A-DF99-BF9D-DFD6D5E5BD97}"/>
+              </a:ext>
+            </a:extLst>
+          </p:cNvPr>
+          <p:cNvPicPr>
+            <a:picLocks noChangeAspect="1"/>
+          </p:cNvPicPr>
+          <p:nvPr/>
+        </p:nvPicPr>
+        <p:blipFill>
+          <a:blip r:embed="rId4">
+            <a:extLst>
+              <a:ext uri="{96DAC541-7B7A-43D3-8B79-37D633B846F1}">
+                <asvg:svgBlip xmlns:asvg="http://schemas.microsoft.com/office/drawing/2016/SVG/main" r:embed="rId5"/>
+              </a:ext>
+            </a:extLst>
+          </a:blip>
+          <a:stretch>
+            <a:fillRect/>
+          </a:stretch>
+        </p:blipFill>
+        <p:spPr>
+          <a:xfrm>
+            <a:off x="5033087" y="2209932"/>
+            <a:ext cx="718873" cy="718873"/>
+          </a:xfrm>
+          <a:prstGeom prst="rect">
+            <a:avLst/>
+          </a:prstGeom>
+        </p:spPr>
+      </p:pic>
+      <p:cxnSp>
+        <p:nvCxnSpPr>
+          <p:cNvPr id="26" name="直線矢印コネクタ 25">
+            <a:extLst>
+              <a:ext uri="{FF2B5EF4-FFF2-40B4-BE49-F238E27FC236}">
+                <a16:creationId xmlns:a16="http://schemas.microsoft.com/office/drawing/2014/main" id="{A1DF892C-1DB2-092E-C653-6B947A54E3C6}"/>
+              </a:ext>
+            </a:extLst>
+          </p:cNvPr>
+          <p:cNvCxnSpPr>
+            <a:cxnSpLocks/>
+            <a:stCxn id="15" idx="3"/>
+          </p:cNvCxnSpPr>
+          <p:nvPr/>
+        </p:nvCxnSpPr>
+        <p:spPr>
+          <a:xfrm>
+            <a:off x="4222475" y="2596892"/>
+            <a:ext cx="852772" cy="0"/>
+          </a:xfrm>
+          <a:prstGeom prst="straightConnector1">
+            <a:avLst/>
+          </a:prstGeom>
+          <a:ln w="28575">
+            <a:solidFill>
+              <a:schemeClr val="accent1"/>
+            </a:solidFill>
+            <a:headEnd type="none" w="med" len="med"/>
+            <a:tailEnd type="arrow" w="med" len="med"/>
+          </a:ln>
+        </p:spPr>
+        <p:style>
+          <a:lnRef idx="1">
+            <a:schemeClr val="accent1"/>
+          </a:lnRef>
+          <a:fillRef idx="0">
+            <a:schemeClr val="accent1"/>
+          </a:fillRef>
+          <a:effectRef idx="0">
+            <a:schemeClr val="accent1"/>
+          </a:effectRef>
+          <a:fontRef idx="minor">
+            <a:schemeClr val="tx1"/>
+          </a:fontRef>
+        </p:style>
+      </p:cxnSp>
+      <p:sp>
+        <p:nvSpPr>
+          <p:cNvPr id="24" name="テキスト ボックス 23">
+            <a:extLst>
+              <a:ext uri="{FF2B5EF4-FFF2-40B4-BE49-F238E27FC236}">
+                <a16:creationId xmlns:a16="http://schemas.microsoft.com/office/drawing/2014/main" id="{8CE18A31-4E0D-5414-B9CC-8AA13B65382B}"/>
+              </a:ext>
+            </a:extLst>
+          </p:cNvPr>
+          <p:cNvSpPr txBox="1"/>
+          <p:nvPr/>
+        </p:nvSpPr>
+        <p:spPr>
+          <a:xfrm>
+            <a:off x="4843207" y="1772565"/>
+            <a:ext cx="1980029" cy="307777"/>
+          </a:xfrm>
+          <a:prstGeom prst="rect">
+            <a:avLst/>
+          </a:prstGeom>
+          <a:noFill/>
+        </p:spPr>
+        <p:txBody>
+          <a:bodyPr wrap="none" rtlCol="0">
+            <a:spAutoFit/>
+          </a:bodyPr>
+          <a:lstStyle/>
+          <a:p>
+            <a:r>
+              <a:rPr lang="ja-JP" altLang="en-US" sz="1400" dirty="0"/>
+              <a:t>服装コーディネーター</a:t>
+            </a:r>
+            <a:endParaRPr kumimoji="1" lang="ja-JP" altLang="en-US" sz="1400" dirty="0"/>
+          </a:p>
+        </p:txBody>
+      </p:sp>
+      <p:cxnSp>
+        <p:nvCxnSpPr>
+          <p:cNvPr id="25" name="直線矢印コネクタ 24">
+            <a:extLst>
+              <a:ext uri="{FF2B5EF4-FFF2-40B4-BE49-F238E27FC236}">
+                <a16:creationId xmlns:a16="http://schemas.microsoft.com/office/drawing/2014/main" id="{AA3E5396-5937-ACD7-E83C-07E946BADFF8}"/>
+              </a:ext>
+            </a:extLst>
+          </p:cNvPr>
+          <p:cNvCxnSpPr>
+            <a:cxnSpLocks/>
+          </p:cNvCxnSpPr>
+          <p:nvPr/>
+        </p:nvCxnSpPr>
+        <p:spPr>
+          <a:xfrm>
+            <a:off x="6482667" y="2635089"/>
+            <a:ext cx="2211870" cy="0"/>
+          </a:xfrm>
+          <a:prstGeom prst="straightConnector1">
+            <a:avLst/>
+          </a:prstGeom>
+          <a:ln w="28575">
+            <a:solidFill>
+              <a:schemeClr val="accent1"/>
+            </a:solidFill>
+            <a:headEnd type="none" w="med" len="med"/>
+            <a:tailEnd type="arrow" w="med" len="med"/>
+          </a:ln>
+        </p:spPr>
+        <p:style>
+          <a:lnRef idx="1">
+            <a:schemeClr val="accent1"/>
+          </a:lnRef>
+          <a:fillRef idx="0">
+            <a:schemeClr val="accent1"/>
+          </a:fillRef>
+          <a:effectRef idx="0">
+            <a:schemeClr val="accent1"/>
+          </a:effectRef>
+          <a:fontRef idx="minor">
+            <a:schemeClr val="tx1"/>
+          </a:fontRef>
+        </p:style>
+      </p:cxnSp>
+      <p:pic>
+        <p:nvPicPr>
+          <p:cNvPr id="27" name="図 26">
+            <a:extLst>
+              <a:ext uri="{FF2B5EF4-FFF2-40B4-BE49-F238E27FC236}">
+                <a16:creationId xmlns:a16="http://schemas.microsoft.com/office/drawing/2014/main" id="{19E77FE9-2929-BDF6-A1AE-5F892122071C}"/>
+              </a:ext>
+            </a:extLst>
+          </p:cNvPr>
+          <p:cNvPicPr>
+            <a:picLocks noChangeAspect="1"/>
+          </p:cNvPicPr>
+          <p:nvPr/>
+        </p:nvPicPr>
+        <p:blipFill>
+          <a:blip r:embed="rId6">
+            <a:extLst>
+              <a:ext uri="{28A0092B-C50C-407E-A947-70E740481C1C}">
+                <a14:useLocalDpi xmlns:a14="http://schemas.microsoft.com/office/drawing/2010/main" val="0"/>
+              </a:ext>
+            </a:extLst>
+          </a:blip>
+          <a:stretch>
+            <a:fillRect/>
+          </a:stretch>
+        </p:blipFill>
+        <p:spPr>
+          <a:xfrm>
+            <a:off x="7230958" y="2283937"/>
+            <a:ext cx="644868" cy="644868"/>
+          </a:xfrm>
+          <a:prstGeom prst="rect">
+            <a:avLst/>
+          </a:prstGeom>
+        </p:spPr>
+      </p:pic>
+    </p:spTree>
+    <p:extLst>
+      <p:ext uri="{BB962C8B-B14F-4D97-AF65-F5344CB8AC3E}">
+        <p14:creationId xmlns:p14="http://schemas.microsoft.com/office/powerpoint/2010/main" val="810568407"/>
+      </p:ext>
+    </p:extLst>
+  </p:cSld>
+  <p:clrMapOvr>
+    <a:masterClrMapping/>
+  </p:clrMapOvr>
+</p:sld>
+</file>
+
+<file path=ppt/slides/slide5.xml><?xml version="1.0" encoding="utf-8"?>
+<p:sld xmlns:a="http://schemas.openxmlformats.org/drawingml/2006/main" xmlns:r="http://schemas.openxmlformats.org/officeDocument/2006/relationships" xmlns:p="http://schemas.openxmlformats.org/presentationml/2006/main">
+  <p:cSld>
+    <p:spTree>
+      <p:nvGrpSpPr>
+        <p:cNvPr id="1" name="">
+          <a:extLst>
+            <a:ext uri="{FF2B5EF4-FFF2-40B4-BE49-F238E27FC236}">
+              <a16:creationId xmlns:a16="http://schemas.microsoft.com/office/drawing/2014/main" id="{48D67B7B-23A4-279F-8E35-921FA1C37F03}"/>
+            </a:ext>
+          </a:extLst>
+        </p:cNvPr>
+        <p:cNvGrpSpPr/>
+        <p:nvPr/>
+      </p:nvGrpSpPr>
+      <p:grpSpPr>
+        <a:xfrm>
+          <a:off x="0" y="0"/>
+          <a:ext cx="0" cy="0"/>
+          <a:chOff x="0" y="0"/>
+          <a:chExt cx="0" cy="0"/>
+        </a:xfrm>
+      </p:grpSpPr>
+      <p:sp>
+        <p:nvSpPr>
+          <p:cNvPr id="2" name="正方形/長方形 1">
+            <a:extLst>
+              <a:ext uri="{FF2B5EF4-FFF2-40B4-BE49-F238E27FC236}">
+                <a16:creationId xmlns:a16="http://schemas.microsoft.com/office/drawing/2014/main" id="{51D4DC84-A3DE-08B8-AE3E-E46476CDABFC}"/>
+              </a:ext>
+            </a:extLst>
+          </p:cNvPr>
+          <p:cNvSpPr/>
+          <p:nvPr/>
+        </p:nvSpPr>
+        <p:spPr>
+          <a:xfrm>
+            <a:off x="189186" y="832420"/>
+            <a:ext cx="11846323" cy="3714356"/>
+          </a:xfrm>
+          <a:prstGeom prst="rect">
+            <a:avLst/>
+          </a:prstGeom>
+          <a:solidFill>
+            <a:schemeClr val="bg1"/>
+          </a:solidFill>
+          <a:ln>
+            <a:noFill/>
+          </a:ln>
+          <a:effectLst>
+            <a:outerShdw blurRad="50800" dist="38100" dir="2700000" algn="tl" rotWithShape="0">
+              <a:prstClr val="black">
+                <a:alpha val="40000"/>
+              </a:prstClr>
+            </a:outerShdw>
+          </a:effectLst>
+        </p:spPr>
+        <p:style>
+          <a:lnRef idx="2">
+            <a:schemeClr val="accent1">
+              <a:shade val="15000"/>
+            </a:schemeClr>
+          </a:lnRef>
+          <a:fillRef idx="1">
+            <a:schemeClr val="accent1"/>
+          </a:fillRef>
+          <a:effectRef idx="0">
+            <a:schemeClr val="accent1"/>
+          </a:effectRef>
+          <a:fontRef idx="minor">
+            <a:schemeClr val="lt1"/>
+          </a:fontRef>
+        </p:style>
+        <p:txBody>
+          <a:bodyPr rtlCol="0" anchor="ctr"/>
+          <a:lstStyle/>
+          <a:p>
+            <a:pPr algn="ctr"/>
+            <a:endParaRPr kumimoji="1" lang="ja-JP" altLang="en-US"/>
+          </a:p>
+        </p:txBody>
+      </p:sp>
+      <p:pic>
+        <p:nvPicPr>
+          <p:cNvPr id="3" name="図 2" descr="建物, 橋, ミラー が含まれている画像&#10;&#10;自動的に生成された説明">
+            <a:extLst>
+              <a:ext uri="{FF2B5EF4-FFF2-40B4-BE49-F238E27FC236}">
+                <a16:creationId xmlns:a16="http://schemas.microsoft.com/office/drawing/2014/main" id="{FFA40B5F-2DE5-E553-84B6-A86AFE1F1DBF}"/>
+              </a:ext>
+            </a:extLst>
+          </p:cNvPr>
+          <p:cNvPicPr>
+            <a:picLocks noChangeAspect="1"/>
+          </p:cNvPicPr>
+          <p:nvPr/>
+        </p:nvPicPr>
+        <p:blipFill>
+          <a:blip r:embed="rId2"/>
+          <a:stretch>
+            <a:fillRect/>
+          </a:stretch>
+        </p:blipFill>
+        <p:spPr>
+          <a:xfrm>
+            <a:off x="387725" y="3433231"/>
+            <a:ext cx="490606" cy="490606"/>
+          </a:xfrm>
+          <a:prstGeom prst="rect">
+            <a:avLst/>
+          </a:prstGeom>
+        </p:spPr>
+      </p:pic>
+      <p:sp>
+        <p:nvSpPr>
+          <p:cNvPr id="4" name="四角形: 角を丸くする 3">
+            <a:extLst>
+              <a:ext uri="{FF2B5EF4-FFF2-40B4-BE49-F238E27FC236}">
+                <a16:creationId xmlns:a16="http://schemas.microsoft.com/office/drawing/2014/main" id="{31A3F707-5336-9520-A5EC-8690218A904B}"/>
+              </a:ext>
+            </a:extLst>
+          </p:cNvPr>
+          <p:cNvSpPr/>
+          <p:nvPr/>
+        </p:nvSpPr>
+        <p:spPr>
+          <a:xfrm>
+            <a:off x="1069973" y="1543067"/>
+            <a:ext cx="5492963" cy="2631642"/>
+          </a:xfrm>
+          <a:prstGeom prst="roundRect">
+            <a:avLst>
+              <a:gd name="adj" fmla="val 11262"/>
+            </a:avLst>
+          </a:prstGeom>
+          <a:noFill/>
+          <a:ln>
+            <a:solidFill>
+              <a:schemeClr val="accent1"/>
+            </a:solidFill>
+          </a:ln>
+        </p:spPr>
+        <p:style>
+          <a:lnRef idx="2">
+            <a:schemeClr val="accent6"/>
+          </a:lnRef>
+          <a:fillRef idx="1">
+            <a:schemeClr val="lt1"/>
+          </a:fillRef>
+          <a:effectRef idx="0">
+            <a:schemeClr val="accent6"/>
+          </a:effectRef>
+          <a:fontRef idx="minor">
+            <a:schemeClr val="dk1"/>
+          </a:fontRef>
+        </p:style>
+        <p:txBody>
+          <a:bodyPr rtlCol="0" anchor="t"/>
+          <a:lstStyle/>
+          <a:p>
+            <a:r>
+              <a:rPr lang="en-US" altLang="ja-JP" sz="1400" dirty="0"/>
+              <a:t>App</a:t>
+            </a:r>
+            <a:endParaRPr lang="ja-JP" altLang="en-US" sz="1400" dirty="0"/>
+          </a:p>
+        </p:txBody>
+      </p:sp>
+      <p:sp>
+        <p:nvSpPr>
+          <p:cNvPr id="15" name="四角形: 角を丸くする 14">
+            <a:extLst>
+              <a:ext uri="{FF2B5EF4-FFF2-40B4-BE49-F238E27FC236}">
+                <a16:creationId xmlns:a16="http://schemas.microsoft.com/office/drawing/2014/main" id="{C16F9493-3C21-3FFE-4C04-567F04C21981}"/>
+              </a:ext>
+            </a:extLst>
+          </p:cNvPr>
+          <p:cNvSpPr/>
+          <p:nvPr/>
+        </p:nvSpPr>
+        <p:spPr>
+          <a:xfrm>
+            <a:off x="2507189" y="2294773"/>
+            <a:ext cx="1223404" cy="604237"/>
+          </a:xfrm>
+          <a:prstGeom prst="roundRect">
+            <a:avLst/>
+          </a:prstGeom>
+        </p:spPr>
+        <p:style>
+          <a:lnRef idx="1">
+            <a:schemeClr val="accent1"/>
+          </a:lnRef>
+          <a:fillRef idx="2">
+            <a:schemeClr val="accent1"/>
+          </a:fillRef>
+          <a:effectRef idx="1">
+            <a:schemeClr val="accent1"/>
+          </a:effectRef>
+          <a:fontRef idx="minor">
+            <a:schemeClr val="dk1"/>
+          </a:fontRef>
+        </p:style>
+        <p:txBody>
+          <a:bodyPr rtlCol="0" anchor="ctr"/>
+          <a:lstStyle/>
+          <a:p>
+            <a:pPr algn="ctr"/>
+            <a:r>
+              <a:rPr kumimoji="1" lang="en-US" altLang="ja-JP" sz="1400" dirty="0"/>
+              <a:t>Semantic</a:t>
+            </a:r>
+            <a:br>
+              <a:rPr kumimoji="1" lang="en-US" altLang="ja-JP" sz="1400" dirty="0"/>
+            </a:br>
+            <a:r>
+              <a:rPr kumimoji="1" lang="en-US" altLang="ja-JP" sz="1400" dirty="0"/>
+              <a:t>Kernel</a:t>
+            </a:r>
+            <a:endParaRPr kumimoji="1" lang="ja-JP" altLang="en-US" sz="1400" dirty="0"/>
+          </a:p>
+        </p:txBody>
+      </p:sp>
+      <p:sp>
+        <p:nvSpPr>
+          <p:cNvPr id="16" name="四角形: メモ 15">
+            <a:extLst>
+              <a:ext uri="{FF2B5EF4-FFF2-40B4-BE49-F238E27FC236}">
+                <a16:creationId xmlns:a16="http://schemas.microsoft.com/office/drawing/2014/main" id="{3FC62654-14AC-3FA5-2797-28C61ECBF687}"/>
+              </a:ext>
+            </a:extLst>
+          </p:cNvPr>
+          <p:cNvSpPr/>
+          <p:nvPr/>
+        </p:nvSpPr>
+        <p:spPr>
+          <a:xfrm>
+            <a:off x="1362762" y="2183223"/>
+            <a:ext cx="755703" cy="755703"/>
+          </a:xfrm>
+          <a:prstGeom prst="foldedCorner">
+            <a:avLst/>
+          </a:prstGeom>
+          <a:ln>
+            <a:headEnd type="none" w="med" len="med"/>
+            <a:tailEnd type="none" w="med" len="med"/>
+          </a:ln>
+        </p:spPr>
+        <p:style>
+          <a:lnRef idx="1">
+            <a:schemeClr val="accent1"/>
+          </a:lnRef>
+          <a:fillRef idx="2">
+            <a:schemeClr val="accent1"/>
+          </a:fillRef>
+          <a:effectRef idx="1">
+            <a:schemeClr val="accent1"/>
+          </a:effectRef>
+          <a:fontRef idx="minor">
+            <a:schemeClr val="dk1"/>
+          </a:fontRef>
+        </p:style>
+        <p:txBody>
+          <a:bodyPr wrap="none" rtlCol="0" anchor="ctr"/>
+          <a:lstStyle/>
+          <a:p>
+            <a:pPr algn="ctr"/>
+            <a:r>
+              <a:rPr lang="en-US" altLang="ja-JP" sz="1200" dirty="0"/>
+              <a:t>Code</a:t>
+            </a:r>
+            <a:endParaRPr kumimoji="1" lang="en-US" altLang="ja-JP" sz="1200" dirty="0">
+              <a:solidFill>
+                <a:schemeClr val="dk1"/>
+              </a:solidFill>
+            </a:endParaRPr>
+          </a:p>
+        </p:txBody>
+      </p:sp>
+      <p:cxnSp>
+        <p:nvCxnSpPr>
+          <p:cNvPr id="19" name="直線矢印コネクタ 18">
+            <a:extLst>
+              <a:ext uri="{FF2B5EF4-FFF2-40B4-BE49-F238E27FC236}">
+                <a16:creationId xmlns:a16="http://schemas.microsoft.com/office/drawing/2014/main" id="{45AE9755-FB76-12D0-1EC6-10E8393880FA}"/>
+              </a:ext>
+            </a:extLst>
+          </p:cNvPr>
+          <p:cNvCxnSpPr>
+            <a:cxnSpLocks/>
+          </p:cNvCxnSpPr>
+          <p:nvPr/>
+        </p:nvCxnSpPr>
+        <p:spPr>
+          <a:xfrm>
+            <a:off x="2052843" y="2635089"/>
+            <a:ext cx="572070" cy="181"/>
+          </a:xfrm>
+          <a:prstGeom prst="straightConnector1">
+            <a:avLst/>
+          </a:prstGeom>
+          <a:ln w="28575">
+            <a:solidFill>
+              <a:schemeClr val="accent1"/>
+            </a:solidFill>
+            <a:prstDash val="dash"/>
+            <a:headEnd type="none" w="med" len="med"/>
+            <a:tailEnd type="arrow" w="med" len="med"/>
+          </a:ln>
+        </p:spPr>
+        <p:style>
+          <a:lnRef idx="1">
+            <a:schemeClr val="accent1"/>
+          </a:lnRef>
+          <a:fillRef idx="0">
+            <a:schemeClr val="accent1"/>
+          </a:fillRef>
+          <a:effectRef idx="0">
+            <a:schemeClr val="accent1"/>
+          </a:effectRef>
+          <a:fontRef idx="minor">
+            <a:schemeClr val="tx1"/>
+          </a:fontRef>
+        </p:style>
+      </p:cxnSp>
+      <p:sp>
+        <p:nvSpPr>
+          <p:cNvPr id="11" name="四角形: メモ 10">
+            <a:extLst>
+              <a:ext uri="{FF2B5EF4-FFF2-40B4-BE49-F238E27FC236}">
+                <a16:creationId xmlns:a16="http://schemas.microsoft.com/office/drawing/2014/main" id="{06009A80-6096-500D-6865-C2E92F07F036}"/>
+              </a:ext>
+            </a:extLst>
+          </p:cNvPr>
+          <p:cNvSpPr/>
+          <p:nvPr/>
+        </p:nvSpPr>
+        <p:spPr>
+          <a:xfrm>
+            <a:off x="5261752" y="3051148"/>
+            <a:ext cx="755703" cy="755703"/>
+          </a:xfrm>
+          <a:prstGeom prst="foldedCorner">
+            <a:avLst/>
+          </a:prstGeom>
+          <a:ln>
+            <a:headEnd type="none" w="med" len="med"/>
+            <a:tailEnd type="none" w="med" len="med"/>
+          </a:ln>
+        </p:spPr>
+        <p:style>
+          <a:lnRef idx="1">
+            <a:schemeClr val="accent6"/>
+          </a:lnRef>
+          <a:fillRef idx="2">
+            <a:schemeClr val="accent6"/>
+          </a:fillRef>
+          <a:effectRef idx="1">
+            <a:schemeClr val="accent6"/>
+          </a:effectRef>
+          <a:fontRef idx="minor">
+            <a:schemeClr val="dk1"/>
+          </a:fontRef>
+        </p:style>
+        <p:txBody>
+          <a:bodyPr wrap="none" rtlCol="0" anchor="ctr"/>
+          <a:lstStyle/>
+          <a:p>
+            <a:pPr algn="ctr"/>
+            <a:r>
+              <a:rPr kumimoji="1" lang="en-US" altLang="ja-JP" sz="1200" dirty="0">
+                <a:solidFill>
+                  <a:schemeClr val="dk1"/>
+                </a:solidFill>
+              </a:rPr>
+              <a:t>Instruct</a:t>
+            </a:r>
+          </a:p>
+        </p:txBody>
+      </p:sp>
+      <p:pic>
+        <p:nvPicPr>
+          <p:cNvPr id="18" name="Picture 2" descr="Using Azure Search for vector search with Azure OpenAI and LangChain ·  Clemens Siebler's Blog">
+            <a:extLst>
+              <a:ext uri="{FF2B5EF4-FFF2-40B4-BE49-F238E27FC236}">
+                <a16:creationId xmlns:a16="http://schemas.microsoft.com/office/drawing/2014/main" id="{6AEC5FFE-4756-EEB6-32CA-12C56FDC709D}"/>
+              </a:ext>
+            </a:extLst>
+          </p:cNvPr>
+          <p:cNvPicPr>
+            <a:picLocks noChangeAspect="1" noChangeArrowheads="1"/>
+          </p:cNvPicPr>
+          <p:nvPr/>
+        </p:nvPicPr>
+        <p:blipFill rotWithShape="1">
+          <a:blip r:embed="rId3">
+            <a:clrChange>
+              <a:clrFrom>
+                <a:srgbClr val="FFFFFF"/>
+              </a:clrFrom>
+              <a:clrTo>
+                <a:srgbClr val="FFFFFF">
+                  <a:alpha val="0"/>
+                </a:srgbClr>
+              </a:clrTo>
+            </a:clrChange>
+            <a:extLst>
+              <a:ext uri="{28A0092B-C50C-407E-A947-70E740481C1C}">
+                <a14:useLocalDpi xmlns:a14="http://schemas.microsoft.com/office/drawing/2010/main"/>
+              </a:ext>
+            </a:extLst>
+          </a:blip>
+          <a:srcRect/>
+          <a:stretch/>
+        </p:blipFill>
+        <p:spPr bwMode="auto">
+          <a:xfrm>
+            <a:off x="9196492" y="3304760"/>
+            <a:ext cx="647531" cy="489772"/>
+          </a:xfrm>
+          <a:prstGeom prst="rect">
+            <a:avLst/>
+          </a:prstGeom>
+          <a:noFill/>
+          <a:extLst>
+            <a:ext uri="{909E8E84-426E-40DD-AFC4-6F175D3DCCD1}">
+              <a14:hiddenFill xmlns:a14="http://schemas.microsoft.com/office/drawing/2010/main">
+                <a:solidFill>
+                  <a:srgbClr val="FFFFFF"/>
+                </a:solidFill>
+              </a14:hiddenFill>
+            </a:ext>
+          </a:extLst>
+        </p:spPr>
+      </p:pic>
+      <p:sp>
+        <p:nvSpPr>
+          <p:cNvPr id="20" name="テキスト ボックス 19">
+            <a:extLst>
+              <a:ext uri="{FF2B5EF4-FFF2-40B4-BE49-F238E27FC236}">
+                <a16:creationId xmlns:a16="http://schemas.microsoft.com/office/drawing/2014/main" id="{22E6D9BE-22DD-007E-649E-A05843C72312}"/>
+              </a:ext>
+            </a:extLst>
+          </p:cNvPr>
+          <p:cNvSpPr txBox="1"/>
+          <p:nvPr/>
+        </p:nvSpPr>
+        <p:spPr>
+          <a:xfrm>
+            <a:off x="8793669" y="3816911"/>
+            <a:ext cx="1443024" cy="369332"/>
+          </a:xfrm>
+          <a:prstGeom prst="rect">
+            <a:avLst/>
+          </a:prstGeom>
+          <a:noFill/>
+        </p:spPr>
+        <p:txBody>
+          <a:bodyPr wrap="none" rtlCol="0">
+            <a:spAutoFit/>
+          </a:bodyPr>
+          <a:lstStyle/>
+          <a:p>
+            <a:r>
+              <a:rPr lang="en-US" altLang="ja-JP" dirty="0"/>
+              <a:t>g</a:t>
+            </a:r>
+            <a:r>
+              <a:rPr kumimoji="1" lang="en-US" altLang="ja-JP" dirty="0"/>
+              <a:t>pt-4o-mini</a:t>
+            </a:r>
+            <a:endParaRPr kumimoji="1" lang="ja-JP" altLang="en-US" dirty="0"/>
+          </a:p>
+        </p:txBody>
+      </p:sp>
+      <p:pic>
+        <p:nvPicPr>
+          <p:cNvPr id="22" name="Graphic 54" descr="ソリッドフィル付きロボット">
+            <a:extLst>
+              <a:ext uri="{FF2B5EF4-FFF2-40B4-BE49-F238E27FC236}">
+                <a16:creationId xmlns:a16="http://schemas.microsoft.com/office/drawing/2014/main" id="{51FD18BB-B2C4-95AF-0A50-D65C31184AE1}"/>
+              </a:ext>
+            </a:extLst>
+          </p:cNvPr>
+          <p:cNvPicPr>
+            <a:picLocks noChangeAspect="1"/>
+          </p:cNvPicPr>
+          <p:nvPr/>
+        </p:nvPicPr>
+        <p:blipFill>
+          <a:blip r:embed="rId4">
+            <a:extLst>
+              <a:ext uri="{96DAC541-7B7A-43D3-8B79-37D633B846F1}">
+                <asvg:svgBlip xmlns:asvg="http://schemas.microsoft.com/office/drawing/2016/SVG/main" r:embed="rId5"/>
+              </a:ext>
+            </a:extLst>
+          </a:blip>
+          <a:stretch>
+            <a:fillRect/>
+          </a:stretch>
+        </p:blipFill>
+        <p:spPr>
+          <a:xfrm>
+            <a:off x="4616334" y="3151936"/>
+            <a:ext cx="718873" cy="718873"/>
+          </a:xfrm>
+          <a:prstGeom prst="rect">
+            <a:avLst/>
+          </a:prstGeom>
+        </p:spPr>
+      </p:pic>
+      <p:cxnSp>
+        <p:nvCxnSpPr>
+          <p:cNvPr id="26" name="直線矢印コネクタ 25">
+            <a:extLst>
+              <a:ext uri="{FF2B5EF4-FFF2-40B4-BE49-F238E27FC236}">
+                <a16:creationId xmlns:a16="http://schemas.microsoft.com/office/drawing/2014/main" id="{308C3E25-7762-4DEC-F10D-FC2A2F754B7D}"/>
+              </a:ext>
+            </a:extLst>
+          </p:cNvPr>
+          <p:cNvCxnSpPr>
+            <a:cxnSpLocks/>
+          </p:cNvCxnSpPr>
+          <p:nvPr/>
+        </p:nvCxnSpPr>
+        <p:spPr>
+          <a:xfrm>
+            <a:off x="3871972" y="2788571"/>
+            <a:ext cx="841741" cy="363090"/>
+          </a:xfrm>
+          <a:prstGeom prst="straightConnector1">
+            <a:avLst/>
+          </a:prstGeom>
+          <a:ln w="28575">
+            <a:solidFill>
+              <a:schemeClr val="accent1"/>
+            </a:solidFill>
+            <a:headEnd type="none" w="med" len="med"/>
+            <a:tailEnd type="arrow" w="med" len="med"/>
+          </a:ln>
+        </p:spPr>
+        <p:style>
+          <a:lnRef idx="1">
+            <a:schemeClr val="accent1"/>
+          </a:lnRef>
+          <a:fillRef idx="0">
+            <a:schemeClr val="accent1"/>
+          </a:fillRef>
+          <a:effectRef idx="0">
+            <a:schemeClr val="accent1"/>
+          </a:effectRef>
+          <a:fontRef idx="minor">
+            <a:schemeClr val="tx1"/>
+          </a:fontRef>
+        </p:style>
+      </p:cxnSp>
+      <p:sp>
+        <p:nvSpPr>
+          <p:cNvPr id="24" name="テキスト ボックス 23">
+            <a:extLst>
+              <a:ext uri="{FF2B5EF4-FFF2-40B4-BE49-F238E27FC236}">
+                <a16:creationId xmlns:a16="http://schemas.microsoft.com/office/drawing/2014/main" id="{FA7DAD6D-8536-F8D5-6C56-90C75E8DCC2D}"/>
+              </a:ext>
+            </a:extLst>
+          </p:cNvPr>
+          <p:cNvSpPr txBox="1"/>
+          <p:nvPr/>
+        </p:nvSpPr>
+        <p:spPr>
+          <a:xfrm>
+            <a:off x="4418394" y="3849906"/>
+            <a:ext cx="1980029" cy="307777"/>
+          </a:xfrm>
+          <a:prstGeom prst="rect">
+            <a:avLst/>
+          </a:prstGeom>
+          <a:noFill/>
+        </p:spPr>
+        <p:txBody>
+          <a:bodyPr wrap="none" rtlCol="0">
+            <a:spAutoFit/>
+          </a:bodyPr>
+          <a:lstStyle/>
+          <a:p>
+            <a:r>
+              <a:rPr lang="ja-JP" altLang="en-US" sz="1400" dirty="0"/>
+              <a:t>服装コーディネーター</a:t>
+            </a:r>
+            <a:endParaRPr kumimoji="1" lang="ja-JP" altLang="en-US" sz="1400" dirty="0"/>
+          </a:p>
+        </p:txBody>
+      </p:sp>
+      <p:cxnSp>
+        <p:nvCxnSpPr>
+          <p:cNvPr id="25" name="直線矢印コネクタ 24">
+            <a:extLst>
+              <a:ext uri="{FF2B5EF4-FFF2-40B4-BE49-F238E27FC236}">
+                <a16:creationId xmlns:a16="http://schemas.microsoft.com/office/drawing/2014/main" id="{CC9627DD-3297-4807-62C3-A539E44797C7}"/>
+              </a:ext>
+            </a:extLst>
+          </p:cNvPr>
+          <p:cNvCxnSpPr>
+            <a:cxnSpLocks/>
+          </p:cNvCxnSpPr>
+          <p:nvPr/>
+        </p:nvCxnSpPr>
+        <p:spPr>
+          <a:xfrm>
+            <a:off x="6134974" y="3577093"/>
+            <a:ext cx="2943999" cy="0"/>
+          </a:xfrm>
+          <a:prstGeom prst="straightConnector1">
+            <a:avLst/>
+          </a:prstGeom>
+          <a:ln w="28575">
+            <a:solidFill>
+              <a:schemeClr val="accent1"/>
+            </a:solidFill>
+            <a:headEnd type="none" w="med" len="med"/>
+            <a:tailEnd type="arrow" w="med" len="med"/>
+          </a:ln>
+        </p:spPr>
+        <p:style>
+          <a:lnRef idx="1">
+            <a:schemeClr val="accent1"/>
+          </a:lnRef>
+          <a:fillRef idx="0">
+            <a:schemeClr val="accent1"/>
+          </a:fillRef>
+          <a:effectRef idx="0">
+            <a:schemeClr val="accent1"/>
+          </a:effectRef>
+          <a:fontRef idx="minor">
+            <a:schemeClr val="tx1"/>
+          </a:fontRef>
+        </p:style>
+      </p:cxnSp>
+      <p:pic>
+        <p:nvPicPr>
+          <p:cNvPr id="27" name="図 26">
+            <a:extLst>
+              <a:ext uri="{FF2B5EF4-FFF2-40B4-BE49-F238E27FC236}">
+                <a16:creationId xmlns:a16="http://schemas.microsoft.com/office/drawing/2014/main" id="{1FADF21C-DD64-624B-BB39-8D1942E2CD5A}"/>
+              </a:ext>
+            </a:extLst>
+          </p:cNvPr>
+          <p:cNvPicPr>
+            <a:picLocks noChangeAspect="1"/>
+          </p:cNvPicPr>
+          <p:nvPr/>
+        </p:nvPicPr>
+        <p:blipFill>
+          <a:blip r:embed="rId6">
+            <a:extLst>
+              <a:ext uri="{28A0092B-C50C-407E-A947-70E740481C1C}">
+                <a14:useLocalDpi xmlns:a14="http://schemas.microsoft.com/office/drawing/2010/main" val="0"/>
+              </a:ext>
+            </a:extLst>
+          </a:blip>
+          <a:stretch>
+            <a:fillRect/>
+          </a:stretch>
+        </p:blipFill>
+        <p:spPr>
+          <a:xfrm>
+            <a:off x="6942442" y="3225941"/>
+            <a:ext cx="644868" cy="644868"/>
+          </a:xfrm>
+          <a:prstGeom prst="rect">
+            <a:avLst/>
+          </a:prstGeom>
+        </p:spPr>
+      </p:pic>
+      <p:cxnSp>
+        <p:nvCxnSpPr>
+          <p:cNvPr id="6" name="直線矢印コネクタ 5">
+            <a:extLst>
+              <a:ext uri="{FF2B5EF4-FFF2-40B4-BE49-F238E27FC236}">
+                <a16:creationId xmlns:a16="http://schemas.microsoft.com/office/drawing/2014/main" id="{6E504DF4-D986-4DC0-231B-97D3ACF84DE6}"/>
+              </a:ext>
+            </a:extLst>
+          </p:cNvPr>
+          <p:cNvCxnSpPr>
+            <a:cxnSpLocks/>
+          </p:cNvCxnSpPr>
+          <p:nvPr/>
+        </p:nvCxnSpPr>
+        <p:spPr>
+          <a:xfrm flipV="1">
+            <a:off x="3834226" y="2129493"/>
+            <a:ext cx="841741" cy="363090"/>
+          </a:xfrm>
+          <a:prstGeom prst="straightConnector1">
+            <a:avLst/>
+          </a:prstGeom>
+          <a:ln w="28575">
+            <a:solidFill>
+              <a:schemeClr val="accent1"/>
+            </a:solidFill>
+            <a:headEnd type="none" w="med" len="med"/>
+            <a:tailEnd type="arrow" w="med" len="med"/>
+          </a:ln>
+        </p:spPr>
+        <p:style>
+          <a:lnRef idx="1">
+            <a:schemeClr val="accent1"/>
+          </a:lnRef>
+          <a:fillRef idx="0">
+            <a:schemeClr val="accent1"/>
+          </a:fillRef>
+          <a:effectRef idx="0">
+            <a:schemeClr val="accent1"/>
+          </a:effectRef>
+          <a:fontRef idx="minor">
+            <a:schemeClr val="tx1"/>
+          </a:fontRef>
+        </p:style>
+      </p:cxnSp>
+      <p:sp>
+        <p:nvSpPr>
+          <p:cNvPr id="7" name="四角形: 角を丸くする 6">
+            <a:extLst>
+              <a:ext uri="{FF2B5EF4-FFF2-40B4-BE49-F238E27FC236}">
+                <a16:creationId xmlns:a16="http://schemas.microsoft.com/office/drawing/2014/main" id="{7E8EBF37-4273-3602-9B7A-75D2B7F9DAF4}"/>
+              </a:ext>
+            </a:extLst>
+          </p:cNvPr>
+          <p:cNvSpPr/>
+          <p:nvPr/>
+        </p:nvSpPr>
+        <p:spPr>
+          <a:xfrm>
+            <a:off x="4799213" y="1820405"/>
+            <a:ext cx="1223404" cy="604237"/>
+          </a:xfrm>
+          <a:prstGeom prst="roundRect">
+            <a:avLst/>
+          </a:prstGeom>
+        </p:spPr>
+        <p:style>
+          <a:lnRef idx="1">
+            <a:schemeClr val="accent1"/>
+          </a:lnRef>
+          <a:fillRef idx="2">
+            <a:schemeClr val="accent1"/>
+          </a:fillRef>
+          <a:effectRef idx="1">
+            <a:schemeClr val="accent1"/>
+          </a:effectRef>
+          <a:fontRef idx="minor">
+            <a:schemeClr val="dk1"/>
+          </a:fontRef>
+        </p:style>
+        <p:txBody>
+          <a:bodyPr rtlCol="0" anchor="ctr"/>
+          <a:lstStyle/>
+          <a:p>
+            <a:pPr algn="ctr"/>
+            <a:r>
+              <a:rPr kumimoji="1" lang="en-US" altLang="ja-JP" sz="1400" dirty="0"/>
+              <a:t>AI Foundry</a:t>
+            </a:r>
+            <a:br>
+              <a:rPr kumimoji="1" lang="en-US" altLang="ja-JP" sz="1400" dirty="0"/>
+            </a:br>
+            <a:r>
+              <a:rPr kumimoji="1" lang="en-US" altLang="ja-JP" sz="1400" dirty="0"/>
+              <a:t>SDK</a:t>
+            </a:r>
+            <a:endParaRPr kumimoji="1" lang="ja-JP" altLang="en-US" sz="1400" dirty="0"/>
+          </a:p>
+        </p:txBody>
+      </p:sp>
+      <p:sp>
+        <p:nvSpPr>
+          <p:cNvPr id="8" name="四角形: メモ 7">
+            <a:extLst>
+              <a:ext uri="{FF2B5EF4-FFF2-40B4-BE49-F238E27FC236}">
+                <a16:creationId xmlns:a16="http://schemas.microsoft.com/office/drawing/2014/main" id="{62F37C5D-6811-4BD3-F7BD-7269823C75B5}"/>
+              </a:ext>
+            </a:extLst>
+          </p:cNvPr>
+          <p:cNvSpPr/>
+          <p:nvPr/>
+        </p:nvSpPr>
+        <p:spPr>
+          <a:xfrm>
+            <a:off x="8282880" y="1441400"/>
+            <a:ext cx="755703" cy="755703"/>
+          </a:xfrm>
+          <a:prstGeom prst="foldedCorner">
+            <a:avLst/>
+          </a:prstGeom>
+          <a:ln>
+            <a:headEnd type="none" w="med" len="med"/>
+            <a:tailEnd type="none" w="med" len="med"/>
+          </a:ln>
+        </p:spPr>
+        <p:style>
+          <a:lnRef idx="1">
+            <a:schemeClr val="accent1"/>
+          </a:lnRef>
+          <a:fillRef idx="2">
+            <a:schemeClr val="accent1"/>
+          </a:fillRef>
+          <a:effectRef idx="1">
+            <a:schemeClr val="accent1"/>
+          </a:effectRef>
+          <a:fontRef idx="minor">
+            <a:schemeClr val="dk1"/>
+          </a:fontRef>
+        </p:style>
+        <p:txBody>
+          <a:bodyPr wrap="none" rtlCol="0" anchor="ctr"/>
+          <a:lstStyle/>
+          <a:p>
+            <a:pPr algn="ctr"/>
+            <a:r>
+              <a:rPr kumimoji="1" lang="en-US" altLang="ja-JP" sz="1200" dirty="0">
+                <a:solidFill>
+                  <a:schemeClr val="dk1"/>
+                </a:solidFill>
+              </a:rPr>
+              <a:t>Instruct</a:t>
+            </a:r>
+          </a:p>
+        </p:txBody>
+      </p:sp>
+      <p:sp>
+        <p:nvSpPr>
+          <p:cNvPr id="9" name="四角形: 角を丸くする 8">
+            <a:extLst>
+              <a:ext uri="{FF2B5EF4-FFF2-40B4-BE49-F238E27FC236}">
+                <a16:creationId xmlns:a16="http://schemas.microsoft.com/office/drawing/2014/main" id="{DA8A4A67-9B97-D6B9-3C82-9FF5C00A8B84}"/>
+              </a:ext>
+            </a:extLst>
+          </p:cNvPr>
+          <p:cNvSpPr/>
+          <p:nvPr/>
+        </p:nvSpPr>
+        <p:spPr>
+          <a:xfrm>
+            <a:off x="7823191" y="1067546"/>
+            <a:ext cx="3997303" cy="1633308"/>
+          </a:xfrm>
+          <a:prstGeom prst="roundRect">
+            <a:avLst>
+              <a:gd name="adj" fmla="val 7301"/>
+            </a:avLst>
+          </a:prstGeom>
+          <a:noFill/>
+          <a:ln>
+            <a:solidFill>
+              <a:schemeClr val="accent1"/>
+            </a:solidFill>
+          </a:ln>
+        </p:spPr>
+        <p:style>
+          <a:lnRef idx="2">
+            <a:schemeClr val="accent6"/>
+          </a:lnRef>
+          <a:fillRef idx="1">
+            <a:schemeClr val="lt1"/>
+          </a:fillRef>
+          <a:effectRef idx="0">
+            <a:schemeClr val="accent6"/>
+          </a:effectRef>
+          <a:fontRef idx="minor">
+            <a:schemeClr val="dk1"/>
+          </a:fontRef>
+        </p:style>
+        <p:txBody>
+          <a:bodyPr rtlCol="0" anchor="t"/>
+          <a:lstStyle/>
+          <a:p>
+            <a:r>
+              <a:rPr lang="ja-JP" altLang="en-US" sz="1400" dirty="0"/>
+              <a:t>お天気エージェント</a:t>
+            </a:r>
+            <a:endParaRPr kumimoji="1" lang="ja-JP" altLang="en-US" sz="1400" dirty="0"/>
+          </a:p>
+        </p:txBody>
+      </p:sp>
+      <p:pic>
+        <p:nvPicPr>
+          <p:cNvPr id="10" name="Picture 2" descr="Bingの評判を全7件のユーザーレビュー・口コミで紹介">
+            <a:extLst>
+              <a:ext uri="{FF2B5EF4-FFF2-40B4-BE49-F238E27FC236}">
+                <a16:creationId xmlns:a16="http://schemas.microsoft.com/office/drawing/2014/main" id="{FFDD9B7D-6C88-90D0-3DBE-6B1FBDC2E6EC}"/>
+              </a:ext>
+            </a:extLst>
+          </p:cNvPr>
+          <p:cNvPicPr>
+            <a:picLocks noChangeAspect="1" noChangeArrowheads="1"/>
+          </p:cNvPicPr>
+          <p:nvPr/>
+        </p:nvPicPr>
+        <p:blipFill>
+          <a:blip r:embed="rId7">
+            <a:clrChange>
+              <a:clrFrom>
+                <a:srgbClr val="FFFFFF"/>
+              </a:clrFrom>
+              <a:clrTo>
+                <a:srgbClr val="FFFFFF">
+                  <a:alpha val="0"/>
+                </a:srgbClr>
+              </a:clrTo>
+            </a:clrChange>
+            <a:extLst>
+              <a:ext uri="{28A0092B-C50C-407E-A947-70E740481C1C}">
+                <a14:useLocalDpi xmlns:a14="http://schemas.microsoft.com/office/drawing/2010/main" val="0"/>
+              </a:ext>
+            </a:extLst>
+          </a:blip>
+          <a:srcRect/>
+          <a:stretch>
+            <a:fillRect/>
+          </a:stretch>
+        </p:blipFill>
+        <p:spPr bwMode="auto">
+          <a:xfrm>
+            <a:off x="10343047" y="2033700"/>
+            <a:ext cx="1185151" cy="474061"/>
+          </a:xfrm>
+          <a:prstGeom prst="rect">
+            <a:avLst/>
+          </a:prstGeom>
+          <a:noFill/>
+          <a:extLst>
+            <a:ext uri="{909E8E84-426E-40DD-AFC4-6F175D3DCCD1}">
+              <a14:hiddenFill xmlns:a14="http://schemas.microsoft.com/office/drawing/2010/main">
+                <a:solidFill>
+                  <a:srgbClr val="FFFFFF"/>
+                </a:solidFill>
+              </a14:hiddenFill>
+            </a:ext>
+          </a:extLst>
+        </p:spPr>
+      </p:pic>
+      <p:pic>
+        <p:nvPicPr>
+          <p:cNvPr id="12" name="Picture 2" descr="Using Azure Search for vector search with Azure OpenAI and LangChain ·  Clemens Siebler's Blog">
+            <a:extLst>
+              <a:ext uri="{FF2B5EF4-FFF2-40B4-BE49-F238E27FC236}">
+                <a16:creationId xmlns:a16="http://schemas.microsoft.com/office/drawing/2014/main" id="{BAC03DD6-151C-2FFE-C191-BC3929DF4DC5}"/>
+              </a:ext>
+            </a:extLst>
+          </p:cNvPr>
+          <p:cNvPicPr>
+            <a:picLocks noChangeAspect="1" noChangeArrowheads="1"/>
+          </p:cNvPicPr>
+          <p:nvPr/>
+        </p:nvPicPr>
+        <p:blipFill rotWithShape="1">
+          <a:blip r:embed="rId3">
+            <a:clrChange>
+              <a:clrFrom>
+                <a:srgbClr val="FFFFFF"/>
+              </a:clrFrom>
+              <a:clrTo>
+                <a:srgbClr val="FFFFFF">
+                  <a:alpha val="0"/>
+                </a:srgbClr>
+              </a:clrTo>
+            </a:clrChange>
+            <a:extLst>
+              <a:ext uri="{28A0092B-C50C-407E-A947-70E740481C1C}">
+                <a14:useLocalDpi xmlns:a14="http://schemas.microsoft.com/office/drawing/2010/main"/>
+              </a:ext>
+            </a:extLst>
+          </a:blip>
+          <a:srcRect/>
+          <a:stretch/>
+        </p:blipFill>
+        <p:spPr bwMode="auto">
+          <a:xfrm>
+            <a:off x="10209222" y="1394411"/>
+            <a:ext cx="647531" cy="489772"/>
+          </a:xfrm>
+          <a:prstGeom prst="rect">
+            <a:avLst/>
+          </a:prstGeom>
+          <a:noFill/>
+          <a:extLst>
+            <a:ext uri="{909E8E84-426E-40DD-AFC4-6F175D3DCCD1}">
+              <a14:hiddenFill xmlns:a14="http://schemas.microsoft.com/office/drawing/2010/main">
+                <a:solidFill>
+                  <a:srgbClr val="FFFFFF"/>
+                </a:solidFill>
+              </a14:hiddenFill>
+            </a:ext>
+          </a:extLst>
+        </p:spPr>
+      </p:pic>
+      <p:sp>
+        <p:nvSpPr>
+          <p:cNvPr id="13" name="テキスト ボックス 12">
+            <a:extLst>
+              <a:ext uri="{FF2B5EF4-FFF2-40B4-BE49-F238E27FC236}">
+                <a16:creationId xmlns:a16="http://schemas.microsoft.com/office/drawing/2014/main" id="{3B7B740E-AFD0-3F40-D815-51F2167C6B71}"/>
+              </a:ext>
+            </a:extLst>
+          </p:cNvPr>
+          <p:cNvSpPr txBox="1"/>
+          <p:nvPr/>
+        </p:nvSpPr>
+        <p:spPr>
+          <a:xfrm>
+            <a:off x="10856753" y="1417867"/>
+            <a:ext cx="886781" cy="369332"/>
+          </a:xfrm>
+          <a:prstGeom prst="rect">
+            <a:avLst/>
+          </a:prstGeom>
+          <a:noFill/>
+        </p:spPr>
+        <p:txBody>
+          <a:bodyPr wrap="none" rtlCol="0">
+            <a:spAutoFit/>
+          </a:bodyPr>
+          <a:lstStyle/>
+          <a:p>
+            <a:r>
+              <a:rPr lang="en-US" altLang="ja-JP" dirty="0"/>
+              <a:t>g</a:t>
+            </a:r>
+            <a:r>
+              <a:rPr kumimoji="1" lang="en-US" altLang="ja-JP" dirty="0"/>
+              <a:t>pt-4o</a:t>
+            </a:r>
+            <a:endParaRPr kumimoji="1" lang="ja-JP" altLang="en-US" dirty="0"/>
+          </a:p>
+        </p:txBody>
+      </p:sp>
+      <p:cxnSp>
+        <p:nvCxnSpPr>
+          <p:cNvPr id="14" name="直線矢印コネクタ 13">
+            <a:extLst>
+              <a:ext uri="{FF2B5EF4-FFF2-40B4-BE49-F238E27FC236}">
+                <a16:creationId xmlns:a16="http://schemas.microsoft.com/office/drawing/2014/main" id="{555A828E-5936-FD0E-4947-AFD4B74BAB75}"/>
+              </a:ext>
+            </a:extLst>
+          </p:cNvPr>
+          <p:cNvCxnSpPr>
+            <a:cxnSpLocks/>
+          </p:cNvCxnSpPr>
+          <p:nvPr/>
+        </p:nvCxnSpPr>
+        <p:spPr>
+          <a:xfrm flipV="1">
+            <a:off x="9204349" y="1789036"/>
+            <a:ext cx="921326" cy="190294"/>
+          </a:xfrm>
+          <a:prstGeom prst="straightConnector1">
+            <a:avLst/>
+          </a:prstGeom>
+          <a:ln w="28575">
+            <a:solidFill>
+              <a:schemeClr val="accent1"/>
+            </a:solidFill>
+            <a:prstDash val="dash"/>
+            <a:headEnd type="none" w="med" len="med"/>
+            <a:tailEnd type="arrow" w="med" len="med"/>
+          </a:ln>
+        </p:spPr>
+        <p:style>
+          <a:lnRef idx="1">
+            <a:schemeClr val="accent1"/>
+          </a:lnRef>
+          <a:fillRef idx="0">
+            <a:schemeClr val="accent1"/>
+          </a:fillRef>
+          <a:effectRef idx="0">
+            <a:schemeClr val="accent1"/>
+          </a:effectRef>
+          <a:fontRef idx="minor">
+            <a:schemeClr val="tx1"/>
+          </a:fontRef>
+        </p:style>
+      </p:cxnSp>
+      <p:pic>
+        <p:nvPicPr>
+          <p:cNvPr id="17" name="Graphic 54" descr="ソリッドフィル付きロボット">
+            <a:extLst>
+              <a:ext uri="{FF2B5EF4-FFF2-40B4-BE49-F238E27FC236}">
+                <a16:creationId xmlns:a16="http://schemas.microsoft.com/office/drawing/2014/main" id="{C3BCA0F3-5CED-4055-4575-EB5E37C08813}"/>
+              </a:ext>
+            </a:extLst>
+          </p:cNvPr>
+          <p:cNvPicPr>
+            <a:picLocks noChangeAspect="1"/>
+          </p:cNvPicPr>
+          <p:nvPr/>
+        </p:nvPicPr>
+        <p:blipFill>
+          <a:blip r:embed="rId8">
+            <a:extLst>
+              <a:ext uri="{96DAC541-7B7A-43D3-8B79-37D633B846F1}">
+                <asvg:svgBlip xmlns:asvg="http://schemas.microsoft.com/office/drawing/2016/SVG/main" r:embed="rId9"/>
+              </a:ext>
+            </a:extLst>
+          </a:blip>
+          <a:stretch>
+            <a:fillRect/>
+          </a:stretch>
+        </p:blipFill>
+        <p:spPr>
+          <a:xfrm>
+            <a:off x="7844937" y="1729577"/>
+            <a:ext cx="718873" cy="718873"/>
+          </a:xfrm>
+          <a:prstGeom prst="rect">
+            <a:avLst/>
+          </a:prstGeom>
+        </p:spPr>
+      </p:pic>
+      <p:cxnSp>
+        <p:nvCxnSpPr>
+          <p:cNvPr id="21" name="直線矢印コネクタ 20">
+            <a:extLst>
+              <a:ext uri="{FF2B5EF4-FFF2-40B4-BE49-F238E27FC236}">
+                <a16:creationId xmlns:a16="http://schemas.microsoft.com/office/drawing/2014/main" id="{5AA7A1FA-B88C-1A36-6811-51AEA394B164}"/>
+              </a:ext>
+            </a:extLst>
+          </p:cNvPr>
+          <p:cNvCxnSpPr>
+            <a:cxnSpLocks/>
+          </p:cNvCxnSpPr>
+          <p:nvPr/>
+        </p:nvCxnSpPr>
+        <p:spPr>
+          <a:xfrm>
+            <a:off x="9211921" y="2098101"/>
+            <a:ext cx="921326" cy="190294"/>
+          </a:xfrm>
+          <a:prstGeom prst="straightConnector1">
+            <a:avLst/>
+          </a:prstGeom>
+          <a:ln w="28575">
+            <a:solidFill>
+              <a:schemeClr val="accent1"/>
+            </a:solidFill>
+            <a:prstDash val="dash"/>
+            <a:headEnd type="none" w="med" len="med"/>
+            <a:tailEnd type="arrow" w="med" len="med"/>
+          </a:ln>
+        </p:spPr>
+        <p:style>
+          <a:lnRef idx="1">
+            <a:schemeClr val="accent1"/>
+          </a:lnRef>
+          <a:fillRef idx="0">
+            <a:schemeClr val="accent1"/>
+          </a:fillRef>
+          <a:effectRef idx="0">
+            <a:schemeClr val="accent1"/>
+          </a:effectRef>
+          <a:fontRef idx="minor">
+            <a:schemeClr val="tx1"/>
+          </a:fontRef>
+        </p:style>
+      </p:cxnSp>
+      <p:cxnSp>
+        <p:nvCxnSpPr>
+          <p:cNvPr id="23" name="直線矢印コネクタ 22">
+            <a:extLst>
+              <a:ext uri="{FF2B5EF4-FFF2-40B4-BE49-F238E27FC236}">
+                <a16:creationId xmlns:a16="http://schemas.microsoft.com/office/drawing/2014/main" id="{E5ABE927-8034-612D-49AA-8E9C3760D483}"/>
+              </a:ext>
+            </a:extLst>
+          </p:cNvPr>
+          <p:cNvCxnSpPr>
+            <a:cxnSpLocks/>
+          </p:cNvCxnSpPr>
+          <p:nvPr/>
+        </p:nvCxnSpPr>
+        <p:spPr>
+          <a:xfrm>
+            <a:off x="6139941" y="2119405"/>
+            <a:ext cx="1827992" cy="0"/>
+          </a:xfrm>
+          <a:prstGeom prst="straightConnector1">
+            <a:avLst/>
+          </a:prstGeom>
+          <a:ln w="28575">
+            <a:solidFill>
+              <a:schemeClr val="accent1"/>
+            </a:solidFill>
+            <a:headEnd type="none" w="med" len="med"/>
+            <a:tailEnd type="arrow" w="med" len="med"/>
+          </a:ln>
+        </p:spPr>
+        <p:style>
+          <a:lnRef idx="1">
+            <a:schemeClr val="accent1"/>
+          </a:lnRef>
+          <a:fillRef idx="0">
+            <a:schemeClr val="accent1"/>
+          </a:fillRef>
+          <a:effectRef idx="0">
+            <a:schemeClr val="accent1"/>
+          </a:effectRef>
+          <a:fontRef idx="minor">
+            <a:schemeClr val="tx1"/>
+          </a:fontRef>
+        </p:style>
+      </p:cxnSp>
+      <p:pic>
+        <p:nvPicPr>
+          <p:cNvPr id="28" name="図 27">
+            <a:extLst>
+              <a:ext uri="{FF2B5EF4-FFF2-40B4-BE49-F238E27FC236}">
+                <a16:creationId xmlns:a16="http://schemas.microsoft.com/office/drawing/2014/main" id="{2030C7F4-C6C9-2DCF-2440-9F81BB40E15B}"/>
+              </a:ext>
+            </a:extLst>
+          </p:cNvPr>
+          <p:cNvPicPr>
+            <a:picLocks noChangeAspect="1"/>
+          </p:cNvPicPr>
+          <p:nvPr/>
+        </p:nvPicPr>
+        <p:blipFill>
+          <a:blip r:embed="rId6">
+            <a:extLst>
+              <a:ext uri="{28A0092B-C50C-407E-A947-70E740481C1C}">
+                <a14:useLocalDpi xmlns:a14="http://schemas.microsoft.com/office/drawing/2010/main" val="0"/>
+              </a:ext>
+            </a:extLst>
+          </a:blip>
+          <a:stretch>
+            <a:fillRect/>
+          </a:stretch>
+        </p:blipFill>
+        <p:spPr>
+          <a:xfrm>
+            <a:off x="6845016" y="1729577"/>
+            <a:ext cx="644868" cy="644868"/>
+          </a:xfrm>
+          <a:prstGeom prst="rect">
+            <a:avLst/>
+          </a:prstGeom>
+        </p:spPr>
+      </p:pic>
+      <p:pic>
+        <p:nvPicPr>
+          <p:cNvPr id="29" name="Graphic 54" descr="ソリッドフィル付きロボット">
+            <a:extLst>
+              <a:ext uri="{FF2B5EF4-FFF2-40B4-BE49-F238E27FC236}">
+                <a16:creationId xmlns:a16="http://schemas.microsoft.com/office/drawing/2014/main" id="{3E2879F2-F622-C1E9-6AC2-AEC6FB493367}"/>
+              </a:ext>
+            </a:extLst>
+          </p:cNvPr>
+          <p:cNvPicPr>
+            <a:picLocks noChangeAspect="1"/>
+          </p:cNvPicPr>
+          <p:nvPr/>
+        </p:nvPicPr>
+        <p:blipFill>
+          <a:blip r:embed="rId10">
+            <a:extLst>
+              <a:ext uri="{96DAC541-7B7A-43D3-8B79-37D633B846F1}">
+                <asvg:svgBlip xmlns:asvg="http://schemas.microsoft.com/office/drawing/2016/SVG/main" r:embed="rId11"/>
+              </a:ext>
+            </a:extLst>
+          </a:blip>
+          <a:stretch>
+            <a:fillRect/>
+          </a:stretch>
+        </p:blipFill>
+        <p:spPr>
+          <a:xfrm>
+            <a:off x="4495315" y="2023233"/>
+            <a:ext cx="718873" cy="718873"/>
+          </a:xfrm>
+          <a:prstGeom prst="rect">
+            <a:avLst/>
+          </a:prstGeom>
+        </p:spPr>
+      </p:pic>
+    </p:spTree>
+    <p:extLst>
+      <p:ext uri="{BB962C8B-B14F-4D97-AF65-F5344CB8AC3E}">
+        <p14:creationId xmlns:p14="http://schemas.microsoft.com/office/powerpoint/2010/main" val="3872464963"/>
       </p:ext>
     </p:extLst>
   </p:cSld>

</xml_diff>

<commit_message>
add new architecture images and update documentation (#92)
* add new architecture images and update documentation

* fix typo

* refine Japanese text for clarity and readability in index.md
</commit_message>
<xml_diff>
--- a/azureaiagent-with-semantickernel/images/figures.pptx
+++ b/azureaiagent-with-semantickernel/images/figures.pptx
@@ -6,6 +6,10 @@
   </p:sldMasterIdLst>
   <p:sldIdLst>
     <p:sldId id="256" r:id="rId2"/>
+    <p:sldId id="257" r:id="rId3"/>
+    <p:sldId id="258" r:id="rId4"/>
+    <p:sldId id="259" r:id="rId5"/>
+    <p:sldId id="260" r:id="rId6"/>
   </p:sldIdLst>
   <p:sldSz cx="12192000" cy="6858000"/>
   <p:notesSz cx="6858000" cy="9144000"/>
@@ -104,6 +108,11 @@
       </a:defRPr>
     </a:lvl9pPr>
   </p:defaultTextStyle>
+  <p:extLst>
+    <p:ext uri="{EFAFB233-063F-42B5-8137-9DF3F51BA10A}">
+      <p15:sldGuideLst xmlns:p15="http://schemas.microsoft.com/office/powerpoint/2012/main"/>
+    </p:ext>
+  </p:extLst>
 </p:presentation>
 </file>
 
@@ -254,7 +263,7 @@
           <a:p>
             <a:fld id="{6EEB1EBD-88AC-4466-A821-C2BE9B33574F}" type="datetimeFigureOut">
               <a:rPr kumimoji="1" lang="ja-JP" altLang="en-US" smtClean="0"/>
-              <a:t>2025/2/14</a:t>
+              <a:t>2025/2/21</a:t>
             </a:fld>
             <a:endParaRPr kumimoji="1" lang="ja-JP" altLang="en-US"/>
           </a:p>
@@ -484,7 +493,7 @@
           <a:p>
             <a:fld id="{6EEB1EBD-88AC-4466-A821-C2BE9B33574F}" type="datetimeFigureOut">
               <a:rPr kumimoji="1" lang="ja-JP" altLang="en-US" smtClean="0"/>
-              <a:t>2025/2/14</a:t>
+              <a:t>2025/2/21</a:t>
             </a:fld>
             <a:endParaRPr kumimoji="1" lang="ja-JP" altLang="en-US"/>
           </a:p>
@@ -724,7 +733,7 @@
           <a:p>
             <a:fld id="{6EEB1EBD-88AC-4466-A821-C2BE9B33574F}" type="datetimeFigureOut">
               <a:rPr kumimoji="1" lang="ja-JP" altLang="en-US" smtClean="0"/>
-              <a:t>2025/2/14</a:t>
+              <a:t>2025/2/21</a:t>
             </a:fld>
             <a:endParaRPr kumimoji="1" lang="ja-JP" altLang="en-US"/>
           </a:p>
@@ -954,7 +963,7 @@
           <a:p>
             <a:fld id="{6EEB1EBD-88AC-4466-A821-C2BE9B33574F}" type="datetimeFigureOut">
               <a:rPr kumimoji="1" lang="ja-JP" altLang="en-US" smtClean="0"/>
-              <a:t>2025/2/14</a:t>
+              <a:t>2025/2/21</a:t>
             </a:fld>
             <a:endParaRPr kumimoji="1" lang="ja-JP" altLang="en-US"/>
           </a:p>
@@ -1229,7 +1238,7 @@
           <a:p>
             <a:fld id="{6EEB1EBD-88AC-4466-A821-C2BE9B33574F}" type="datetimeFigureOut">
               <a:rPr kumimoji="1" lang="ja-JP" altLang="en-US" smtClean="0"/>
-              <a:t>2025/2/14</a:t>
+              <a:t>2025/2/21</a:t>
             </a:fld>
             <a:endParaRPr kumimoji="1" lang="ja-JP" altLang="en-US"/>
           </a:p>
@@ -1558,7 +1567,7 @@
           <a:p>
             <a:fld id="{6EEB1EBD-88AC-4466-A821-C2BE9B33574F}" type="datetimeFigureOut">
               <a:rPr kumimoji="1" lang="ja-JP" altLang="en-US" smtClean="0"/>
-              <a:t>2025/2/14</a:t>
+              <a:t>2025/2/21</a:t>
             </a:fld>
             <a:endParaRPr kumimoji="1" lang="ja-JP" altLang="en-US"/>
           </a:p>
@@ -2034,7 +2043,7 @@
           <a:p>
             <a:fld id="{6EEB1EBD-88AC-4466-A821-C2BE9B33574F}" type="datetimeFigureOut">
               <a:rPr kumimoji="1" lang="ja-JP" altLang="en-US" smtClean="0"/>
-              <a:t>2025/2/14</a:t>
+              <a:t>2025/2/21</a:t>
             </a:fld>
             <a:endParaRPr kumimoji="1" lang="ja-JP" altLang="en-US"/>
           </a:p>
@@ -2175,7 +2184,7 @@
           <a:p>
             <a:fld id="{6EEB1EBD-88AC-4466-A821-C2BE9B33574F}" type="datetimeFigureOut">
               <a:rPr kumimoji="1" lang="ja-JP" altLang="en-US" smtClean="0"/>
-              <a:t>2025/2/14</a:t>
+              <a:t>2025/2/21</a:t>
             </a:fld>
             <a:endParaRPr kumimoji="1" lang="ja-JP" altLang="en-US"/>
           </a:p>
@@ -2288,7 +2297,7 @@
           <a:p>
             <a:fld id="{6EEB1EBD-88AC-4466-A821-C2BE9B33574F}" type="datetimeFigureOut">
               <a:rPr kumimoji="1" lang="ja-JP" altLang="en-US" smtClean="0"/>
-              <a:t>2025/2/14</a:t>
+              <a:t>2025/2/21</a:t>
             </a:fld>
             <a:endParaRPr kumimoji="1" lang="ja-JP" altLang="en-US"/>
           </a:p>
@@ -2631,7 +2640,7 @@
           <a:p>
             <a:fld id="{6EEB1EBD-88AC-4466-A821-C2BE9B33574F}" type="datetimeFigureOut">
               <a:rPr kumimoji="1" lang="ja-JP" altLang="en-US" smtClean="0"/>
-              <a:t>2025/2/14</a:t>
+              <a:t>2025/2/21</a:t>
             </a:fld>
             <a:endParaRPr kumimoji="1" lang="ja-JP" altLang="en-US"/>
           </a:p>
@@ -2919,7 +2928,7 @@
           <a:p>
             <a:fld id="{6EEB1EBD-88AC-4466-A821-C2BE9B33574F}" type="datetimeFigureOut">
               <a:rPr kumimoji="1" lang="ja-JP" altLang="en-US" smtClean="0"/>
-              <a:t>2025/2/14</a:t>
+              <a:t>2025/2/21</a:t>
             </a:fld>
             <a:endParaRPr kumimoji="1" lang="ja-JP" altLang="en-US"/>
           </a:p>
@@ -3192,7 +3201,7 @@
           <a:p>
             <a:fld id="{6EEB1EBD-88AC-4466-A821-C2BE9B33574F}" type="datetimeFigureOut">
               <a:rPr kumimoji="1" lang="ja-JP" altLang="en-US" smtClean="0"/>
-              <a:t>2025/2/14</a:t>
+              <a:t>2025/2/21</a:t>
             </a:fld>
             <a:endParaRPr kumimoji="1" lang="ja-JP" altLang="en-US"/>
           </a:p>
@@ -4766,6 +4775,3928 @@
     <p:extLst>
       <p:ext uri="{BB962C8B-B14F-4D97-AF65-F5344CB8AC3E}">
         <p14:creationId xmlns:p14="http://schemas.microsoft.com/office/powerpoint/2010/main" val="2587521437"/>
+      </p:ext>
+    </p:extLst>
+  </p:cSld>
+  <p:clrMapOvr>
+    <a:masterClrMapping/>
+  </p:clrMapOvr>
+</p:sld>
+</file>
+
+<file path=ppt/slides/slide2.xml><?xml version="1.0" encoding="utf-8"?>
+<p:sld xmlns:a="http://schemas.openxmlformats.org/drawingml/2006/main" xmlns:r="http://schemas.openxmlformats.org/officeDocument/2006/relationships" xmlns:p="http://schemas.openxmlformats.org/presentationml/2006/main">
+  <p:cSld>
+    <p:spTree>
+      <p:nvGrpSpPr>
+        <p:cNvPr id="1" name=""/>
+        <p:cNvGrpSpPr/>
+        <p:nvPr/>
+      </p:nvGrpSpPr>
+      <p:grpSpPr>
+        <a:xfrm>
+          <a:off x="0" y="0"/>
+          <a:ext cx="0" cy="0"/>
+          <a:chOff x="0" y="0"/>
+          <a:chExt cx="0" cy="0"/>
+        </a:xfrm>
+      </p:grpSpPr>
+      <p:sp>
+        <p:nvSpPr>
+          <p:cNvPr id="2" name="正方形/長方形 1">
+            <a:extLst>
+              <a:ext uri="{FF2B5EF4-FFF2-40B4-BE49-F238E27FC236}">
+                <a16:creationId xmlns:a16="http://schemas.microsoft.com/office/drawing/2014/main" id="{38E30D1A-BE6E-F78C-C418-E7B454C0BA57}"/>
+              </a:ext>
+            </a:extLst>
+          </p:cNvPr>
+          <p:cNvSpPr/>
+          <p:nvPr/>
+        </p:nvSpPr>
+        <p:spPr>
+          <a:xfrm>
+            <a:off x="320954" y="397292"/>
+            <a:ext cx="9705917" cy="2364827"/>
+          </a:xfrm>
+          <a:prstGeom prst="rect">
+            <a:avLst/>
+          </a:prstGeom>
+          <a:solidFill>
+            <a:schemeClr val="bg1"/>
+          </a:solidFill>
+          <a:ln>
+            <a:noFill/>
+          </a:ln>
+          <a:effectLst>
+            <a:outerShdw blurRad="50800" dist="38100" dir="2700000" algn="tl" rotWithShape="0">
+              <a:prstClr val="black">
+                <a:alpha val="40000"/>
+              </a:prstClr>
+            </a:outerShdw>
+          </a:effectLst>
+        </p:spPr>
+        <p:style>
+          <a:lnRef idx="2">
+            <a:schemeClr val="accent1">
+              <a:shade val="15000"/>
+            </a:schemeClr>
+          </a:lnRef>
+          <a:fillRef idx="1">
+            <a:schemeClr val="accent1"/>
+          </a:fillRef>
+          <a:effectRef idx="0">
+            <a:schemeClr val="accent1"/>
+          </a:effectRef>
+          <a:fontRef idx="minor">
+            <a:schemeClr val="lt1"/>
+          </a:fontRef>
+        </p:style>
+        <p:txBody>
+          <a:bodyPr rtlCol="0" anchor="ctr"/>
+          <a:lstStyle/>
+          <a:p>
+            <a:pPr algn="ctr"/>
+            <a:endParaRPr kumimoji="1" lang="ja-JP" altLang="en-US"/>
+          </a:p>
+        </p:txBody>
+      </p:sp>
+      <p:pic>
+        <p:nvPicPr>
+          <p:cNvPr id="3" name="図 2" descr="建物, 橋, ミラー が含まれている画像&#10;&#10;自動的に生成された説明">
+            <a:extLst>
+              <a:ext uri="{FF2B5EF4-FFF2-40B4-BE49-F238E27FC236}">
+                <a16:creationId xmlns:a16="http://schemas.microsoft.com/office/drawing/2014/main" id="{59198F40-83DB-A38D-A1E2-C1FD3C9A0E01}"/>
+              </a:ext>
+            </a:extLst>
+          </p:cNvPr>
+          <p:cNvPicPr>
+            <a:picLocks noChangeAspect="1"/>
+          </p:cNvPicPr>
+          <p:nvPr/>
+        </p:nvPicPr>
+        <p:blipFill>
+          <a:blip r:embed="rId2"/>
+          <a:stretch>
+            <a:fillRect/>
+          </a:stretch>
+        </p:blipFill>
+        <p:spPr>
+          <a:xfrm>
+            <a:off x="540027" y="1531162"/>
+            <a:ext cx="490606" cy="490606"/>
+          </a:xfrm>
+          <a:prstGeom prst="rect">
+            <a:avLst/>
+          </a:prstGeom>
+        </p:spPr>
+      </p:pic>
+      <p:sp>
+        <p:nvSpPr>
+          <p:cNvPr id="4" name="四角形: 角を丸くする 3">
+            <a:extLst>
+              <a:ext uri="{FF2B5EF4-FFF2-40B4-BE49-F238E27FC236}">
+                <a16:creationId xmlns:a16="http://schemas.microsoft.com/office/drawing/2014/main" id="{975D27DA-2997-F60B-C8FF-14CBA8606244}"/>
+              </a:ext>
+            </a:extLst>
+          </p:cNvPr>
+          <p:cNvSpPr/>
+          <p:nvPr/>
+        </p:nvSpPr>
+        <p:spPr>
+          <a:xfrm>
+            <a:off x="1490322" y="699989"/>
+            <a:ext cx="2828931" cy="1633308"/>
+          </a:xfrm>
+          <a:prstGeom prst="roundRect">
+            <a:avLst>
+              <a:gd name="adj" fmla="val 11262"/>
+            </a:avLst>
+          </a:prstGeom>
+          <a:noFill/>
+          <a:ln>
+            <a:solidFill>
+              <a:schemeClr val="accent1"/>
+            </a:solidFill>
+          </a:ln>
+        </p:spPr>
+        <p:style>
+          <a:lnRef idx="2">
+            <a:schemeClr val="accent6"/>
+          </a:lnRef>
+          <a:fillRef idx="1">
+            <a:schemeClr val="lt1"/>
+          </a:fillRef>
+          <a:effectRef idx="0">
+            <a:schemeClr val="accent6"/>
+          </a:effectRef>
+          <a:fontRef idx="minor">
+            <a:schemeClr val="dk1"/>
+          </a:fontRef>
+        </p:style>
+        <p:txBody>
+          <a:bodyPr rtlCol="0" anchor="t"/>
+          <a:lstStyle/>
+          <a:p>
+            <a:r>
+              <a:rPr lang="en-US" altLang="ja-JP" sz="1400" dirty="0"/>
+              <a:t>App</a:t>
+            </a:r>
+            <a:endParaRPr lang="ja-JP" altLang="en-US" sz="1400" dirty="0"/>
+          </a:p>
+        </p:txBody>
+      </p:sp>
+      <p:sp>
+        <p:nvSpPr>
+          <p:cNvPr id="6" name="四角形: メモ 5">
+            <a:extLst>
+              <a:ext uri="{FF2B5EF4-FFF2-40B4-BE49-F238E27FC236}">
+                <a16:creationId xmlns:a16="http://schemas.microsoft.com/office/drawing/2014/main" id="{1B6FEF35-D758-ECF8-88E3-CE995FD3F0FC}"/>
+              </a:ext>
+            </a:extLst>
+          </p:cNvPr>
+          <p:cNvSpPr/>
+          <p:nvPr/>
+        </p:nvSpPr>
+        <p:spPr>
+          <a:xfrm>
+            <a:off x="6217921" y="1080149"/>
+            <a:ext cx="755703" cy="755703"/>
+          </a:xfrm>
+          <a:prstGeom prst="foldedCorner">
+            <a:avLst/>
+          </a:prstGeom>
+          <a:ln>
+            <a:headEnd type="none" w="med" len="med"/>
+            <a:tailEnd type="none" w="med" len="med"/>
+          </a:ln>
+        </p:spPr>
+        <p:style>
+          <a:lnRef idx="1">
+            <a:schemeClr val="accent1"/>
+          </a:lnRef>
+          <a:fillRef idx="2">
+            <a:schemeClr val="accent1"/>
+          </a:fillRef>
+          <a:effectRef idx="1">
+            <a:schemeClr val="accent1"/>
+          </a:effectRef>
+          <a:fontRef idx="minor">
+            <a:schemeClr val="dk1"/>
+          </a:fontRef>
+        </p:style>
+        <p:txBody>
+          <a:bodyPr wrap="none" rtlCol="0" anchor="ctr"/>
+          <a:lstStyle/>
+          <a:p>
+            <a:pPr algn="ctr"/>
+            <a:r>
+              <a:rPr kumimoji="1" lang="en-US" altLang="ja-JP" sz="1200" dirty="0">
+                <a:solidFill>
+                  <a:schemeClr val="dk1"/>
+                </a:solidFill>
+              </a:rPr>
+              <a:t>Instruct</a:t>
+            </a:r>
+          </a:p>
+        </p:txBody>
+      </p:sp>
+      <p:sp>
+        <p:nvSpPr>
+          <p:cNvPr id="7" name="四角形: 角を丸くする 6">
+            <a:extLst>
+              <a:ext uri="{FF2B5EF4-FFF2-40B4-BE49-F238E27FC236}">
+                <a16:creationId xmlns:a16="http://schemas.microsoft.com/office/drawing/2014/main" id="{CB0298F3-E1EE-6F87-9605-26F839723B59}"/>
+              </a:ext>
+            </a:extLst>
+          </p:cNvPr>
+          <p:cNvSpPr/>
+          <p:nvPr/>
+        </p:nvSpPr>
+        <p:spPr>
+          <a:xfrm>
+            <a:off x="5758232" y="706295"/>
+            <a:ext cx="3997303" cy="1633308"/>
+          </a:xfrm>
+          <a:prstGeom prst="roundRect">
+            <a:avLst>
+              <a:gd name="adj" fmla="val 7301"/>
+            </a:avLst>
+          </a:prstGeom>
+          <a:noFill/>
+          <a:ln>
+            <a:solidFill>
+              <a:schemeClr val="accent1"/>
+            </a:solidFill>
+          </a:ln>
+        </p:spPr>
+        <p:style>
+          <a:lnRef idx="2">
+            <a:schemeClr val="accent6"/>
+          </a:lnRef>
+          <a:fillRef idx="1">
+            <a:schemeClr val="lt1"/>
+          </a:fillRef>
+          <a:effectRef idx="0">
+            <a:schemeClr val="accent6"/>
+          </a:effectRef>
+          <a:fontRef idx="minor">
+            <a:schemeClr val="dk1"/>
+          </a:fontRef>
+        </p:style>
+        <p:txBody>
+          <a:bodyPr rtlCol="0" anchor="t"/>
+          <a:lstStyle/>
+          <a:p>
+            <a:r>
+              <a:rPr lang="ja-JP" altLang="en-US" sz="1400" dirty="0"/>
+              <a:t>お天気エージェント</a:t>
+            </a:r>
+            <a:endParaRPr kumimoji="1" lang="ja-JP" altLang="en-US" sz="1400" dirty="0"/>
+          </a:p>
+        </p:txBody>
+      </p:sp>
+      <p:pic>
+        <p:nvPicPr>
+          <p:cNvPr id="1026" name="Picture 2" descr="Bingの評判を全7件のユーザーレビュー・口コミで紹介">
+            <a:extLst>
+              <a:ext uri="{FF2B5EF4-FFF2-40B4-BE49-F238E27FC236}">
+                <a16:creationId xmlns:a16="http://schemas.microsoft.com/office/drawing/2014/main" id="{93E9C217-DEF1-A804-B216-29E5C7A57EE4}"/>
+              </a:ext>
+            </a:extLst>
+          </p:cNvPr>
+          <p:cNvPicPr>
+            <a:picLocks noChangeAspect="1" noChangeArrowheads="1"/>
+          </p:cNvPicPr>
+          <p:nvPr/>
+        </p:nvPicPr>
+        <p:blipFill>
+          <a:blip r:embed="rId3">
+            <a:clrChange>
+              <a:clrFrom>
+                <a:srgbClr val="FFFFFF"/>
+              </a:clrFrom>
+              <a:clrTo>
+                <a:srgbClr val="FFFFFF">
+                  <a:alpha val="0"/>
+                </a:srgbClr>
+              </a:clrTo>
+            </a:clrChange>
+            <a:extLst>
+              <a:ext uri="{28A0092B-C50C-407E-A947-70E740481C1C}">
+                <a14:useLocalDpi xmlns:a14="http://schemas.microsoft.com/office/drawing/2010/main" val="0"/>
+              </a:ext>
+            </a:extLst>
+          </a:blip>
+          <a:srcRect/>
+          <a:stretch>
+            <a:fillRect/>
+          </a:stretch>
+        </p:blipFill>
+        <p:spPr bwMode="auto">
+          <a:xfrm>
+            <a:off x="8278088" y="1672449"/>
+            <a:ext cx="1185151" cy="474061"/>
+          </a:xfrm>
+          <a:prstGeom prst="rect">
+            <a:avLst/>
+          </a:prstGeom>
+          <a:noFill/>
+          <a:extLst>
+            <a:ext uri="{909E8E84-426E-40DD-AFC4-6F175D3DCCD1}">
+              <a14:hiddenFill xmlns:a14="http://schemas.microsoft.com/office/drawing/2010/main">
+                <a:solidFill>
+                  <a:srgbClr val="FFFFFF"/>
+                </a:solidFill>
+              </a14:hiddenFill>
+            </a:ext>
+          </a:extLst>
+        </p:spPr>
+      </p:pic>
+      <p:pic>
+        <p:nvPicPr>
+          <p:cNvPr id="8" name="Picture 2" descr="Using Azure Search for vector search with Azure OpenAI and LangChain ·  Clemens Siebler's Blog">
+            <a:extLst>
+              <a:ext uri="{FF2B5EF4-FFF2-40B4-BE49-F238E27FC236}">
+                <a16:creationId xmlns:a16="http://schemas.microsoft.com/office/drawing/2014/main" id="{0DACA03E-A093-F766-1451-A9185F979216}"/>
+              </a:ext>
+            </a:extLst>
+          </p:cNvPr>
+          <p:cNvPicPr>
+            <a:picLocks noChangeAspect="1" noChangeArrowheads="1"/>
+          </p:cNvPicPr>
+          <p:nvPr/>
+        </p:nvPicPr>
+        <p:blipFill rotWithShape="1">
+          <a:blip r:embed="rId4">
+            <a:clrChange>
+              <a:clrFrom>
+                <a:srgbClr val="FFFFFF"/>
+              </a:clrFrom>
+              <a:clrTo>
+                <a:srgbClr val="FFFFFF">
+                  <a:alpha val="0"/>
+                </a:srgbClr>
+              </a:clrTo>
+            </a:clrChange>
+            <a:extLst>
+              <a:ext uri="{28A0092B-C50C-407E-A947-70E740481C1C}">
+                <a14:useLocalDpi xmlns:a14="http://schemas.microsoft.com/office/drawing/2010/main"/>
+              </a:ext>
+            </a:extLst>
+          </a:blip>
+          <a:srcRect/>
+          <a:stretch/>
+        </p:blipFill>
+        <p:spPr bwMode="auto">
+          <a:xfrm>
+            <a:off x="8144263" y="1033160"/>
+            <a:ext cx="647531" cy="489772"/>
+          </a:xfrm>
+          <a:prstGeom prst="rect">
+            <a:avLst/>
+          </a:prstGeom>
+          <a:noFill/>
+          <a:extLst>
+            <a:ext uri="{909E8E84-426E-40DD-AFC4-6F175D3DCCD1}">
+              <a14:hiddenFill xmlns:a14="http://schemas.microsoft.com/office/drawing/2010/main">
+                <a:solidFill>
+                  <a:srgbClr val="FFFFFF"/>
+                </a:solidFill>
+              </a14:hiddenFill>
+            </a:ext>
+          </a:extLst>
+        </p:spPr>
+      </p:pic>
+      <p:sp>
+        <p:nvSpPr>
+          <p:cNvPr id="9" name="テキスト ボックス 8">
+            <a:extLst>
+              <a:ext uri="{FF2B5EF4-FFF2-40B4-BE49-F238E27FC236}">
+                <a16:creationId xmlns:a16="http://schemas.microsoft.com/office/drawing/2014/main" id="{98507EE8-1D6E-22C5-B133-1F29AEAD88CA}"/>
+              </a:ext>
+            </a:extLst>
+          </p:cNvPr>
+          <p:cNvSpPr txBox="1"/>
+          <p:nvPr/>
+        </p:nvSpPr>
+        <p:spPr>
+          <a:xfrm>
+            <a:off x="8791794" y="1056616"/>
+            <a:ext cx="886781" cy="369332"/>
+          </a:xfrm>
+          <a:prstGeom prst="rect">
+            <a:avLst/>
+          </a:prstGeom>
+          <a:noFill/>
+        </p:spPr>
+        <p:txBody>
+          <a:bodyPr wrap="none" rtlCol="0">
+            <a:spAutoFit/>
+          </a:bodyPr>
+          <a:lstStyle/>
+          <a:p>
+            <a:r>
+              <a:rPr lang="en-US" altLang="ja-JP" dirty="0"/>
+              <a:t>g</a:t>
+            </a:r>
+            <a:r>
+              <a:rPr kumimoji="1" lang="en-US" altLang="ja-JP" dirty="0"/>
+              <a:t>pt-4o</a:t>
+            </a:r>
+            <a:endParaRPr kumimoji="1" lang="ja-JP" altLang="en-US" dirty="0"/>
+          </a:p>
+        </p:txBody>
+      </p:sp>
+      <p:cxnSp>
+        <p:nvCxnSpPr>
+          <p:cNvPr id="10" name="直線矢印コネクタ 9">
+            <a:extLst>
+              <a:ext uri="{FF2B5EF4-FFF2-40B4-BE49-F238E27FC236}">
+                <a16:creationId xmlns:a16="http://schemas.microsoft.com/office/drawing/2014/main" id="{0CCC1D17-2B71-9B3F-3734-12A3AE024A51}"/>
+              </a:ext>
+            </a:extLst>
+          </p:cNvPr>
+          <p:cNvCxnSpPr>
+            <a:cxnSpLocks/>
+          </p:cNvCxnSpPr>
+          <p:nvPr/>
+        </p:nvCxnSpPr>
+        <p:spPr>
+          <a:xfrm flipV="1">
+            <a:off x="7139390" y="1427785"/>
+            <a:ext cx="921326" cy="190294"/>
+          </a:xfrm>
+          <a:prstGeom prst="straightConnector1">
+            <a:avLst/>
+          </a:prstGeom>
+          <a:ln w="28575">
+            <a:solidFill>
+              <a:schemeClr val="accent1"/>
+            </a:solidFill>
+            <a:prstDash val="dash"/>
+            <a:headEnd type="none" w="med" len="med"/>
+            <a:tailEnd type="arrow" w="med" len="med"/>
+          </a:ln>
+        </p:spPr>
+        <p:style>
+          <a:lnRef idx="1">
+            <a:schemeClr val="accent1"/>
+          </a:lnRef>
+          <a:fillRef idx="0">
+            <a:schemeClr val="accent1"/>
+          </a:fillRef>
+          <a:effectRef idx="0">
+            <a:schemeClr val="accent1"/>
+          </a:effectRef>
+          <a:fontRef idx="minor">
+            <a:schemeClr val="tx1"/>
+          </a:fontRef>
+        </p:style>
+      </p:cxnSp>
+      <p:pic>
+        <p:nvPicPr>
+          <p:cNvPr id="5" name="Graphic 54" descr="ソリッドフィル付きロボット">
+            <a:extLst>
+              <a:ext uri="{FF2B5EF4-FFF2-40B4-BE49-F238E27FC236}">
+                <a16:creationId xmlns:a16="http://schemas.microsoft.com/office/drawing/2014/main" id="{853448FB-1C3C-A03F-4AE7-0A85A996CDBA}"/>
+              </a:ext>
+            </a:extLst>
+          </p:cNvPr>
+          <p:cNvPicPr>
+            <a:picLocks noChangeAspect="1"/>
+          </p:cNvPicPr>
+          <p:nvPr/>
+        </p:nvPicPr>
+        <p:blipFill>
+          <a:blip r:embed="rId5">
+            <a:extLst>
+              <a:ext uri="{96DAC541-7B7A-43D3-8B79-37D633B846F1}">
+                <asvg:svgBlip xmlns:asvg="http://schemas.microsoft.com/office/drawing/2016/SVG/main" r:embed="rId6"/>
+              </a:ext>
+            </a:extLst>
+          </a:blip>
+          <a:stretch>
+            <a:fillRect/>
+          </a:stretch>
+        </p:blipFill>
+        <p:spPr>
+          <a:xfrm>
+            <a:off x="5779978" y="1368326"/>
+            <a:ext cx="718873" cy="718873"/>
+          </a:xfrm>
+          <a:prstGeom prst="rect">
+            <a:avLst/>
+          </a:prstGeom>
+        </p:spPr>
+      </p:pic>
+      <p:cxnSp>
+        <p:nvCxnSpPr>
+          <p:cNvPr id="12" name="直線矢印コネクタ 11">
+            <a:extLst>
+              <a:ext uri="{FF2B5EF4-FFF2-40B4-BE49-F238E27FC236}">
+                <a16:creationId xmlns:a16="http://schemas.microsoft.com/office/drawing/2014/main" id="{83688A17-8B22-9DF1-23C3-EF23E1309DE0}"/>
+              </a:ext>
+            </a:extLst>
+          </p:cNvPr>
+          <p:cNvCxnSpPr>
+            <a:cxnSpLocks/>
+          </p:cNvCxnSpPr>
+          <p:nvPr/>
+        </p:nvCxnSpPr>
+        <p:spPr>
+          <a:xfrm>
+            <a:off x="7146962" y="1736850"/>
+            <a:ext cx="921326" cy="190294"/>
+          </a:xfrm>
+          <a:prstGeom prst="straightConnector1">
+            <a:avLst/>
+          </a:prstGeom>
+          <a:ln w="28575">
+            <a:solidFill>
+              <a:schemeClr val="accent1"/>
+            </a:solidFill>
+            <a:prstDash val="dash"/>
+            <a:headEnd type="none" w="med" len="med"/>
+            <a:tailEnd type="arrow" w="med" len="med"/>
+          </a:ln>
+        </p:spPr>
+        <p:style>
+          <a:lnRef idx="1">
+            <a:schemeClr val="accent1"/>
+          </a:lnRef>
+          <a:fillRef idx="0">
+            <a:schemeClr val="accent1"/>
+          </a:fillRef>
+          <a:effectRef idx="0">
+            <a:schemeClr val="accent1"/>
+          </a:effectRef>
+          <a:fontRef idx="minor">
+            <a:schemeClr val="tx1"/>
+          </a:fontRef>
+        </p:style>
+      </p:cxnSp>
+      <p:sp>
+        <p:nvSpPr>
+          <p:cNvPr id="15" name="四角形: 角を丸くする 14">
+            <a:extLst>
+              <a:ext uri="{FF2B5EF4-FFF2-40B4-BE49-F238E27FC236}">
+                <a16:creationId xmlns:a16="http://schemas.microsoft.com/office/drawing/2014/main" id="{27D5FCD9-FFFF-30AF-B30C-F46E168A8B05}"/>
+              </a:ext>
+            </a:extLst>
+          </p:cNvPr>
+          <p:cNvSpPr/>
+          <p:nvPr/>
+        </p:nvSpPr>
+        <p:spPr>
+          <a:xfrm>
+            <a:off x="2927538" y="1451694"/>
+            <a:ext cx="1223404" cy="604237"/>
+          </a:xfrm>
+          <a:prstGeom prst="roundRect">
+            <a:avLst/>
+          </a:prstGeom>
+        </p:spPr>
+        <p:style>
+          <a:lnRef idx="1">
+            <a:schemeClr val="accent1"/>
+          </a:lnRef>
+          <a:fillRef idx="2">
+            <a:schemeClr val="accent1"/>
+          </a:fillRef>
+          <a:effectRef idx="1">
+            <a:schemeClr val="accent1"/>
+          </a:effectRef>
+          <a:fontRef idx="minor">
+            <a:schemeClr val="dk1"/>
+          </a:fontRef>
+        </p:style>
+        <p:txBody>
+          <a:bodyPr rtlCol="0" anchor="ctr"/>
+          <a:lstStyle/>
+          <a:p>
+            <a:pPr algn="ctr"/>
+            <a:r>
+              <a:rPr kumimoji="1" lang="en-US" altLang="ja-JP" sz="1400" dirty="0"/>
+              <a:t>AI Foundry</a:t>
+            </a:r>
+            <a:br>
+              <a:rPr kumimoji="1" lang="en-US" altLang="ja-JP" sz="1400" dirty="0"/>
+            </a:br>
+            <a:r>
+              <a:rPr kumimoji="1" lang="en-US" altLang="ja-JP" sz="1400" dirty="0"/>
+              <a:t>SDK</a:t>
+            </a:r>
+            <a:endParaRPr kumimoji="1" lang="ja-JP" altLang="en-US" sz="1400" dirty="0"/>
+          </a:p>
+        </p:txBody>
+      </p:sp>
+      <p:sp>
+        <p:nvSpPr>
+          <p:cNvPr id="16" name="四角形: メモ 15">
+            <a:extLst>
+              <a:ext uri="{FF2B5EF4-FFF2-40B4-BE49-F238E27FC236}">
+                <a16:creationId xmlns:a16="http://schemas.microsoft.com/office/drawing/2014/main" id="{C57830F8-EECB-37CF-8012-11BA8912D48B}"/>
+              </a:ext>
+            </a:extLst>
+          </p:cNvPr>
+          <p:cNvSpPr/>
+          <p:nvPr/>
+        </p:nvSpPr>
+        <p:spPr>
+          <a:xfrm>
+            <a:off x="1783111" y="1340144"/>
+            <a:ext cx="755703" cy="755703"/>
+          </a:xfrm>
+          <a:prstGeom prst="foldedCorner">
+            <a:avLst/>
+          </a:prstGeom>
+          <a:ln>
+            <a:headEnd type="none" w="med" len="med"/>
+            <a:tailEnd type="none" w="med" len="med"/>
+          </a:ln>
+        </p:spPr>
+        <p:style>
+          <a:lnRef idx="1">
+            <a:schemeClr val="accent1"/>
+          </a:lnRef>
+          <a:fillRef idx="2">
+            <a:schemeClr val="accent1"/>
+          </a:fillRef>
+          <a:effectRef idx="1">
+            <a:schemeClr val="accent1"/>
+          </a:effectRef>
+          <a:fontRef idx="minor">
+            <a:schemeClr val="dk1"/>
+          </a:fontRef>
+        </p:style>
+        <p:txBody>
+          <a:bodyPr wrap="none" rtlCol="0" anchor="ctr"/>
+          <a:lstStyle/>
+          <a:p>
+            <a:pPr algn="ctr"/>
+            <a:r>
+              <a:rPr lang="en-US" altLang="ja-JP" sz="1200" dirty="0"/>
+              <a:t>Code</a:t>
+            </a:r>
+            <a:endParaRPr kumimoji="1" lang="en-US" altLang="ja-JP" sz="1200" dirty="0">
+              <a:solidFill>
+                <a:schemeClr val="dk1"/>
+              </a:solidFill>
+            </a:endParaRPr>
+          </a:p>
+        </p:txBody>
+      </p:sp>
+      <p:cxnSp>
+        <p:nvCxnSpPr>
+          <p:cNvPr id="17" name="直線矢印コネクタ 16">
+            <a:extLst>
+              <a:ext uri="{FF2B5EF4-FFF2-40B4-BE49-F238E27FC236}">
+                <a16:creationId xmlns:a16="http://schemas.microsoft.com/office/drawing/2014/main" id="{10E79FAA-2F8F-12F2-67E1-EE1D033A7088}"/>
+              </a:ext>
+            </a:extLst>
+          </p:cNvPr>
+          <p:cNvCxnSpPr>
+            <a:cxnSpLocks/>
+          </p:cNvCxnSpPr>
+          <p:nvPr/>
+        </p:nvCxnSpPr>
+        <p:spPr>
+          <a:xfrm>
+            <a:off x="4150942" y="1812508"/>
+            <a:ext cx="1764685" cy="0"/>
+          </a:xfrm>
+          <a:prstGeom prst="straightConnector1">
+            <a:avLst/>
+          </a:prstGeom>
+          <a:ln w="28575">
+            <a:solidFill>
+              <a:schemeClr val="accent1"/>
+            </a:solidFill>
+            <a:headEnd type="none" w="med" len="med"/>
+            <a:tailEnd type="arrow" w="med" len="med"/>
+          </a:ln>
+        </p:spPr>
+        <p:style>
+          <a:lnRef idx="1">
+            <a:schemeClr val="accent1"/>
+          </a:lnRef>
+          <a:fillRef idx="0">
+            <a:schemeClr val="accent1"/>
+          </a:fillRef>
+          <a:effectRef idx="0">
+            <a:schemeClr val="accent1"/>
+          </a:effectRef>
+          <a:fontRef idx="minor">
+            <a:schemeClr val="tx1"/>
+          </a:fontRef>
+        </p:style>
+      </p:cxnSp>
+      <p:cxnSp>
+        <p:nvCxnSpPr>
+          <p:cNvPr id="19" name="直線矢印コネクタ 18">
+            <a:extLst>
+              <a:ext uri="{FF2B5EF4-FFF2-40B4-BE49-F238E27FC236}">
+                <a16:creationId xmlns:a16="http://schemas.microsoft.com/office/drawing/2014/main" id="{D490F7ED-6B56-95CB-1AC1-DD9F6D82F3A2}"/>
+              </a:ext>
+            </a:extLst>
+          </p:cNvPr>
+          <p:cNvCxnSpPr>
+            <a:cxnSpLocks/>
+          </p:cNvCxnSpPr>
+          <p:nvPr/>
+        </p:nvCxnSpPr>
+        <p:spPr>
+          <a:xfrm>
+            <a:off x="2473192" y="1792010"/>
+            <a:ext cx="572070" cy="181"/>
+          </a:xfrm>
+          <a:prstGeom prst="straightConnector1">
+            <a:avLst/>
+          </a:prstGeom>
+          <a:ln w="28575">
+            <a:solidFill>
+              <a:schemeClr val="accent1"/>
+            </a:solidFill>
+            <a:prstDash val="dash"/>
+            <a:headEnd type="none" w="med" len="med"/>
+            <a:tailEnd type="arrow" w="med" len="med"/>
+          </a:ln>
+        </p:spPr>
+        <p:style>
+          <a:lnRef idx="1">
+            <a:schemeClr val="accent1"/>
+          </a:lnRef>
+          <a:fillRef idx="0">
+            <a:schemeClr val="accent1"/>
+          </a:fillRef>
+          <a:effectRef idx="0">
+            <a:schemeClr val="accent1"/>
+          </a:effectRef>
+          <a:fontRef idx="minor">
+            <a:schemeClr val="tx1"/>
+          </a:fontRef>
+        </p:style>
+      </p:cxnSp>
+      <p:pic>
+        <p:nvPicPr>
+          <p:cNvPr id="23" name="図 22">
+            <a:extLst>
+              <a:ext uri="{FF2B5EF4-FFF2-40B4-BE49-F238E27FC236}">
+                <a16:creationId xmlns:a16="http://schemas.microsoft.com/office/drawing/2014/main" id="{3303C799-AF8D-7B66-FD50-C28D16E3387B}"/>
+              </a:ext>
+            </a:extLst>
+          </p:cNvPr>
+          <p:cNvPicPr>
+            <a:picLocks noChangeAspect="1"/>
+          </p:cNvPicPr>
+          <p:nvPr/>
+        </p:nvPicPr>
+        <p:blipFill>
+          <a:blip r:embed="rId7">
+            <a:extLst>
+              <a:ext uri="{28A0092B-C50C-407E-A947-70E740481C1C}">
+                <a14:useLocalDpi xmlns:a14="http://schemas.microsoft.com/office/drawing/2010/main" val="0"/>
+              </a:ext>
+            </a:extLst>
+          </a:blip>
+          <a:stretch>
+            <a:fillRect/>
+          </a:stretch>
+        </p:blipFill>
+        <p:spPr>
+          <a:xfrm>
+            <a:off x="4724820" y="1525876"/>
+            <a:ext cx="484499" cy="484499"/>
+          </a:xfrm>
+          <a:prstGeom prst="rect">
+            <a:avLst/>
+          </a:prstGeom>
+        </p:spPr>
+      </p:pic>
+    </p:spTree>
+    <p:extLst>
+      <p:ext uri="{BB962C8B-B14F-4D97-AF65-F5344CB8AC3E}">
+        <p14:creationId xmlns:p14="http://schemas.microsoft.com/office/powerpoint/2010/main" val="2326112487"/>
+      </p:ext>
+    </p:extLst>
+  </p:cSld>
+  <p:clrMapOvr>
+    <a:masterClrMapping/>
+  </p:clrMapOvr>
+</p:sld>
+</file>
+
+<file path=ppt/slides/slide3.xml><?xml version="1.0" encoding="utf-8"?>
+<p:sld xmlns:a="http://schemas.openxmlformats.org/drawingml/2006/main" xmlns:r="http://schemas.openxmlformats.org/officeDocument/2006/relationships" xmlns:p="http://schemas.openxmlformats.org/presentationml/2006/main">
+  <p:cSld>
+    <p:spTree>
+      <p:nvGrpSpPr>
+        <p:cNvPr id="1" name="">
+          <a:extLst>
+            <a:ext uri="{FF2B5EF4-FFF2-40B4-BE49-F238E27FC236}">
+              <a16:creationId xmlns:a16="http://schemas.microsoft.com/office/drawing/2014/main" id="{623E27D9-BF20-30BB-4081-53A8EA325A46}"/>
+            </a:ext>
+          </a:extLst>
+        </p:cNvPr>
+        <p:cNvGrpSpPr/>
+        <p:nvPr/>
+      </p:nvGrpSpPr>
+      <p:grpSpPr>
+        <a:xfrm>
+          <a:off x="0" y="0"/>
+          <a:ext cx="0" cy="0"/>
+          <a:chOff x="0" y="0"/>
+          <a:chExt cx="0" cy="0"/>
+        </a:xfrm>
+      </p:grpSpPr>
+      <p:sp>
+        <p:nvSpPr>
+          <p:cNvPr id="2" name="正方形/長方形 1">
+            <a:extLst>
+              <a:ext uri="{FF2B5EF4-FFF2-40B4-BE49-F238E27FC236}">
+                <a16:creationId xmlns:a16="http://schemas.microsoft.com/office/drawing/2014/main" id="{01F52772-0DEA-DE85-9B0D-F4EAEEE555E7}"/>
+              </a:ext>
+            </a:extLst>
+          </p:cNvPr>
+          <p:cNvSpPr/>
+          <p:nvPr/>
+        </p:nvSpPr>
+        <p:spPr>
+          <a:xfrm>
+            <a:off x="320954" y="397293"/>
+            <a:ext cx="9705917" cy="3695436"/>
+          </a:xfrm>
+          <a:prstGeom prst="rect">
+            <a:avLst/>
+          </a:prstGeom>
+          <a:solidFill>
+            <a:schemeClr val="bg1"/>
+          </a:solidFill>
+          <a:ln>
+            <a:noFill/>
+          </a:ln>
+          <a:effectLst>
+            <a:outerShdw blurRad="50800" dist="38100" dir="2700000" algn="tl" rotWithShape="0">
+              <a:prstClr val="black">
+                <a:alpha val="40000"/>
+              </a:prstClr>
+            </a:outerShdw>
+          </a:effectLst>
+        </p:spPr>
+        <p:style>
+          <a:lnRef idx="2">
+            <a:schemeClr val="accent1">
+              <a:shade val="15000"/>
+            </a:schemeClr>
+          </a:lnRef>
+          <a:fillRef idx="1">
+            <a:schemeClr val="accent1"/>
+          </a:fillRef>
+          <a:effectRef idx="0">
+            <a:schemeClr val="accent1"/>
+          </a:effectRef>
+          <a:fontRef idx="minor">
+            <a:schemeClr val="lt1"/>
+          </a:fontRef>
+        </p:style>
+        <p:txBody>
+          <a:bodyPr rtlCol="0" anchor="ctr"/>
+          <a:lstStyle/>
+          <a:p>
+            <a:pPr algn="ctr"/>
+            <a:endParaRPr kumimoji="1" lang="ja-JP" altLang="en-US"/>
+          </a:p>
+        </p:txBody>
+      </p:sp>
+      <p:pic>
+        <p:nvPicPr>
+          <p:cNvPr id="3" name="図 2" descr="建物, 橋, ミラー が含まれている画像&#10;&#10;自動的に生成された説明">
+            <a:extLst>
+              <a:ext uri="{FF2B5EF4-FFF2-40B4-BE49-F238E27FC236}">
+                <a16:creationId xmlns:a16="http://schemas.microsoft.com/office/drawing/2014/main" id="{5467F223-C974-72FF-71E6-6EC0A0A32B97}"/>
+              </a:ext>
+            </a:extLst>
+          </p:cNvPr>
+          <p:cNvPicPr>
+            <a:picLocks noChangeAspect="1"/>
+          </p:cNvPicPr>
+          <p:nvPr/>
+        </p:nvPicPr>
+        <p:blipFill>
+          <a:blip r:embed="rId2"/>
+          <a:stretch>
+            <a:fillRect/>
+          </a:stretch>
+        </p:blipFill>
+        <p:spPr>
+          <a:xfrm>
+            <a:off x="611560" y="2374241"/>
+            <a:ext cx="490606" cy="490606"/>
+          </a:xfrm>
+          <a:prstGeom prst="rect">
+            <a:avLst/>
+          </a:prstGeom>
+        </p:spPr>
+      </p:pic>
+      <p:sp>
+        <p:nvSpPr>
+          <p:cNvPr id="4" name="四角形: 角を丸くする 3">
+            <a:extLst>
+              <a:ext uri="{FF2B5EF4-FFF2-40B4-BE49-F238E27FC236}">
+                <a16:creationId xmlns:a16="http://schemas.microsoft.com/office/drawing/2014/main" id="{29BA0671-C2A7-E74B-7C4D-AFF15FD3216A}"/>
+              </a:ext>
+            </a:extLst>
+          </p:cNvPr>
+          <p:cNvSpPr/>
+          <p:nvPr/>
+        </p:nvSpPr>
+        <p:spPr>
+          <a:xfrm>
+            <a:off x="1561855" y="1543068"/>
+            <a:ext cx="2828931" cy="1633308"/>
+          </a:xfrm>
+          <a:prstGeom prst="roundRect">
+            <a:avLst>
+              <a:gd name="adj" fmla="val 11262"/>
+            </a:avLst>
+          </a:prstGeom>
+          <a:noFill/>
+          <a:ln>
+            <a:solidFill>
+              <a:schemeClr val="accent1"/>
+            </a:solidFill>
+          </a:ln>
+        </p:spPr>
+        <p:style>
+          <a:lnRef idx="2">
+            <a:schemeClr val="accent6"/>
+          </a:lnRef>
+          <a:fillRef idx="1">
+            <a:schemeClr val="lt1"/>
+          </a:fillRef>
+          <a:effectRef idx="0">
+            <a:schemeClr val="accent6"/>
+          </a:effectRef>
+          <a:fontRef idx="minor">
+            <a:schemeClr val="dk1"/>
+          </a:fontRef>
+        </p:style>
+        <p:txBody>
+          <a:bodyPr rtlCol="0" anchor="t"/>
+          <a:lstStyle/>
+          <a:p>
+            <a:r>
+              <a:rPr lang="en-US" altLang="ja-JP" sz="1400" dirty="0"/>
+              <a:t>App</a:t>
+            </a:r>
+            <a:endParaRPr lang="ja-JP" altLang="en-US" sz="1400" dirty="0"/>
+          </a:p>
+        </p:txBody>
+      </p:sp>
+      <p:sp>
+        <p:nvSpPr>
+          <p:cNvPr id="6" name="四角形: メモ 5">
+            <a:extLst>
+              <a:ext uri="{FF2B5EF4-FFF2-40B4-BE49-F238E27FC236}">
+                <a16:creationId xmlns:a16="http://schemas.microsoft.com/office/drawing/2014/main" id="{E2B70597-C7A2-9C2D-D0B6-5A37ECF26275}"/>
+              </a:ext>
+            </a:extLst>
+          </p:cNvPr>
+          <p:cNvSpPr/>
+          <p:nvPr/>
+        </p:nvSpPr>
+        <p:spPr>
+          <a:xfrm>
+            <a:off x="6217921" y="1080149"/>
+            <a:ext cx="755703" cy="755703"/>
+          </a:xfrm>
+          <a:prstGeom prst="foldedCorner">
+            <a:avLst/>
+          </a:prstGeom>
+          <a:ln>
+            <a:headEnd type="none" w="med" len="med"/>
+            <a:tailEnd type="none" w="med" len="med"/>
+          </a:ln>
+        </p:spPr>
+        <p:style>
+          <a:lnRef idx="1">
+            <a:schemeClr val="accent1"/>
+          </a:lnRef>
+          <a:fillRef idx="2">
+            <a:schemeClr val="accent1"/>
+          </a:fillRef>
+          <a:effectRef idx="1">
+            <a:schemeClr val="accent1"/>
+          </a:effectRef>
+          <a:fontRef idx="minor">
+            <a:schemeClr val="dk1"/>
+          </a:fontRef>
+        </p:style>
+        <p:txBody>
+          <a:bodyPr wrap="none" rtlCol="0" anchor="ctr"/>
+          <a:lstStyle/>
+          <a:p>
+            <a:pPr algn="ctr"/>
+            <a:r>
+              <a:rPr kumimoji="1" lang="en-US" altLang="ja-JP" sz="1200" dirty="0">
+                <a:solidFill>
+                  <a:schemeClr val="dk1"/>
+                </a:solidFill>
+              </a:rPr>
+              <a:t>Instruct</a:t>
+            </a:r>
+          </a:p>
+        </p:txBody>
+      </p:sp>
+      <p:sp>
+        <p:nvSpPr>
+          <p:cNvPr id="7" name="四角形: 角を丸くする 6">
+            <a:extLst>
+              <a:ext uri="{FF2B5EF4-FFF2-40B4-BE49-F238E27FC236}">
+                <a16:creationId xmlns:a16="http://schemas.microsoft.com/office/drawing/2014/main" id="{88F5743B-4A94-4429-0EFE-3A01306BF987}"/>
+              </a:ext>
+            </a:extLst>
+          </p:cNvPr>
+          <p:cNvSpPr/>
+          <p:nvPr/>
+        </p:nvSpPr>
+        <p:spPr>
+          <a:xfrm>
+            <a:off x="5758232" y="706295"/>
+            <a:ext cx="3997303" cy="1633308"/>
+          </a:xfrm>
+          <a:prstGeom prst="roundRect">
+            <a:avLst>
+              <a:gd name="adj" fmla="val 7301"/>
+            </a:avLst>
+          </a:prstGeom>
+          <a:noFill/>
+          <a:ln>
+            <a:solidFill>
+              <a:schemeClr val="accent1"/>
+            </a:solidFill>
+          </a:ln>
+        </p:spPr>
+        <p:style>
+          <a:lnRef idx="2">
+            <a:schemeClr val="accent6"/>
+          </a:lnRef>
+          <a:fillRef idx="1">
+            <a:schemeClr val="lt1"/>
+          </a:fillRef>
+          <a:effectRef idx="0">
+            <a:schemeClr val="accent6"/>
+          </a:effectRef>
+          <a:fontRef idx="minor">
+            <a:schemeClr val="dk1"/>
+          </a:fontRef>
+        </p:style>
+        <p:txBody>
+          <a:bodyPr rtlCol="0" anchor="t"/>
+          <a:lstStyle/>
+          <a:p>
+            <a:r>
+              <a:rPr lang="ja-JP" altLang="en-US" sz="1400" dirty="0"/>
+              <a:t>お天気エージェント</a:t>
+            </a:r>
+            <a:endParaRPr kumimoji="1" lang="ja-JP" altLang="en-US" sz="1400" dirty="0"/>
+          </a:p>
+        </p:txBody>
+      </p:sp>
+      <p:pic>
+        <p:nvPicPr>
+          <p:cNvPr id="1026" name="Picture 2" descr="Bingの評判を全7件のユーザーレビュー・口コミで紹介">
+            <a:extLst>
+              <a:ext uri="{FF2B5EF4-FFF2-40B4-BE49-F238E27FC236}">
+                <a16:creationId xmlns:a16="http://schemas.microsoft.com/office/drawing/2014/main" id="{9B981825-9673-546B-1144-FFF47F5AF109}"/>
+              </a:ext>
+            </a:extLst>
+          </p:cNvPr>
+          <p:cNvPicPr>
+            <a:picLocks noChangeAspect="1" noChangeArrowheads="1"/>
+          </p:cNvPicPr>
+          <p:nvPr/>
+        </p:nvPicPr>
+        <p:blipFill>
+          <a:blip r:embed="rId3">
+            <a:clrChange>
+              <a:clrFrom>
+                <a:srgbClr val="FFFFFF"/>
+              </a:clrFrom>
+              <a:clrTo>
+                <a:srgbClr val="FFFFFF">
+                  <a:alpha val="0"/>
+                </a:srgbClr>
+              </a:clrTo>
+            </a:clrChange>
+            <a:extLst>
+              <a:ext uri="{28A0092B-C50C-407E-A947-70E740481C1C}">
+                <a14:useLocalDpi xmlns:a14="http://schemas.microsoft.com/office/drawing/2010/main" val="0"/>
+              </a:ext>
+            </a:extLst>
+          </a:blip>
+          <a:srcRect/>
+          <a:stretch>
+            <a:fillRect/>
+          </a:stretch>
+        </p:blipFill>
+        <p:spPr bwMode="auto">
+          <a:xfrm>
+            <a:off x="8278088" y="1672449"/>
+            <a:ext cx="1185151" cy="474061"/>
+          </a:xfrm>
+          <a:prstGeom prst="rect">
+            <a:avLst/>
+          </a:prstGeom>
+          <a:noFill/>
+          <a:extLst>
+            <a:ext uri="{909E8E84-426E-40DD-AFC4-6F175D3DCCD1}">
+              <a14:hiddenFill xmlns:a14="http://schemas.microsoft.com/office/drawing/2010/main">
+                <a:solidFill>
+                  <a:srgbClr val="FFFFFF"/>
+                </a:solidFill>
+              </a14:hiddenFill>
+            </a:ext>
+          </a:extLst>
+        </p:spPr>
+      </p:pic>
+      <p:pic>
+        <p:nvPicPr>
+          <p:cNvPr id="8" name="Picture 2" descr="Using Azure Search for vector search with Azure OpenAI and LangChain ·  Clemens Siebler's Blog">
+            <a:extLst>
+              <a:ext uri="{FF2B5EF4-FFF2-40B4-BE49-F238E27FC236}">
+                <a16:creationId xmlns:a16="http://schemas.microsoft.com/office/drawing/2014/main" id="{D3BCEDF0-4D00-F4C7-022B-491B21BF24E7}"/>
+              </a:ext>
+            </a:extLst>
+          </p:cNvPr>
+          <p:cNvPicPr>
+            <a:picLocks noChangeAspect="1" noChangeArrowheads="1"/>
+          </p:cNvPicPr>
+          <p:nvPr/>
+        </p:nvPicPr>
+        <p:blipFill rotWithShape="1">
+          <a:blip r:embed="rId4">
+            <a:clrChange>
+              <a:clrFrom>
+                <a:srgbClr val="FFFFFF"/>
+              </a:clrFrom>
+              <a:clrTo>
+                <a:srgbClr val="FFFFFF">
+                  <a:alpha val="0"/>
+                </a:srgbClr>
+              </a:clrTo>
+            </a:clrChange>
+            <a:extLst>
+              <a:ext uri="{28A0092B-C50C-407E-A947-70E740481C1C}">
+                <a14:useLocalDpi xmlns:a14="http://schemas.microsoft.com/office/drawing/2010/main"/>
+              </a:ext>
+            </a:extLst>
+          </a:blip>
+          <a:srcRect/>
+          <a:stretch/>
+        </p:blipFill>
+        <p:spPr bwMode="auto">
+          <a:xfrm>
+            <a:off x="8144263" y="1033160"/>
+            <a:ext cx="647531" cy="489772"/>
+          </a:xfrm>
+          <a:prstGeom prst="rect">
+            <a:avLst/>
+          </a:prstGeom>
+          <a:noFill/>
+          <a:extLst>
+            <a:ext uri="{909E8E84-426E-40DD-AFC4-6F175D3DCCD1}">
+              <a14:hiddenFill xmlns:a14="http://schemas.microsoft.com/office/drawing/2010/main">
+                <a:solidFill>
+                  <a:srgbClr val="FFFFFF"/>
+                </a:solidFill>
+              </a14:hiddenFill>
+            </a:ext>
+          </a:extLst>
+        </p:spPr>
+      </p:pic>
+      <p:sp>
+        <p:nvSpPr>
+          <p:cNvPr id="9" name="テキスト ボックス 8">
+            <a:extLst>
+              <a:ext uri="{FF2B5EF4-FFF2-40B4-BE49-F238E27FC236}">
+                <a16:creationId xmlns:a16="http://schemas.microsoft.com/office/drawing/2014/main" id="{ED9DFC8B-5860-0F2E-15A7-03A2104849E4}"/>
+              </a:ext>
+            </a:extLst>
+          </p:cNvPr>
+          <p:cNvSpPr txBox="1"/>
+          <p:nvPr/>
+        </p:nvSpPr>
+        <p:spPr>
+          <a:xfrm>
+            <a:off x="8791794" y="1056616"/>
+            <a:ext cx="886781" cy="369332"/>
+          </a:xfrm>
+          <a:prstGeom prst="rect">
+            <a:avLst/>
+          </a:prstGeom>
+          <a:noFill/>
+        </p:spPr>
+        <p:txBody>
+          <a:bodyPr wrap="none" rtlCol="0">
+            <a:spAutoFit/>
+          </a:bodyPr>
+          <a:lstStyle/>
+          <a:p>
+            <a:r>
+              <a:rPr lang="en-US" altLang="ja-JP" dirty="0"/>
+              <a:t>g</a:t>
+            </a:r>
+            <a:r>
+              <a:rPr kumimoji="1" lang="en-US" altLang="ja-JP" dirty="0"/>
+              <a:t>pt-4o</a:t>
+            </a:r>
+            <a:endParaRPr kumimoji="1" lang="ja-JP" altLang="en-US" dirty="0"/>
+          </a:p>
+        </p:txBody>
+      </p:sp>
+      <p:cxnSp>
+        <p:nvCxnSpPr>
+          <p:cNvPr id="10" name="直線矢印コネクタ 9">
+            <a:extLst>
+              <a:ext uri="{FF2B5EF4-FFF2-40B4-BE49-F238E27FC236}">
+                <a16:creationId xmlns:a16="http://schemas.microsoft.com/office/drawing/2014/main" id="{D73FBAAD-ED03-A7EE-E960-23A24A1303E8}"/>
+              </a:ext>
+            </a:extLst>
+          </p:cNvPr>
+          <p:cNvCxnSpPr>
+            <a:cxnSpLocks/>
+          </p:cNvCxnSpPr>
+          <p:nvPr/>
+        </p:nvCxnSpPr>
+        <p:spPr>
+          <a:xfrm flipV="1">
+            <a:off x="7139390" y="1427785"/>
+            <a:ext cx="921326" cy="190294"/>
+          </a:xfrm>
+          <a:prstGeom prst="straightConnector1">
+            <a:avLst/>
+          </a:prstGeom>
+          <a:ln w="28575">
+            <a:solidFill>
+              <a:schemeClr val="accent1"/>
+            </a:solidFill>
+            <a:prstDash val="dash"/>
+            <a:headEnd type="none" w="med" len="med"/>
+            <a:tailEnd type="arrow" w="med" len="med"/>
+          </a:ln>
+        </p:spPr>
+        <p:style>
+          <a:lnRef idx="1">
+            <a:schemeClr val="accent1"/>
+          </a:lnRef>
+          <a:fillRef idx="0">
+            <a:schemeClr val="accent1"/>
+          </a:fillRef>
+          <a:effectRef idx="0">
+            <a:schemeClr val="accent1"/>
+          </a:effectRef>
+          <a:fontRef idx="minor">
+            <a:schemeClr val="tx1"/>
+          </a:fontRef>
+        </p:style>
+      </p:cxnSp>
+      <p:pic>
+        <p:nvPicPr>
+          <p:cNvPr id="5" name="Graphic 54" descr="ソリッドフィル付きロボット">
+            <a:extLst>
+              <a:ext uri="{FF2B5EF4-FFF2-40B4-BE49-F238E27FC236}">
+                <a16:creationId xmlns:a16="http://schemas.microsoft.com/office/drawing/2014/main" id="{86040671-1DFF-AFDD-46E7-3297C1D4AE1A}"/>
+              </a:ext>
+            </a:extLst>
+          </p:cNvPr>
+          <p:cNvPicPr>
+            <a:picLocks noChangeAspect="1"/>
+          </p:cNvPicPr>
+          <p:nvPr/>
+        </p:nvPicPr>
+        <p:blipFill>
+          <a:blip r:embed="rId5">
+            <a:extLst>
+              <a:ext uri="{96DAC541-7B7A-43D3-8B79-37D633B846F1}">
+                <asvg:svgBlip xmlns:asvg="http://schemas.microsoft.com/office/drawing/2016/SVG/main" r:embed="rId6"/>
+              </a:ext>
+            </a:extLst>
+          </a:blip>
+          <a:stretch>
+            <a:fillRect/>
+          </a:stretch>
+        </p:blipFill>
+        <p:spPr>
+          <a:xfrm>
+            <a:off x="5779978" y="1368326"/>
+            <a:ext cx="718873" cy="718873"/>
+          </a:xfrm>
+          <a:prstGeom prst="rect">
+            <a:avLst/>
+          </a:prstGeom>
+        </p:spPr>
+      </p:pic>
+      <p:cxnSp>
+        <p:nvCxnSpPr>
+          <p:cNvPr id="12" name="直線矢印コネクタ 11">
+            <a:extLst>
+              <a:ext uri="{FF2B5EF4-FFF2-40B4-BE49-F238E27FC236}">
+                <a16:creationId xmlns:a16="http://schemas.microsoft.com/office/drawing/2014/main" id="{E734E147-F32F-872B-104F-13BD03559552}"/>
+              </a:ext>
+            </a:extLst>
+          </p:cNvPr>
+          <p:cNvCxnSpPr>
+            <a:cxnSpLocks/>
+          </p:cNvCxnSpPr>
+          <p:nvPr/>
+        </p:nvCxnSpPr>
+        <p:spPr>
+          <a:xfrm>
+            <a:off x="7146962" y="1736850"/>
+            <a:ext cx="921326" cy="190294"/>
+          </a:xfrm>
+          <a:prstGeom prst="straightConnector1">
+            <a:avLst/>
+          </a:prstGeom>
+          <a:ln w="28575">
+            <a:solidFill>
+              <a:schemeClr val="accent1"/>
+            </a:solidFill>
+            <a:prstDash val="dash"/>
+            <a:headEnd type="none" w="med" len="med"/>
+            <a:tailEnd type="arrow" w="med" len="med"/>
+          </a:ln>
+        </p:spPr>
+        <p:style>
+          <a:lnRef idx="1">
+            <a:schemeClr val="accent1"/>
+          </a:lnRef>
+          <a:fillRef idx="0">
+            <a:schemeClr val="accent1"/>
+          </a:fillRef>
+          <a:effectRef idx="0">
+            <a:schemeClr val="accent1"/>
+          </a:effectRef>
+          <a:fontRef idx="minor">
+            <a:schemeClr val="tx1"/>
+          </a:fontRef>
+        </p:style>
+      </p:cxnSp>
+      <p:sp>
+        <p:nvSpPr>
+          <p:cNvPr id="15" name="四角形: 角を丸くする 14">
+            <a:extLst>
+              <a:ext uri="{FF2B5EF4-FFF2-40B4-BE49-F238E27FC236}">
+                <a16:creationId xmlns:a16="http://schemas.microsoft.com/office/drawing/2014/main" id="{E53E5D55-05DA-841E-6330-2C89E5719BBF}"/>
+              </a:ext>
+            </a:extLst>
+          </p:cNvPr>
+          <p:cNvSpPr/>
+          <p:nvPr/>
+        </p:nvSpPr>
+        <p:spPr>
+          <a:xfrm>
+            <a:off x="2999071" y="2294773"/>
+            <a:ext cx="1223404" cy="604237"/>
+          </a:xfrm>
+          <a:prstGeom prst="roundRect">
+            <a:avLst/>
+          </a:prstGeom>
+        </p:spPr>
+        <p:style>
+          <a:lnRef idx="1">
+            <a:schemeClr val="accent1"/>
+          </a:lnRef>
+          <a:fillRef idx="2">
+            <a:schemeClr val="accent1"/>
+          </a:fillRef>
+          <a:effectRef idx="1">
+            <a:schemeClr val="accent1"/>
+          </a:effectRef>
+          <a:fontRef idx="minor">
+            <a:schemeClr val="dk1"/>
+          </a:fontRef>
+        </p:style>
+        <p:txBody>
+          <a:bodyPr rtlCol="0" anchor="ctr"/>
+          <a:lstStyle/>
+          <a:p>
+            <a:pPr algn="ctr"/>
+            <a:r>
+              <a:rPr kumimoji="1" lang="en-US" altLang="ja-JP" sz="1400" dirty="0"/>
+              <a:t>AI Foundry</a:t>
+            </a:r>
+            <a:br>
+              <a:rPr kumimoji="1" lang="en-US" altLang="ja-JP" sz="1400" dirty="0"/>
+            </a:br>
+            <a:r>
+              <a:rPr kumimoji="1" lang="en-US" altLang="ja-JP" sz="1400" dirty="0"/>
+              <a:t>SDK</a:t>
+            </a:r>
+            <a:endParaRPr kumimoji="1" lang="ja-JP" altLang="en-US" sz="1400" dirty="0"/>
+          </a:p>
+        </p:txBody>
+      </p:sp>
+      <p:sp>
+        <p:nvSpPr>
+          <p:cNvPr id="16" name="四角形: メモ 15">
+            <a:extLst>
+              <a:ext uri="{FF2B5EF4-FFF2-40B4-BE49-F238E27FC236}">
+                <a16:creationId xmlns:a16="http://schemas.microsoft.com/office/drawing/2014/main" id="{F2C2B7A4-BFF7-A1DD-9B3A-38D86B4141ED}"/>
+              </a:ext>
+            </a:extLst>
+          </p:cNvPr>
+          <p:cNvSpPr/>
+          <p:nvPr/>
+        </p:nvSpPr>
+        <p:spPr>
+          <a:xfrm>
+            <a:off x="1854644" y="2183223"/>
+            <a:ext cx="755703" cy="755703"/>
+          </a:xfrm>
+          <a:prstGeom prst="foldedCorner">
+            <a:avLst/>
+          </a:prstGeom>
+          <a:ln>
+            <a:headEnd type="none" w="med" len="med"/>
+            <a:tailEnd type="none" w="med" len="med"/>
+          </a:ln>
+        </p:spPr>
+        <p:style>
+          <a:lnRef idx="1">
+            <a:schemeClr val="accent1"/>
+          </a:lnRef>
+          <a:fillRef idx="2">
+            <a:schemeClr val="accent1"/>
+          </a:fillRef>
+          <a:effectRef idx="1">
+            <a:schemeClr val="accent1"/>
+          </a:effectRef>
+          <a:fontRef idx="minor">
+            <a:schemeClr val="dk1"/>
+          </a:fontRef>
+        </p:style>
+        <p:txBody>
+          <a:bodyPr wrap="none" rtlCol="0" anchor="ctr"/>
+          <a:lstStyle/>
+          <a:p>
+            <a:pPr algn="ctr"/>
+            <a:r>
+              <a:rPr lang="en-US" altLang="ja-JP" sz="1200" dirty="0"/>
+              <a:t>Code</a:t>
+            </a:r>
+            <a:endParaRPr kumimoji="1" lang="en-US" altLang="ja-JP" sz="1200" dirty="0">
+              <a:solidFill>
+                <a:schemeClr val="dk1"/>
+              </a:solidFill>
+            </a:endParaRPr>
+          </a:p>
+        </p:txBody>
+      </p:sp>
+      <p:cxnSp>
+        <p:nvCxnSpPr>
+          <p:cNvPr id="17" name="直線矢印コネクタ 16">
+            <a:extLst>
+              <a:ext uri="{FF2B5EF4-FFF2-40B4-BE49-F238E27FC236}">
+                <a16:creationId xmlns:a16="http://schemas.microsoft.com/office/drawing/2014/main" id="{84D3ADB9-748E-5693-F56E-9AF245B5225C}"/>
+              </a:ext>
+            </a:extLst>
+          </p:cNvPr>
+          <p:cNvCxnSpPr>
+            <a:cxnSpLocks/>
+            <a:stCxn id="15" idx="3"/>
+          </p:cNvCxnSpPr>
+          <p:nvPr/>
+        </p:nvCxnSpPr>
+        <p:spPr>
+          <a:xfrm flipV="1">
+            <a:off x="4222475" y="1812508"/>
+            <a:ext cx="1693152" cy="784384"/>
+          </a:xfrm>
+          <a:prstGeom prst="straightConnector1">
+            <a:avLst/>
+          </a:prstGeom>
+          <a:ln w="28575">
+            <a:solidFill>
+              <a:schemeClr val="accent1"/>
+            </a:solidFill>
+            <a:headEnd type="none" w="med" len="med"/>
+            <a:tailEnd type="arrow" w="med" len="med"/>
+          </a:ln>
+        </p:spPr>
+        <p:style>
+          <a:lnRef idx="1">
+            <a:schemeClr val="accent1"/>
+          </a:lnRef>
+          <a:fillRef idx="0">
+            <a:schemeClr val="accent1"/>
+          </a:fillRef>
+          <a:effectRef idx="0">
+            <a:schemeClr val="accent1"/>
+          </a:effectRef>
+          <a:fontRef idx="minor">
+            <a:schemeClr val="tx1"/>
+          </a:fontRef>
+        </p:style>
+      </p:cxnSp>
+      <p:cxnSp>
+        <p:nvCxnSpPr>
+          <p:cNvPr id="19" name="直線矢印コネクタ 18">
+            <a:extLst>
+              <a:ext uri="{FF2B5EF4-FFF2-40B4-BE49-F238E27FC236}">
+                <a16:creationId xmlns:a16="http://schemas.microsoft.com/office/drawing/2014/main" id="{0993F481-0299-77E8-3B41-FE1DBBDAD6E0}"/>
+              </a:ext>
+            </a:extLst>
+          </p:cNvPr>
+          <p:cNvCxnSpPr>
+            <a:cxnSpLocks/>
+          </p:cNvCxnSpPr>
+          <p:nvPr/>
+        </p:nvCxnSpPr>
+        <p:spPr>
+          <a:xfrm>
+            <a:off x="2544725" y="2635089"/>
+            <a:ext cx="572070" cy="181"/>
+          </a:xfrm>
+          <a:prstGeom prst="straightConnector1">
+            <a:avLst/>
+          </a:prstGeom>
+          <a:ln w="28575">
+            <a:solidFill>
+              <a:schemeClr val="accent1"/>
+            </a:solidFill>
+            <a:prstDash val="dash"/>
+            <a:headEnd type="none" w="med" len="med"/>
+            <a:tailEnd type="arrow" w="med" len="med"/>
+          </a:ln>
+        </p:spPr>
+        <p:style>
+          <a:lnRef idx="1">
+            <a:schemeClr val="accent1"/>
+          </a:lnRef>
+          <a:fillRef idx="0">
+            <a:schemeClr val="accent1"/>
+          </a:fillRef>
+          <a:effectRef idx="0">
+            <a:schemeClr val="accent1"/>
+          </a:effectRef>
+          <a:fontRef idx="minor">
+            <a:schemeClr val="tx1"/>
+          </a:fontRef>
+        </p:style>
+      </p:cxnSp>
+      <p:pic>
+        <p:nvPicPr>
+          <p:cNvPr id="23" name="図 22">
+            <a:extLst>
+              <a:ext uri="{FF2B5EF4-FFF2-40B4-BE49-F238E27FC236}">
+                <a16:creationId xmlns:a16="http://schemas.microsoft.com/office/drawing/2014/main" id="{B2C8774C-1079-B143-2D63-3803EFC736DC}"/>
+              </a:ext>
+            </a:extLst>
+          </p:cNvPr>
+          <p:cNvPicPr>
+            <a:picLocks noChangeAspect="1"/>
+          </p:cNvPicPr>
+          <p:nvPr/>
+        </p:nvPicPr>
+        <p:blipFill>
+          <a:blip r:embed="rId7">
+            <a:extLst>
+              <a:ext uri="{28A0092B-C50C-407E-A947-70E740481C1C}">
+                <a14:useLocalDpi xmlns:a14="http://schemas.microsoft.com/office/drawing/2010/main" val="0"/>
+              </a:ext>
+            </a:extLst>
+          </a:blip>
+          <a:stretch>
+            <a:fillRect/>
+          </a:stretch>
+        </p:blipFill>
+        <p:spPr>
+          <a:xfrm>
+            <a:off x="4737605" y="2193802"/>
+            <a:ext cx="644868" cy="644868"/>
+          </a:xfrm>
+          <a:prstGeom prst="rect">
+            <a:avLst/>
+          </a:prstGeom>
+        </p:spPr>
+      </p:pic>
+      <p:sp>
+        <p:nvSpPr>
+          <p:cNvPr id="11" name="四角形: メモ 10">
+            <a:extLst>
+              <a:ext uri="{FF2B5EF4-FFF2-40B4-BE49-F238E27FC236}">
+                <a16:creationId xmlns:a16="http://schemas.microsoft.com/office/drawing/2014/main" id="{1FFAE955-1A84-B6F5-30C5-29760EF822E3}"/>
+              </a:ext>
+            </a:extLst>
+          </p:cNvPr>
+          <p:cNvSpPr/>
+          <p:nvPr/>
+        </p:nvSpPr>
+        <p:spPr>
+          <a:xfrm>
+            <a:off x="6217921" y="2862974"/>
+            <a:ext cx="755703" cy="755703"/>
+          </a:xfrm>
+          <a:prstGeom prst="foldedCorner">
+            <a:avLst/>
+          </a:prstGeom>
+          <a:ln>
+            <a:headEnd type="none" w="med" len="med"/>
+            <a:tailEnd type="none" w="med" len="med"/>
+          </a:ln>
+        </p:spPr>
+        <p:style>
+          <a:lnRef idx="1">
+            <a:schemeClr val="accent6"/>
+          </a:lnRef>
+          <a:fillRef idx="2">
+            <a:schemeClr val="accent6"/>
+          </a:fillRef>
+          <a:effectRef idx="1">
+            <a:schemeClr val="accent6"/>
+          </a:effectRef>
+          <a:fontRef idx="minor">
+            <a:schemeClr val="dk1"/>
+          </a:fontRef>
+        </p:style>
+        <p:txBody>
+          <a:bodyPr wrap="none" rtlCol="0" anchor="ctr"/>
+          <a:lstStyle/>
+          <a:p>
+            <a:pPr algn="ctr"/>
+            <a:r>
+              <a:rPr kumimoji="1" lang="en-US" altLang="ja-JP" sz="1200" dirty="0">
+                <a:solidFill>
+                  <a:schemeClr val="dk1"/>
+                </a:solidFill>
+              </a:rPr>
+              <a:t>Instruct</a:t>
+            </a:r>
+          </a:p>
+        </p:txBody>
+      </p:sp>
+      <p:sp>
+        <p:nvSpPr>
+          <p:cNvPr id="13" name="四角形: 角を丸くする 12">
+            <a:extLst>
+              <a:ext uri="{FF2B5EF4-FFF2-40B4-BE49-F238E27FC236}">
+                <a16:creationId xmlns:a16="http://schemas.microsoft.com/office/drawing/2014/main" id="{C49A3A60-A368-8AC0-3865-6D6FE94A3C6E}"/>
+              </a:ext>
+            </a:extLst>
+          </p:cNvPr>
+          <p:cNvSpPr/>
+          <p:nvPr/>
+        </p:nvSpPr>
+        <p:spPr>
+          <a:xfrm>
+            <a:off x="5758232" y="2489120"/>
+            <a:ext cx="3997303" cy="1427034"/>
+          </a:xfrm>
+          <a:prstGeom prst="roundRect">
+            <a:avLst>
+              <a:gd name="adj" fmla="val 7301"/>
+            </a:avLst>
+          </a:prstGeom>
+          <a:noFill/>
+          <a:ln>
+            <a:solidFill>
+              <a:schemeClr val="accent1"/>
+            </a:solidFill>
+          </a:ln>
+        </p:spPr>
+        <p:style>
+          <a:lnRef idx="2">
+            <a:schemeClr val="accent6"/>
+          </a:lnRef>
+          <a:fillRef idx="1">
+            <a:schemeClr val="lt1"/>
+          </a:fillRef>
+          <a:effectRef idx="0">
+            <a:schemeClr val="accent6"/>
+          </a:effectRef>
+          <a:fontRef idx="minor">
+            <a:schemeClr val="dk1"/>
+          </a:fontRef>
+        </p:style>
+        <p:txBody>
+          <a:bodyPr rtlCol="0" anchor="t"/>
+          <a:lstStyle/>
+          <a:p>
+            <a:r>
+              <a:rPr lang="ja-JP" altLang="en-US" sz="1400" dirty="0"/>
+              <a:t>服装コーディネーターエージェント</a:t>
+            </a:r>
+            <a:endParaRPr kumimoji="1" lang="ja-JP" altLang="en-US" sz="1400" dirty="0"/>
+          </a:p>
+        </p:txBody>
+      </p:sp>
+      <p:pic>
+        <p:nvPicPr>
+          <p:cNvPr id="18" name="Picture 2" descr="Using Azure Search for vector search with Azure OpenAI and LangChain ·  Clemens Siebler's Blog">
+            <a:extLst>
+              <a:ext uri="{FF2B5EF4-FFF2-40B4-BE49-F238E27FC236}">
+                <a16:creationId xmlns:a16="http://schemas.microsoft.com/office/drawing/2014/main" id="{EF46826E-A069-0668-CFC9-F9811044E2BA}"/>
+              </a:ext>
+            </a:extLst>
+          </p:cNvPr>
+          <p:cNvPicPr>
+            <a:picLocks noChangeAspect="1" noChangeArrowheads="1"/>
+          </p:cNvPicPr>
+          <p:nvPr/>
+        </p:nvPicPr>
+        <p:blipFill rotWithShape="1">
+          <a:blip r:embed="rId4">
+            <a:clrChange>
+              <a:clrFrom>
+                <a:srgbClr val="FFFFFF"/>
+              </a:clrFrom>
+              <a:clrTo>
+                <a:srgbClr val="FFFFFF">
+                  <a:alpha val="0"/>
+                </a:srgbClr>
+              </a:clrTo>
+            </a:clrChange>
+            <a:extLst>
+              <a:ext uri="{28A0092B-C50C-407E-A947-70E740481C1C}">
+                <a14:useLocalDpi xmlns:a14="http://schemas.microsoft.com/office/drawing/2010/main"/>
+              </a:ext>
+            </a:extLst>
+          </a:blip>
+          <a:srcRect/>
+          <a:stretch/>
+        </p:blipFill>
+        <p:spPr bwMode="auto">
+          <a:xfrm>
+            <a:off x="8223132" y="2868518"/>
+            <a:ext cx="647531" cy="489772"/>
+          </a:xfrm>
+          <a:prstGeom prst="rect">
+            <a:avLst/>
+          </a:prstGeom>
+          <a:noFill/>
+          <a:extLst>
+            <a:ext uri="{909E8E84-426E-40DD-AFC4-6F175D3DCCD1}">
+              <a14:hiddenFill xmlns:a14="http://schemas.microsoft.com/office/drawing/2010/main">
+                <a:solidFill>
+                  <a:srgbClr val="FFFFFF"/>
+                </a:solidFill>
+              </a14:hiddenFill>
+            </a:ext>
+          </a:extLst>
+        </p:spPr>
+      </p:pic>
+      <p:sp>
+        <p:nvSpPr>
+          <p:cNvPr id="20" name="テキスト ボックス 19">
+            <a:extLst>
+              <a:ext uri="{FF2B5EF4-FFF2-40B4-BE49-F238E27FC236}">
+                <a16:creationId xmlns:a16="http://schemas.microsoft.com/office/drawing/2014/main" id="{713E04C1-1AE8-AED7-EB72-B7E90BC3BA69}"/>
+              </a:ext>
+            </a:extLst>
+          </p:cNvPr>
+          <p:cNvSpPr txBox="1"/>
+          <p:nvPr/>
+        </p:nvSpPr>
+        <p:spPr>
+          <a:xfrm>
+            <a:off x="8223132" y="3291141"/>
+            <a:ext cx="1443024" cy="369332"/>
+          </a:xfrm>
+          <a:prstGeom prst="rect">
+            <a:avLst/>
+          </a:prstGeom>
+          <a:noFill/>
+        </p:spPr>
+        <p:txBody>
+          <a:bodyPr wrap="none" rtlCol="0">
+            <a:spAutoFit/>
+          </a:bodyPr>
+          <a:lstStyle/>
+          <a:p>
+            <a:r>
+              <a:rPr lang="en-US" altLang="ja-JP" dirty="0"/>
+              <a:t>g</a:t>
+            </a:r>
+            <a:r>
+              <a:rPr kumimoji="1" lang="en-US" altLang="ja-JP" dirty="0"/>
+              <a:t>pt-4o-mini</a:t>
+            </a:r>
+            <a:endParaRPr kumimoji="1" lang="ja-JP" altLang="en-US" dirty="0"/>
+          </a:p>
+        </p:txBody>
+      </p:sp>
+      <p:cxnSp>
+        <p:nvCxnSpPr>
+          <p:cNvPr id="21" name="直線矢印コネクタ 20">
+            <a:extLst>
+              <a:ext uri="{FF2B5EF4-FFF2-40B4-BE49-F238E27FC236}">
+                <a16:creationId xmlns:a16="http://schemas.microsoft.com/office/drawing/2014/main" id="{E6242083-90EF-975B-26B3-D8905711DD16}"/>
+              </a:ext>
+            </a:extLst>
+          </p:cNvPr>
+          <p:cNvCxnSpPr>
+            <a:cxnSpLocks/>
+          </p:cNvCxnSpPr>
+          <p:nvPr/>
+        </p:nvCxnSpPr>
+        <p:spPr>
+          <a:xfrm flipV="1">
+            <a:off x="7139390" y="3305706"/>
+            <a:ext cx="921326" cy="103"/>
+          </a:xfrm>
+          <a:prstGeom prst="straightConnector1">
+            <a:avLst/>
+          </a:prstGeom>
+          <a:ln w="28575">
+            <a:solidFill>
+              <a:schemeClr val="accent1"/>
+            </a:solidFill>
+            <a:prstDash val="dash"/>
+            <a:headEnd type="none" w="med" len="med"/>
+            <a:tailEnd type="arrow" w="med" len="med"/>
+          </a:ln>
+        </p:spPr>
+        <p:style>
+          <a:lnRef idx="1">
+            <a:schemeClr val="accent1"/>
+          </a:lnRef>
+          <a:fillRef idx="0">
+            <a:schemeClr val="accent1"/>
+          </a:fillRef>
+          <a:effectRef idx="0">
+            <a:schemeClr val="accent1"/>
+          </a:effectRef>
+          <a:fontRef idx="minor">
+            <a:schemeClr val="tx1"/>
+          </a:fontRef>
+        </p:style>
+      </p:cxnSp>
+      <p:pic>
+        <p:nvPicPr>
+          <p:cNvPr id="22" name="Graphic 54" descr="ソリッドフィル付きロボット">
+            <a:extLst>
+              <a:ext uri="{FF2B5EF4-FFF2-40B4-BE49-F238E27FC236}">
+                <a16:creationId xmlns:a16="http://schemas.microsoft.com/office/drawing/2014/main" id="{94B09771-6AD4-716F-C296-D7DDE262F384}"/>
+              </a:ext>
+            </a:extLst>
+          </p:cNvPr>
+          <p:cNvPicPr>
+            <a:picLocks noChangeAspect="1"/>
+          </p:cNvPicPr>
+          <p:nvPr/>
+        </p:nvPicPr>
+        <p:blipFill>
+          <a:blip r:embed="rId8">
+            <a:extLst>
+              <a:ext uri="{96DAC541-7B7A-43D3-8B79-37D633B846F1}">
+                <asvg:svgBlip xmlns:asvg="http://schemas.microsoft.com/office/drawing/2016/SVG/main" r:embed="rId9"/>
+              </a:ext>
+            </a:extLst>
+          </a:blip>
+          <a:stretch>
+            <a:fillRect/>
+          </a:stretch>
+        </p:blipFill>
+        <p:spPr>
+          <a:xfrm>
+            <a:off x="5779978" y="3151151"/>
+            <a:ext cx="718873" cy="718873"/>
+          </a:xfrm>
+          <a:prstGeom prst="rect">
+            <a:avLst/>
+          </a:prstGeom>
+        </p:spPr>
+      </p:pic>
+      <p:cxnSp>
+        <p:nvCxnSpPr>
+          <p:cNvPr id="26" name="直線矢印コネクタ 25">
+            <a:extLst>
+              <a:ext uri="{FF2B5EF4-FFF2-40B4-BE49-F238E27FC236}">
+                <a16:creationId xmlns:a16="http://schemas.microsoft.com/office/drawing/2014/main" id="{568A8556-0E8F-D965-C9DD-4722D3EB6827}"/>
+              </a:ext>
+            </a:extLst>
+          </p:cNvPr>
+          <p:cNvCxnSpPr>
+            <a:cxnSpLocks/>
+            <a:stCxn id="15" idx="3"/>
+          </p:cNvCxnSpPr>
+          <p:nvPr/>
+        </p:nvCxnSpPr>
+        <p:spPr>
+          <a:xfrm>
+            <a:off x="4222475" y="2596892"/>
+            <a:ext cx="1693152" cy="923123"/>
+          </a:xfrm>
+          <a:prstGeom prst="straightConnector1">
+            <a:avLst/>
+          </a:prstGeom>
+          <a:ln w="28575">
+            <a:solidFill>
+              <a:schemeClr val="accent1"/>
+            </a:solidFill>
+            <a:headEnd type="none" w="med" len="med"/>
+            <a:tailEnd type="arrow" w="med" len="med"/>
+          </a:ln>
+        </p:spPr>
+        <p:style>
+          <a:lnRef idx="1">
+            <a:schemeClr val="accent1"/>
+          </a:lnRef>
+          <a:fillRef idx="0">
+            <a:schemeClr val="accent1"/>
+          </a:fillRef>
+          <a:effectRef idx="0">
+            <a:schemeClr val="accent1"/>
+          </a:effectRef>
+          <a:fontRef idx="minor">
+            <a:schemeClr val="tx1"/>
+          </a:fontRef>
+        </p:style>
+      </p:cxnSp>
+    </p:spTree>
+    <p:extLst>
+      <p:ext uri="{BB962C8B-B14F-4D97-AF65-F5344CB8AC3E}">
+        <p14:creationId xmlns:p14="http://schemas.microsoft.com/office/powerpoint/2010/main" val="1603292419"/>
+      </p:ext>
+    </p:extLst>
+  </p:cSld>
+  <p:clrMapOvr>
+    <a:masterClrMapping/>
+  </p:clrMapOvr>
+</p:sld>
+</file>
+
+<file path=ppt/slides/slide4.xml><?xml version="1.0" encoding="utf-8"?>
+<p:sld xmlns:a="http://schemas.openxmlformats.org/drawingml/2006/main" xmlns:r="http://schemas.openxmlformats.org/officeDocument/2006/relationships" xmlns:p="http://schemas.openxmlformats.org/presentationml/2006/main">
+  <p:cSld>
+    <p:spTree>
+      <p:nvGrpSpPr>
+        <p:cNvPr id="1" name="">
+          <a:extLst>
+            <a:ext uri="{FF2B5EF4-FFF2-40B4-BE49-F238E27FC236}">
+              <a16:creationId xmlns:a16="http://schemas.microsoft.com/office/drawing/2014/main" id="{C3A169C6-7816-BEBB-6149-8F9DAC6F47F1}"/>
+            </a:ext>
+          </a:extLst>
+        </p:cNvPr>
+        <p:cNvGrpSpPr/>
+        <p:nvPr/>
+      </p:nvGrpSpPr>
+      <p:grpSpPr>
+        <a:xfrm>
+          <a:off x="0" y="0"/>
+          <a:ext cx="0" cy="0"/>
+          <a:chOff x="0" y="0"/>
+          <a:chExt cx="0" cy="0"/>
+        </a:xfrm>
+      </p:grpSpPr>
+      <p:sp>
+        <p:nvSpPr>
+          <p:cNvPr id="2" name="正方形/長方形 1">
+            <a:extLst>
+              <a:ext uri="{FF2B5EF4-FFF2-40B4-BE49-F238E27FC236}">
+                <a16:creationId xmlns:a16="http://schemas.microsoft.com/office/drawing/2014/main" id="{7B5A582F-A8F8-272A-00A2-4578D32D86FD}"/>
+              </a:ext>
+            </a:extLst>
+          </p:cNvPr>
+          <p:cNvSpPr/>
+          <p:nvPr/>
+        </p:nvSpPr>
+        <p:spPr>
+          <a:xfrm>
+            <a:off x="359454" y="1368447"/>
+            <a:ext cx="9736119" cy="2028365"/>
+          </a:xfrm>
+          <a:prstGeom prst="rect">
+            <a:avLst/>
+          </a:prstGeom>
+          <a:solidFill>
+            <a:schemeClr val="bg1"/>
+          </a:solidFill>
+          <a:ln>
+            <a:noFill/>
+          </a:ln>
+          <a:effectLst>
+            <a:outerShdw blurRad="50800" dist="38100" dir="2700000" algn="tl" rotWithShape="0">
+              <a:prstClr val="black">
+                <a:alpha val="40000"/>
+              </a:prstClr>
+            </a:outerShdw>
+          </a:effectLst>
+        </p:spPr>
+        <p:style>
+          <a:lnRef idx="2">
+            <a:schemeClr val="accent1">
+              <a:shade val="15000"/>
+            </a:schemeClr>
+          </a:lnRef>
+          <a:fillRef idx="1">
+            <a:schemeClr val="accent1"/>
+          </a:fillRef>
+          <a:effectRef idx="0">
+            <a:schemeClr val="accent1"/>
+          </a:effectRef>
+          <a:fontRef idx="minor">
+            <a:schemeClr val="lt1"/>
+          </a:fontRef>
+        </p:style>
+        <p:txBody>
+          <a:bodyPr rtlCol="0" anchor="ctr"/>
+          <a:lstStyle/>
+          <a:p>
+            <a:pPr algn="ctr"/>
+            <a:endParaRPr kumimoji="1" lang="ja-JP" altLang="en-US"/>
+          </a:p>
+        </p:txBody>
+      </p:sp>
+      <p:pic>
+        <p:nvPicPr>
+          <p:cNvPr id="3" name="図 2" descr="建物, 橋, ミラー が含まれている画像&#10;&#10;自動的に生成された説明">
+            <a:extLst>
+              <a:ext uri="{FF2B5EF4-FFF2-40B4-BE49-F238E27FC236}">
+                <a16:creationId xmlns:a16="http://schemas.microsoft.com/office/drawing/2014/main" id="{4A6AAF30-2FAE-87FB-9CA3-296A73B08330}"/>
+              </a:ext>
+            </a:extLst>
+          </p:cNvPr>
+          <p:cNvPicPr>
+            <a:picLocks noChangeAspect="1"/>
+          </p:cNvPicPr>
+          <p:nvPr/>
+        </p:nvPicPr>
+        <p:blipFill>
+          <a:blip r:embed="rId2"/>
+          <a:stretch>
+            <a:fillRect/>
+          </a:stretch>
+        </p:blipFill>
+        <p:spPr>
+          <a:xfrm>
+            <a:off x="611560" y="2374241"/>
+            <a:ext cx="490606" cy="490606"/>
+          </a:xfrm>
+          <a:prstGeom prst="rect">
+            <a:avLst/>
+          </a:prstGeom>
+        </p:spPr>
+      </p:pic>
+      <p:sp>
+        <p:nvSpPr>
+          <p:cNvPr id="4" name="四角形: 角を丸くする 3">
+            <a:extLst>
+              <a:ext uri="{FF2B5EF4-FFF2-40B4-BE49-F238E27FC236}">
+                <a16:creationId xmlns:a16="http://schemas.microsoft.com/office/drawing/2014/main" id="{C35DDC12-6BED-DE45-9BDB-0F5A360342B1}"/>
+              </a:ext>
+            </a:extLst>
+          </p:cNvPr>
+          <p:cNvSpPr/>
+          <p:nvPr/>
+        </p:nvSpPr>
+        <p:spPr>
+          <a:xfrm>
+            <a:off x="1561855" y="1543068"/>
+            <a:ext cx="5280379" cy="1633308"/>
+          </a:xfrm>
+          <a:prstGeom prst="roundRect">
+            <a:avLst>
+              <a:gd name="adj" fmla="val 11262"/>
+            </a:avLst>
+          </a:prstGeom>
+          <a:noFill/>
+          <a:ln>
+            <a:solidFill>
+              <a:schemeClr val="accent1"/>
+            </a:solidFill>
+          </a:ln>
+        </p:spPr>
+        <p:style>
+          <a:lnRef idx="2">
+            <a:schemeClr val="accent6"/>
+          </a:lnRef>
+          <a:fillRef idx="1">
+            <a:schemeClr val="lt1"/>
+          </a:fillRef>
+          <a:effectRef idx="0">
+            <a:schemeClr val="accent6"/>
+          </a:effectRef>
+          <a:fontRef idx="minor">
+            <a:schemeClr val="dk1"/>
+          </a:fontRef>
+        </p:style>
+        <p:txBody>
+          <a:bodyPr rtlCol="0" anchor="t"/>
+          <a:lstStyle/>
+          <a:p>
+            <a:r>
+              <a:rPr lang="en-US" altLang="ja-JP" sz="1400" dirty="0"/>
+              <a:t>App</a:t>
+            </a:r>
+            <a:endParaRPr lang="ja-JP" altLang="en-US" sz="1400" dirty="0"/>
+          </a:p>
+        </p:txBody>
+      </p:sp>
+      <p:sp>
+        <p:nvSpPr>
+          <p:cNvPr id="15" name="四角形: 角を丸くする 14">
+            <a:extLst>
+              <a:ext uri="{FF2B5EF4-FFF2-40B4-BE49-F238E27FC236}">
+                <a16:creationId xmlns:a16="http://schemas.microsoft.com/office/drawing/2014/main" id="{78620892-6EEB-6852-A521-584D053E538C}"/>
+              </a:ext>
+            </a:extLst>
+          </p:cNvPr>
+          <p:cNvSpPr/>
+          <p:nvPr/>
+        </p:nvSpPr>
+        <p:spPr>
+          <a:xfrm>
+            <a:off x="2999071" y="2294773"/>
+            <a:ext cx="1223404" cy="604237"/>
+          </a:xfrm>
+          <a:prstGeom prst="roundRect">
+            <a:avLst/>
+          </a:prstGeom>
+        </p:spPr>
+        <p:style>
+          <a:lnRef idx="1">
+            <a:schemeClr val="accent1"/>
+          </a:lnRef>
+          <a:fillRef idx="2">
+            <a:schemeClr val="accent1"/>
+          </a:fillRef>
+          <a:effectRef idx="1">
+            <a:schemeClr val="accent1"/>
+          </a:effectRef>
+          <a:fontRef idx="minor">
+            <a:schemeClr val="dk1"/>
+          </a:fontRef>
+        </p:style>
+        <p:txBody>
+          <a:bodyPr rtlCol="0" anchor="ctr"/>
+          <a:lstStyle/>
+          <a:p>
+            <a:pPr algn="ctr"/>
+            <a:r>
+              <a:rPr kumimoji="1" lang="en-US" altLang="ja-JP" sz="1400" dirty="0"/>
+              <a:t>Semantic</a:t>
+            </a:r>
+            <a:br>
+              <a:rPr kumimoji="1" lang="en-US" altLang="ja-JP" sz="1400" dirty="0"/>
+            </a:br>
+            <a:r>
+              <a:rPr kumimoji="1" lang="en-US" altLang="ja-JP" sz="1400" dirty="0"/>
+              <a:t>Kernel</a:t>
+            </a:r>
+            <a:endParaRPr kumimoji="1" lang="ja-JP" altLang="en-US" sz="1400" dirty="0"/>
+          </a:p>
+        </p:txBody>
+      </p:sp>
+      <p:sp>
+        <p:nvSpPr>
+          <p:cNvPr id="16" name="四角形: メモ 15">
+            <a:extLst>
+              <a:ext uri="{FF2B5EF4-FFF2-40B4-BE49-F238E27FC236}">
+                <a16:creationId xmlns:a16="http://schemas.microsoft.com/office/drawing/2014/main" id="{BCF02957-4C45-3214-BC29-837AD24AD173}"/>
+              </a:ext>
+            </a:extLst>
+          </p:cNvPr>
+          <p:cNvSpPr/>
+          <p:nvPr/>
+        </p:nvSpPr>
+        <p:spPr>
+          <a:xfrm>
+            <a:off x="1854644" y="2183223"/>
+            <a:ext cx="755703" cy="755703"/>
+          </a:xfrm>
+          <a:prstGeom prst="foldedCorner">
+            <a:avLst/>
+          </a:prstGeom>
+          <a:ln>
+            <a:headEnd type="none" w="med" len="med"/>
+            <a:tailEnd type="none" w="med" len="med"/>
+          </a:ln>
+        </p:spPr>
+        <p:style>
+          <a:lnRef idx="1">
+            <a:schemeClr val="accent1"/>
+          </a:lnRef>
+          <a:fillRef idx="2">
+            <a:schemeClr val="accent1"/>
+          </a:fillRef>
+          <a:effectRef idx="1">
+            <a:schemeClr val="accent1"/>
+          </a:effectRef>
+          <a:fontRef idx="minor">
+            <a:schemeClr val="dk1"/>
+          </a:fontRef>
+        </p:style>
+        <p:txBody>
+          <a:bodyPr wrap="none" rtlCol="0" anchor="ctr"/>
+          <a:lstStyle/>
+          <a:p>
+            <a:pPr algn="ctr"/>
+            <a:r>
+              <a:rPr lang="en-US" altLang="ja-JP" sz="1200" dirty="0"/>
+              <a:t>Code</a:t>
+            </a:r>
+            <a:endParaRPr kumimoji="1" lang="en-US" altLang="ja-JP" sz="1200" dirty="0">
+              <a:solidFill>
+                <a:schemeClr val="dk1"/>
+              </a:solidFill>
+            </a:endParaRPr>
+          </a:p>
+        </p:txBody>
+      </p:sp>
+      <p:cxnSp>
+        <p:nvCxnSpPr>
+          <p:cNvPr id="19" name="直線矢印コネクタ 18">
+            <a:extLst>
+              <a:ext uri="{FF2B5EF4-FFF2-40B4-BE49-F238E27FC236}">
+                <a16:creationId xmlns:a16="http://schemas.microsoft.com/office/drawing/2014/main" id="{FF697F2C-91AB-D2AC-27CD-3EC7E7641F37}"/>
+              </a:ext>
+            </a:extLst>
+          </p:cNvPr>
+          <p:cNvCxnSpPr>
+            <a:cxnSpLocks/>
+          </p:cNvCxnSpPr>
+          <p:nvPr/>
+        </p:nvCxnSpPr>
+        <p:spPr>
+          <a:xfrm>
+            <a:off x="2544725" y="2635089"/>
+            <a:ext cx="572070" cy="181"/>
+          </a:xfrm>
+          <a:prstGeom prst="straightConnector1">
+            <a:avLst/>
+          </a:prstGeom>
+          <a:ln w="28575">
+            <a:solidFill>
+              <a:schemeClr val="accent1"/>
+            </a:solidFill>
+            <a:prstDash val="dash"/>
+            <a:headEnd type="none" w="med" len="med"/>
+            <a:tailEnd type="arrow" w="med" len="med"/>
+          </a:ln>
+        </p:spPr>
+        <p:style>
+          <a:lnRef idx="1">
+            <a:schemeClr val="accent1"/>
+          </a:lnRef>
+          <a:fillRef idx="0">
+            <a:schemeClr val="accent1"/>
+          </a:fillRef>
+          <a:effectRef idx="0">
+            <a:schemeClr val="accent1"/>
+          </a:effectRef>
+          <a:fontRef idx="minor">
+            <a:schemeClr val="tx1"/>
+          </a:fontRef>
+        </p:style>
+      </p:cxnSp>
+      <p:sp>
+        <p:nvSpPr>
+          <p:cNvPr id="11" name="四角形: メモ 10">
+            <a:extLst>
+              <a:ext uri="{FF2B5EF4-FFF2-40B4-BE49-F238E27FC236}">
+                <a16:creationId xmlns:a16="http://schemas.microsoft.com/office/drawing/2014/main" id="{CFDD132E-1D06-04E9-8882-FAA9DDA07E40}"/>
+              </a:ext>
+            </a:extLst>
+          </p:cNvPr>
+          <p:cNvSpPr/>
+          <p:nvPr/>
+        </p:nvSpPr>
+        <p:spPr>
+          <a:xfrm>
+            <a:off x="5678505" y="2109144"/>
+            <a:ext cx="755703" cy="755703"/>
+          </a:xfrm>
+          <a:prstGeom prst="foldedCorner">
+            <a:avLst/>
+          </a:prstGeom>
+          <a:ln>
+            <a:headEnd type="none" w="med" len="med"/>
+            <a:tailEnd type="none" w="med" len="med"/>
+          </a:ln>
+        </p:spPr>
+        <p:style>
+          <a:lnRef idx="1">
+            <a:schemeClr val="accent6"/>
+          </a:lnRef>
+          <a:fillRef idx="2">
+            <a:schemeClr val="accent6"/>
+          </a:fillRef>
+          <a:effectRef idx="1">
+            <a:schemeClr val="accent6"/>
+          </a:effectRef>
+          <a:fontRef idx="minor">
+            <a:schemeClr val="dk1"/>
+          </a:fontRef>
+        </p:style>
+        <p:txBody>
+          <a:bodyPr wrap="none" rtlCol="0" anchor="ctr"/>
+          <a:lstStyle/>
+          <a:p>
+            <a:pPr algn="ctr"/>
+            <a:r>
+              <a:rPr kumimoji="1" lang="en-US" altLang="ja-JP" sz="1200" dirty="0">
+                <a:solidFill>
+                  <a:schemeClr val="dk1"/>
+                </a:solidFill>
+              </a:rPr>
+              <a:t>Instruct</a:t>
+            </a:r>
+          </a:p>
+        </p:txBody>
+      </p:sp>
+      <p:pic>
+        <p:nvPicPr>
+          <p:cNvPr id="18" name="Picture 2" descr="Using Azure Search for vector search with Azure OpenAI and LangChain ·  Clemens Siebler's Blog">
+            <a:extLst>
+              <a:ext uri="{FF2B5EF4-FFF2-40B4-BE49-F238E27FC236}">
+                <a16:creationId xmlns:a16="http://schemas.microsoft.com/office/drawing/2014/main" id="{6D8C36B2-7F8F-6657-865B-F8C68DF162C8}"/>
+              </a:ext>
+            </a:extLst>
+          </p:cNvPr>
+          <p:cNvPicPr>
+            <a:picLocks noChangeAspect="1" noChangeArrowheads="1"/>
+          </p:cNvPicPr>
+          <p:nvPr/>
+        </p:nvPicPr>
+        <p:blipFill rotWithShape="1">
+          <a:blip r:embed="rId3">
+            <a:clrChange>
+              <a:clrFrom>
+                <a:srgbClr val="FFFFFF"/>
+              </a:clrFrom>
+              <a:clrTo>
+                <a:srgbClr val="FFFFFF">
+                  <a:alpha val="0"/>
+                </a:srgbClr>
+              </a:clrTo>
+            </a:clrChange>
+            <a:extLst>
+              <a:ext uri="{28A0092B-C50C-407E-A947-70E740481C1C}">
+                <a14:useLocalDpi xmlns:a14="http://schemas.microsoft.com/office/drawing/2010/main"/>
+              </a:ext>
+            </a:extLst>
+          </a:blip>
+          <a:srcRect/>
+          <a:stretch/>
+        </p:blipFill>
+        <p:spPr bwMode="auto">
+          <a:xfrm>
+            <a:off x="8866246" y="2242109"/>
+            <a:ext cx="647531" cy="489772"/>
+          </a:xfrm>
+          <a:prstGeom prst="rect">
+            <a:avLst/>
+          </a:prstGeom>
+          <a:noFill/>
+          <a:extLst>
+            <a:ext uri="{909E8E84-426E-40DD-AFC4-6F175D3DCCD1}">
+              <a14:hiddenFill xmlns:a14="http://schemas.microsoft.com/office/drawing/2010/main">
+                <a:solidFill>
+                  <a:srgbClr val="FFFFFF"/>
+                </a:solidFill>
+              </a14:hiddenFill>
+            </a:ext>
+          </a:extLst>
+        </p:spPr>
+      </p:pic>
+      <p:sp>
+        <p:nvSpPr>
+          <p:cNvPr id="20" name="テキスト ボックス 19">
+            <a:extLst>
+              <a:ext uri="{FF2B5EF4-FFF2-40B4-BE49-F238E27FC236}">
+                <a16:creationId xmlns:a16="http://schemas.microsoft.com/office/drawing/2014/main" id="{F7E9B75B-81B3-4265-163F-3190C9188D06}"/>
+              </a:ext>
+            </a:extLst>
+          </p:cNvPr>
+          <p:cNvSpPr txBox="1"/>
+          <p:nvPr/>
+        </p:nvSpPr>
+        <p:spPr>
+          <a:xfrm>
+            <a:off x="8463423" y="2754260"/>
+            <a:ext cx="1443024" cy="369332"/>
+          </a:xfrm>
+          <a:prstGeom prst="rect">
+            <a:avLst/>
+          </a:prstGeom>
+          <a:noFill/>
+        </p:spPr>
+        <p:txBody>
+          <a:bodyPr wrap="none" rtlCol="0">
+            <a:spAutoFit/>
+          </a:bodyPr>
+          <a:lstStyle/>
+          <a:p>
+            <a:r>
+              <a:rPr lang="en-US" altLang="ja-JP" dirty="0"/>
+              <a:t>g</a:t>
+            </a:r>
+            <a:r>
+              <a:rPr kumimoji="1" lang="en-US" altLang="ja-JP" dirty="0"/>
+              <a:t>pt-4o-mini</a:t>
+            </a:r>
+            <a:endParaRPr kumimoji="1" lang="ja-JP" altLang="en-US" dirty="0"/>
+          </a:p>
+        </p:txBody>
+      </p:sp>
+      <p:pic>
+        <p:nvPicPr>
+          <p:cNvPr id="22" name="Graphic 54" descr="ソリッドフィル付きロボット">
+            <a:extLst>
+              <a:ext uri="{FF2B5EF4-FFF2-40B4-BE49-F238E27FC236}">
+                <a16:creationId xmlns:a16="http://schemas.microsoft.com/office/drawing/2014/main" id="{FCBD070E-394A-DF99-BF9D-DFD6D5E5BD97}"/>
+              </a:ext>
+            </a:extLst>
+          </p:cNvPr>
+          <p:cNvPicPr>
+            <a:picLocks noChangeAspect="1"/>
+          </p:cNvPicPr>
+          <p:nvPr/>
+        </p:nvPicPr>
+        <p:blipFill>
+          <a:blip r:embed="rId4">
+            <a:extLst>
+              <a:ext uri="{96DAC541-7B7A-43D3-8B79-37D633B846F1}">
+                <asvg:svgBlip xmlns:asvg="http://schemas.microsoft.com/office/drawing/2016/SVG/main" r:embed="rId5"/>
+              </a:ext>
+            </a:extLst>
+          </a:blip>
+          <a:stretch>
+            <a:fillRect/>
+          </a:stretch>
+        </p:blipFill>
+        <p:spPr>
+          <a:xfrm>
+            <a:off x="5033087" y="2209932"/>
+            <a:ext cx="718873" cy="718873"/>
+          </a:xfrm>
+          <a:prstGeom prst="rect">
+            <a:avLst/>
+          </a:prstGeom>
+        </p:spPr>
+      </p:pic>
+      <p:cxnSp>
+        <p:nvCxnSpPr>
+          <p:cNvPr id="26" name="直線矢印コネクタ 25">
+            <a:extLst>
+              <a:ext uri="{FF2B5EF4-FFF2-40B4-BE49-F238E27FC236}">
+                <a16:creationId xmlns:a16="http://schemas.microsoft.com/office/drawing/2014/main" id="{A1DF892C-1DB2-092E-C653-6B947A54E3C6}"/>
+              </a:ext>
+            </a:extLst>
+          </p:cNvPr>
+          <p:cNvCxnSpPr>
+            <a:cxnSpLocks/>
+            <a:stCxn id="15" idx="3"/>
+          </p:cNvCxnSpPr>
+          <p:nvPr/>
+        </p:nvCxnSpPr>
+        <p:spPr>
+          <a:xfrm>
+            <a:off x="4222475" y="2596892"/>
+            <a:ext cx="852772" cy="0"/>
+          </a:xfrm>
+          <a:prstGeom prst="straightConnector1">
+            <a:avLst/>
+          </a:prstGeom>
+          <a:ln w="28575">
+            <a:solidFill>
+              <a:schemeClr val="accent1"/>
+            </a:solidFill>
+            <a:headEnd type="none" w="med" len="med"/>
+            <a:tailEnd type="arrow" w="med" len="med"/>
+          </a:ln>
+        </p:spPr>
+        <p:style>
+          <a:lnRef idx="1">
+            <a:schemeClr val="accent1"/>
+          </a:lnRef>
+          <a:fillRef idx="0">
+            <a:schemeClr val="accent1"/>
+          </a:fillRef>
+          <a:effectRef idx="0">
+            <a:schemeClr val="accent1"/>
+          </a:effectRef>
+          <a:fontRef idx="minor">
+            <a:schemeClr val="tx1"/>
+          </a:fontRef>
+        </p:style>
+      </p:cxnSp>
+      <p:sp>
+        <p:nvSpPr>
+          <p:cNvPr id="24" name="テキスト ボックス 23">
+            <a:extLst>
+              <a:ext uri="{FF2B5EF4-FFF2-40B4-BE49-F238E27FC236}">
+                <a16:creationId xmlns:a16="http://schemas.microsoft.com/office/drawing/2014/main" id="{8CE18A31-4E0D-5414-B9CC-8AA13B65382B}"/>
+              </a:ext>
+            </a:extLst>
+          </p:cNvPr>
+          <p:cNvSpPr txBox="1"/>
+          <p:nvPr/>
+        </p:nvSpPr>
+        <p:spPr>
+          <a:xfrm>
+            <a:off x="4843207" y="1772565"/>
+            <a:ext cx="1980029" cy="307777"/>
+          </a:xfrm>
+          <a:prstGeom prst="rect">
+            <a:avLst/>
+          </a:prstGeom>
+          <a:noFill/>
+        </p:spPr>
+        <p:txBody>
+          <a:bodyPr wrap="none" rtlCol="0">
+            <a:spAutoFit/>
+          </a:bodyPr>
+          <a:lstStyle/>
+          <a:p>
+            <a:r>
+              <a:rPr lang="ja-JP" altLang="en-US" sz="1400" dirty="0"/>
+              <a:t>服装コーディネーター</a:t>
+            </a:r>
+            <a:endParaRPr kumimoji="1" lang="ja-JP" altLang="en-US" sz="1400" dirty="0"/>
+          </a:p>
+        </p:txBody>
+      </p:sp>
+      <p:cxnSp>
+        <p:nvCxnSpPr>
+          <p:cNvPr id="25" name="直線矢印コネクタ 24">
+            <a:extLst>
+              <a:ext uri="{FF2B5EF4-FFF2-40B4-BE49-F238E27FC236}">
+                <a16:creationId xmlns:a16="http://schemas.microsoft.com/office/drawing/2014/main" id="{AA3E5396-5937-ACD7-E83C-07E946BADFF8}"/>
+              </a:ext>
+            </a:extLst>
+          </p:cNvPr>
+          <p:cNvCxnSpPr>
+            <a:cxnSpLocks/>
+          </p:cNvCxnSpPr>
+          <p:nvPr/>
+        </p:nvCxnSpPr>
+        <p:spPr>
+          <a:xfrm>
+            <a:off x="6482667" y="2635089"/>
+            <a:ext cx="2211870" cy="0"/>
+          </a:xfrm>
+          <a:prstGeom prst="straightConnector1">
+            <a:avLst/>
+          </a:prstGeom>
+          <a:ln w="28575">
+            <a:solidFill>
+              <a:schemeClr val="accent1"/>
+            </a:solidFill>
+            <a:headEnd type="none" w="med" len="med"/>
+            <a:tailEnd type="arrow" w="med" len="med"/>
+          </a:ln>
+        </p:spPr>
+        <p:style>
+          <a:lnRef idx="1">
+            <a:schemeClr val="accent1"/>
+          </a:lnRef>
+          <a:fillRef idx="0">
+            <a:schemeClr val="accent1"/>
+          </a:fillRef>
+          <a:effectRef idx="0">
+            <a:schemeClr val="accent1"/>
+          </a:effectRef>
+          <a:fontRef idx="minor">
+            <a:schemeClr val="tx1"/>
+          </a:fontRef>
+        </p:style>
+      </p:cxnSp>
+      <p:pic>
+        <p:nvPicPr>
+          <p:cNvPr id="27" name="図 26">
+            <a:extLst>
+              <a:ext uri="{FF2B5EF4-FFF2-40B4-BE49-F238E27FC236}">
+                <a16:creationId xmlns:a16="http://schemas.microsoft.com/office/drawing/2014/main" id="{19E77FE9-2929-BDF6-A1AE-5F892122071C}"/>
+              </a:ext>
+            </a:extLst>
+          </p:cNvPr>
+          <p:cNvPicPr>
+            <a:picLocks noChangeAspect="1"/>
+          </p:cNvPicPr>
+          <p:nvPr/>
+        </p:nvPicPr>
+        <p:blipFill>
+          <a:blip r:embed="rId6">
+            <a:extLst>
+              <a:ext uri="{28A0092B-C50C-407E-A947-70E740481C1C}">
+                <a14:useLocalDpi xmlns:a14="http://schemas.microsoft.com/office/drawing/2010/main" val="0"/>
+              </a:ext>
+            </a:extLst>
+          </a:blip>
+          <a:stretch>
+            <a:fillRect/>
+          </a:stretch>
+        </p:blipFill>
+        <p:spPr>
+          <a:xfrm>
+            <a:off x="7230958" y="2283937"/>
+            <a:ext cx="644868" cy="644868"/>
+          </a:xfrm>
+          <a:prstGeom prst="rect">
+            <a:avLst/>
+          </a:prstGeom>
+        </p:spPr>
+      </p:pic>
+    </p:spTree>
+    <p:extLst>
+      <p:ext uri="{BB962C8B-B14F-4D97-AF65-F5344CB8AC3E}">
+        <p14:creationId xmlns:p14="http://schemas.microsoft.com/office/powerpoint/2010/main" val="810568407"/>
+      </p:ext>
+    </p:extLst>
+  </p:cSld>
+  <p:clrMapOvr>
+    <a:masterClrMapping/>
+  </p:clrMapOvr>
+</p:sld>
+</file>
+
+<file path=ppt/slides/slide5.xml><?xml version="1.0" encoding="utf-8"?>
+<p:sld xmlns:a="http://schemas.openxmlformats.org/drawingml/2006/main" xmlns:r="http://schemas.openxmlformats.org/officeDocument/2006/relationships" xmlns:p="http://schemas.openxmlformats.org/presentationml/2006/main">
+  <p:cSld>
+    <p:spTree>
+      <p:nvGrpSpPr>
+        <p:cNvPr id="1" name="">
+          <a:extLst>
+            <a:ext uri="{FF2B5EF4-FFF2-40B4-BE49-F238E27FC236}">
+              <a16:creationId xmlns:a16="http://schemas.microsoft.com/office/drawing/2014/main" id="{48D67B7B-23A4-279F-8E35-921FA1C37F03}"/>
+            </a:ext>
+          </a:extLst>
+        </p:cNvPr>
+        <p:cNvGrpSpPr/>
+        <p:nvPr/>
+      </p:nvGrpSpPr>
+      <p:grpSpPr>
+        <a:xfrm>
+          <a:off x="0" y="0"/>
+          <a:ext cx="0" cy="0"/>
+          <a:chOff x="0" y="0"/>
+          <a:chExt cx="0" cy="0"/>
+        </a:xfrm>
+      </p:grpSpPr>
+      <p:sp>
+        <p:nvSpPr>
+          <p:cNvPr id="2" name="正方形/長方形 1">
+            <a:extLst>
+              <a:ext uri="{FF2B5EF4-FFF2-40B4-BE49-F238E27FC236}">
+                <a16:creationId xmlns:a16="http://schemas.microsoft.com/office/drawing/2014/main" id="{51D4DC84-A3DE-08B8-AE3E-E46476CDABFC}"/>
+              </a:ext>
+            </a:extLst>
+          </p:cNvPr>
+          <p:cNvSpPr/>
+          <p:nvPr/>
+        </p:nvSpPr>
+        <p:spPr>
+          <a:xfrm>
+            <a:off x="189186" y="832420"/>
+            <a:ext cx="11846323" cy="3714356"/>
+          </a:xfrm>
+          <a:prstGeom prst="rect">
+            <a:avLst/>
+          </a:prstGeom>
+          <a:solidFill>
+            <a:schemeClr val="bg1"/>
+          </a:solidFill>
+          <a:ln>
+            <a:noFill/>
+          </a:ln>
+          <a:effectLst>
+            <a:outerShdw blurRad="50800" dist="38100" dir="2700000" algn="tl" rotWithShape="0">
+              <a:prstClr val="black">
+                <a:alpha val="40000"/>
+              </a:prstClr>
+            </a:outerShdw>
+          </a:effectLst>
+        </p:spPr>
+        <p:style>
+          <a:lnRef idx="2">
+            <a:schemeClr val="accent1">
+              <a:shade val="15000"/>
+            </a:schemeClr>
+          </a:lnRef>
+          <a:fillRef idx="1">
+            <a:schemeClr val="accent1"/>
+          </a:fillRef>
+          <a:effectRef idx="0">
+            <a:schemeClr val="accent1"/>
+          </a:effectRef>
+          <a:fontRef idx="minor">
+            <a:schemeClr val="lt1"/>
+          </a:fontRef>
+        </p:style>
+        <p:txBody>
+          <a:bodyPr rtlCol="0" anchor="ctr"/>
+          <a:lstStyle/>
+          <a:p>
+            <a:pPr algn="ctr"/>
+            <a:endParaRPr kumimoji="1" lang="ja-JP" altLang="en-US"/>
+          </a:p>
+        </p:txBody>
+      </p:sp>
+      <p:pic>
+        <p:nvPicPr>
+          <p:cNvPr id="3" name="図 2" descr="建物, 橋, ミラー が含まれている画像&#10;&#10;自動的に生成された説明">
+            <a:extLst>
+              <a:ext uri="{FF2B5EF4-FFF2-40B4-BE49-F238E27FC236}">
+                <a16:creationId xmlns:a16="http://schemas.microsoft.com/office/drawing/2014/main" id="{FFA40B5F-2DE5-E553-84B6-A86AFE1F1DBF}"/>
+              </a:ext>
+            </a:extLst>
+          </p:cNvPr>
+          <p:cNvPicPr>
+            <a:picLocks noChangeAspect="1"/>
+          </p:cNvPicPr>
+          <p:nvPr/>
+        </p:nvPicPr>
+        <p:blipFill>
+          <a:blip r:embed="rId2"/>
+          <a:stretch>
+            <a:fillRect/>
+          </a:stretch>
+        </p:blipFill>
+        <p:spPr>
+          <a:xfrm>
+            <a:off x="387725" y="3433231"/>
+            <a:ext cx="490606" cy="490606"/>
+          </a:xfrm>
+          <a:prstGeom prst="rect">
+            <a:avLst/>
+          </a:prstGeom>
+        </p:spPr>
+      </p:pic>
+      <p:sp>
+        <p:nvSpPr>
+          <p:cNvPr id="4" name="四角形: 角を丸くする 3">
+            <a:extLst>
+              <a:ext uri="{FF2B5EF4-FFF2-40B4-BE49-F238E27FC236}">
+                <a16:creationId xmlns:a16="http://schemas.microsoft.com/office/drawing/2014/main" id="{31A3F707-5336-9520-A5EC-8690218A904B}"/>
+              </a:ext>
+            </a:extLst>
+          </p:cNvPr>
+          <p:cNvSpPr/>
+          <p:nvPr/>
+        </p:nvSpPr>
+        <p:spPr>
+          <a:xfrm>
+            <a:off x="1069973" y="1543067"/>
+            <a:ext cx="5492963" cy="2631642"/>
+          </a:xfrm>
+          <a:prstGeom prst="roundRect">
+            <a:avLst>
+              <a:gd name="adj" fmla="val 11262"/>
+            </a:avLst>
+          </a:prstGeom>
+          <a:noFill/>
+          <a:ln>
+            <a:solidFill>
+              <a:schemeClr val="accent1"/>
+            </a:solidFill>
+          </a:ln>
+        </p:spPr>
+        <p:style>
+          <a:lnRef idx="2">
+            <a:schemeClr val="accent6"/>
+          </a:lnRef>
+          <a:fillRef idx="1">
+            <a:schemeClr val="lt1"/>
+          </a:fillRef>
+          <a:effectRef idx="0">
+            <a:schemeClr val="accent6"/>
+          </a:effectRef>
+          <a:fontRef idx="minor">
+            <a:schemeClr val="dk1"/>
+          </a:fontRef>
+        </p:style>
+        <p:txBody>
+          <a:bodyPr rtlCol="0" anchor="t"/>
+          <a:lstStyle/>
+          <a:p>
+            <a:r>
+              <a:rPr lang="en-US" altLang="ja-JP" sz="1400" dirty="0"/>
+              <a:t>App</a:t>
+            </a:r>
+            <a:endParaRPr lang="ja-JP" altLang="en-US" sz="1400" dirty="0"/>
+          </a:p>
+        </p:txBody>
+      </p:sp>
+      <p:sp>
+        <p:nvSpPr>
+          <p:cNvPr id="15" name="四角形: 角を丸くする 14">
+            <a:extLst>
+              <a:ext uri="{FF2B5EF4-FFF2-40B4-BE49-F238E27FC236}">
+                <a16:creationId xmlns:a16="http://schemas.microsoft.com/office/drawing/2014/main" id="{C16F9493-3C21-3FFE-4C04-567F04C21981}"/>
+              </a:ext>
+            </a:extLst>
+          </p:cNvPr>
+          <p:cNvSpPr/>
+          <p:nvPr/>
+        </p:nvSpPr>
+        <p:spPr>
+          <a:xfrm>
+            <a:off x="2507189" y="2294773"/>
+            <a:ext cx="1223404" cy="604237"/>
+          </a:xfrm>
+          <a:prstGeom prst="roundRect">
+            <a:avLst/>
+          </a:prstGeom>
+        </p:spPr>
+        <p:style>
+          <a:lnRef idx="1">
+            <a:schemeClr val="accent1"/>
+          </a:lnRef>
+          <a:fillRef idx="2">
+            <a:schemeClr val="accent1"/>
+          </a:fillRef>
+          <a:effectRef idx="1">
+            <a:schemeClr val="accent1"/>
+          </a:effectRef>
+          <a:fontRef idx="minor">
+            <a:schemeClr val="dk1"/>
+          </a:fontRef>
+        </p:style>
+        <p:txBody>
+          <a:bodyPr rtlCol="0" anchor="ctr"/>
+          <a:lstStyle/>
+          <a:p>
+            <a:pPr algn="ctr"/>
+            <a:r>
+              <a:rPr kumimoji="1" lang="en-US" altLang="ja-JP" sz="1400" dirty="0"/>
+              <a:t>Semantic</a:t>
+            </a:r>
+            <a:br>
+              <a:rPr kumimoji="1" lang="en-US" altLang="ja-JP" sz="1400" dirty="0"/>
+            </a:br>
+            <a:r>
+              <a:rPr kumimoji="1" lang="en-US" altLang="ja-JP" sz="1400" dirty="0"/>
+              <a:t>Kernel</a:t>
+            </a:r>
+            <a:endParaRPr kumimoji="1" lang="ja-JP" altLang="en-US" sz="1400" dirty="0"/>
+          </a:p>
+        </p:txBody>
+      </p:sp>
+      <p:sp>
+        <p:nvSpPr>
+          <p:cNvPr id="16" name="四角形: メモ 15">
+            <a:extLst>
+              <a:ext uri="{FF2B5EF4-FFF2-40B4-BE49-F238E27FC236}">
+                <a16:creationId xmlns:a16="http://schemas.microsoft.com/office/drawing/2014/main" id="{3FC62654-14AC-3FA5-2797-28C61ECBF687}"/>
+              </a:ext>
+            </a:extLst>
+          </p:cNvPr>
+          <p:cNvSpPr/>
+          <p:nvPr/>
+        </p:nvSpPr>
+        <p:spPr>
+          <a:xfrm>
+            <a:off x="1362762" y="2183223"/>
+            <a:ext cx="755703" cy="755703"/>
+          </a:xfrm>
+          <a:prstGeom prst="foldedCorner">
+            <a:avLst/>
+          </a:prstGeom>
+          <a:ln>
+            <a:headEnd type="none" w="med" len="med"/>
+            <a:tailEnd type="none" w="med" len="med"/>
+          </a:ln>
+        </p:spPr>
+        <p:style>
+          <a:lnRef idx="1">
+            <a:schemeClr val="accent1"/>
+          </a:lnRef>
+          <a:fillRef idx="2">
+            <a:schemeClr val="accent1"/>
+          </a:fillRef>
+          <a:effectRef idx="1">
+            <a:schemeClr val="accent1"/>
+          </a:effectRef>
+          <a:fontRef idx="minor">
+            <a:schemeClr val="dk1"/>
+          </a:fontRef>
+        </p:style>
+        <p:txBody>
+          <a:bodyPr wrap="none" rtlCol="0" anchor="ctr"/>
+          <a:lstStyle/>
+          <a:p>
+            <a:pPr algn="ctr"/>
+            <a:r>
+              <a:rPr lang="en-US" altLang="ja-JP" sz="1200" dirty="0"/>
+              <a:t>Code</a:t>
+            </a:r>
+            <a:endParaRPr kumimoji="1" lang="en-US" altLang="ja-JP" sz="1200" dirty="0">
+              <a:solidFill>
+                <a:schemeClr val="dk1"/>
+              </a:solidFill>
+            </a:endParaRPr>
+          </a:p>
+        </p:txBody>
+      </p:sp>
+      <p:cxnSp>
+        <p:nvCxnSpPr>
+          <p:cNvPr id="19" name="直線矢印コネクタ 18">
+            <a:extLst>
+              <a:ext uri="{FF2B5EF4-FFF2-40B4-BE49-F238E27FC236}">
+                <a16:creationId xmlns:a16="http://schemas.microsoft.com/office/drawing/2014/main" id="{45AE9755-FB76-12D0-1EC6-10E8393880FA}"/>
+              </a:ext>
+            </a:extLst>
+          </p:cNvPr>
+          <p:cNvCxnSpPr>
+            <a:cxnSpLocks/>
+          </p:cNvCxnSpPr>
+          <p:nvPr/>
+        </p:nvCxnSpPr>
+        <p:spPr>
+          <a:xfrm>
+            <a:off x="2052843" y="2635089"/>
+            <a:ext cx="572070" cy="181"/>
+          </a:xfrm>
+          <a:prstGeom prst="straightConnector1">
+            <a:avLst/>
+          </a:prstGeom>
+          <a:ln w="28575">
+            <a:solidFill>
+              <a:schemeClr val="accent1"/>
+            </a:solidFill>
+            <a:prstDash val="dash"/>
+            <a:headEnd type="none" w="med" len="med"/>
+            <a:tailEnd type="arrow" w="med" len="med"/>
+          </a:ln>
+        </p:spPr>
+        <p:style>
+          <a:lnRef idx="1">
+            <a:schemeClr val="accent1"/>
+          </a:lnRef>
+          <a:fillRef idx="0">
+            <a:schemeClr val="accent1"/>
+          </a:fillRef>
+          <a:effectRef idx="0">
+            <a:schemeClr val="accent1"/>
+          </a:effectRef>
+          <a:fontRef idx="minor">
+            <a:schemeClr val="tx1"/>
+          </a:fontRef>
+        </p:style>
+      </p:cxnSp>
+      <p:sp>
+        <p:nvSpPr>
+          <p:cNvPr id="11" name="四角形: メモ 10">
+            <a:extLst>
+              <a:ext uri="{FF2B5EF4-FFF2-40B4-BE49-F238E27FC236}">
+                <a16:creationId xmlns:a16="http://schemas.microsoft.com/office/drawing/2014/main" id="{06009A80-6096-500D-6865-C2E92F07F036}"/>
+              </a:ext>
+            </a:extLst>
+          </p:cNvPr>
+          <p:cNvSpPr/>
+          <p:nvPr/>
+        </p:nvSpPr>
+        <p:spPr>
+          <a:xfrm>
+            <a:off x="5261752" y="3051148"/>
+            <a:ext cx="755703" cy="755703"/>
+          </a:xfrm>
+          <a:prstGeom prst="foldedCorner">
+            <a:avLst/>
+          </a:prstGeom>
+          <a:ln>
+            <a:headEnd type="none" w="med" len="med"/>
+            <a:tailEnd type="none" w="med" len="med"/>
+          </a:ln>
+        </p:spPr>
+        <p:style>
+          <a:lnRef idx="1">
+            <a:schemeClr val="accent6"/>
+          </a:lnRef>
+          <a:fillRef idx="2">
+            <a:schemeClr val="accent6"/>
+          </a:fillRef>
+          <a:effectRef idx="1">
+            <a:schemeClr val="accent6"/>
+          </a:effectRef>
+          <a:fontRef idx="minor">
+            <a:schemeClr val="dk1"/>
+          </a:fontRef>
+        </p:style>
+        <p:txBody>
+          <a:bodyPr wrap="none" rtlCol="0" anchor="ctr"/>
+          <a:lstStyle/>
+          <a:p>
+            <a:pPr algn="ctr"/>
+            <a:r>
+              <a:rPr kumimoji="1" lang="en-US" altLang="ja-JP" sz="1200" dirty="0">
+                <a:solidFill>
+                  <a:schemeClr val="dk1"/>
+                </a:solidFill>
+              </a:rPr>
+              <a:t>Instruct</a:t>
+            </a:r>
+          </a:p>
+        </p:txBody>
+      </p:sp>
+      <p:pic>
+        <p:nvPicPr>
+          <p:cNvPr id="18" name="Picture 2" descr="Using Azure Search for vector search with Azure OpenAI and LangChain ·  Clemens Siebler's Blog">
+            <a:extLst>
+              <a:ext uri="{FF2B5EF4-FFF2-40B4-BE49-F238E27FC236}">
+                <a16:creationId xmlns:a16="http://schemas.microsoft.com/office/drawing/2014/main" id="{6AEC5FFE-4756-EEB6-32CA-12C56FDC709D}"/>
+              </a:ext>
+            </a:extLst>
+          </p:cNvPr>
+          <p:cNvPicPr>
+            <a:picLocks noChangeAspect="1" noChangeArrowheads="1"/>
+          </p:cNvPicPr>
+          <p:nvPr/>
+        </p:nvPicPr>
+        <p:blipFill rotWithShape="1">
+          <a:blip r:embed="rId3">
+            <a:clrChange>
+              <a:clrFrom>
+                <a:srgbClr val="FFFFFF"/>
+              </a:clrFrom>
+              <a:clrTo>
+                <a:srgbClr val="FFFFFF">
+                  <a:alpha val="0"/>
+                </a:srgbClr>
+              </a:clrTo>
+            </a:clrChange>
+            <a:extLst>
+              <a:ext uri="{28A0092B-C50C-407E-A947-70E740481C1C}">
+                <a14:useLocalDpi xmlns:a14="http://schemas.microsoft.com/office/drawing/2010/main"/>
+              </a:ext>
+            </a:extLst>
+          </a:blip>
+          <a:srcRect/>
+          <a:stretch/>
+        </p:blipFill>
+        <p:spPr bwMode="auto">
+          <a:xfrm>
+            <a:off x="9196492" y="3304760"/>
+            <a:ext cx="647531" cy="489772"/>
+          </a:xfrm>
+          <a:prstGeom prst="rect">
+            <a:avLst/>
+          </a:prstGeom>
+          <a:noFill/>
+          <a:extLst>
+            <a:ext uri="{909E8E84-426E-40DD-AFC4-6F175D3DCCD1}">
+              <a14:hiddenFill xmlns:a14="http://schemas.microsoft.com/office/drawing/2010/main">
+                <a:solidFill>
+                  <a:srgbClr val="FFFFFF"/>
+                </a:solidFill>
+              </a14:hiddenFill>
+            </a:ext>
+          </a:extLst>
+        </p:spPr>
+      </p:pic>
+      <p:sp>
+        <p:nvSpPr>
+          <p:cNvPr id="20" name="テキスト ボックス 19">
+            <a:extLst>
+              <a:ext uri="{FF2B5EF4-FFF2-40B4-BE49-F238E27FC236}">
+                <a16:creationId xmlns:a16="http://schemas.microsoft.com/office/drawing/2014/main" id="{22E6D9BE-22DD-007E-649E-A05843C72312}"/>
+              </a:ext>
+            </a:extLst>
+          </p:cNvPr>
+          <p:cNvSpPr txBox="1"/>
+          <p:nvPr/>
+        </p:nvSpPr>
+        <p:spPr>
+          <a:xfrm>
+            <a:off x="8793669" y="3816911"/>
+            <a:ext cx="1443024" cy="369332"/>
+          </a:xfrm>
+          <a:prstGeom prst="rect">
+            <a:avLst/>
+          </a:prstGeom>
+          <a:noFill/>
+        </p:spPr>
+        <p:txBody>
+          <a:bodyPr wrap="none" rtlCol="0">
+            <a:spAutoFit/>
+          </a:bodyPr>
+          <a:lstStyle/>
+          <a:p>
+            <a:r>
+              <a:rPr lang="en-US" altLang="ja-JP" dirty="0"/>
+              <a:t>g</a:t>
+            </a:r>
+            <a:r>
+              <a:rPr kumimoji="1" lang="en-US" altLang="ja-JP" dirty="0"/>
+              <a:t>pt-4o-mini</a:t>
+            </a:r>
+            <a:endParaRPr kumimoji="1" lang="ja-JP" altLang="en-US" dirty="0"/>
+          </a:p>
+        </p:txBody>
+      </p:sp>
+      <p:pic>
+        <p:nvPicPr>
+          <p:cNvPr id="22" name="Graphic 54" descr="ソリッドフィル付きロボット">
+            <a:extLst>
+              <a:ext uri="{FF2B5EF4-FFF2-40B4-BE49-F238E27FC236}">
+                <a16:creationId xmlns:a16="http://schemas.microsoft.com/office/drawing/2014/main" id="{51FD18BB-B2C4-95AF-0A50-D65C31184AE1}"/>
+              </a:ext>
+            </a:extLst>
+          </p:cNvPr>
+          <p:cNvPicPr>
+            <a:picLocks noChangeAspect="1"/>
+          </p:cNvPicPr>
+          <p:nvPr/>
+        </p:nvPicPr>
+        <p:blipFill>
+          <a:blip r:embed="rId4">
+            <a:extLst>
+              <a:ext uri="{96DAC541-7B7A-43D3-8B79-37D633B846F1}">
+                <asvg:svgBlip xmlns:asvg="http://schemas.microsoft.com/office/drawing/2016/SVG/main" r:embed="rId5"/>
+              </a:ext>
+            </a:extLst>
+          </a:blip>
+          <a:stretch>
+            <a:fillRect/>
+          </a:stretch>
+        </p:blipFill>
+        <p:spPr>
+          <a:xfrm>
+            <a:off x="4616334" y="3151936"/>
+            <a:ext cx="718873" cy="718873"/>
+          </a:xfrm>
+          <a:prstGeom prst="rect">
+            <a:avLst/>
+          </a:prstGeom>
+        </p:spPr>
+      </p:pic>
+      <p:cxnSp>
+        <p:nvCxnSpPr>
+          <p:cNvPr id="26" name="直線矢印コネクタ 25">
+            <a:extLst>
+              <a:ext uri="{FF2B5EF4-FFF2-40B4-BE49-F238E27FC236}">
+                <a16:creationId xmlns:a16="http://schemas.microsoft.com/office/drawing/2014/main" id="{308C3E25-7762-4DEC-F10D-FC2A2F754B7D}"/>
+              </a:ext>
+            </a:extLst>
+          </p:cNvPr>
+          <p:cNvCxnSpPr>
+            <a:cxnSpLocks/>
+          </p:cNvCxnSpPr>
+          <p:nvPr/>
+        </p:nvCxnSpPr>
+        <p:spPr>
+          <a:xfrm>
+            <a:off x="3871972" y="2788571"/>
+            <a:ext cx="841741" cy="363090"/>
+          </a:xfrm>
+          <a:prstGeom prst="straightConnector1">
+            <a:avLst/>
+          </a:prstGeom>
+          <a:ln w="28575">
+            <a:solidFill>
+              <a:schemeClr val="accent1"/>
+            </a:solidFill>
+            <a:headEnd type="none" w="med" len="med"/>
+            <a:tailEnd type="arrow" w="med" len="med"/>
+          </a:ln>
+        </p:spPr>
+        <p:style>
+          <a:lnRef idx="1">
+            <a:schemeClr val="accent1"/>
+          </a:lnRef>
+          <a:fillRef idx="0">
+            <a:schemeClr val="accent1"/>
+          </a:fillRef>
+          <a:effectRef idx="0">
+            <a:schemeClr val="accent1"/>
+          </a:effectRef>
+          <a:fontRef idx="minor">
+            <a:schemeClr val="tx1"/>
+          </a:fontRef>
+        </p:style>
+      </p:cxnSp>
+      <p:sp>
+        <p:nvSpPr>
+          <p:cNvPr id="24" name="テキスト ボックス 23">
+            <a:extLst>
+              <a:ext uri="{FF2B5EF4-FFF2-40B4-BE49-F238E27FC236}">
+                <a16:creationId xmlns:a16="http://schemas.microsoft.com/office/drawing/2014/main" id="{FA7DAD6D-8536-F8D5-6C56-90C75E8DCC2D}"/>
+              </a:ext>
+            </a:extLst>
+          </p:cNvPr>
+          <p:cNvSpPr txBox="1"/>
+          <p:nvPr/>
+        </p:nvSpPr>
+        <p:spPr>
+          <a:xfrm>
+            <a:off x="4418394" y="3849906"/>
+            <a:ext cx="1980029" cy="307777"/>
+          </a:xfrm>
+          <a:prstGeom prst="rect">
+            <a:avLst/>
+          </a:prstGeom>
+          <a:noFill/>
+        </p:spPr>
+        <p:txBody>
+          <a:bodyPr wrap="none" rtlCol="0">
+            <a:spAutoFit/>
+          </a:bodyPr>
+          <a:lstStyle/>
+          <a:p>
+            <a:r>
+              <a:rPr lang="ja-JP" altLang="en-US" sz="1400" dirty="0"/>
+              <a:t>服装コーディネーター</a:t>
+            </a:r>
+            <a:endParaRPr kumimoji="1" lang="ja-JP" altLang="en-US" sz="1400" dirty="0"/>
+          </a:p>
+        </p:txBody>
+      </p:sp>
+      <p:cxnSp>
+        <p:nvCxnSpPr>
+          <p:cNvPr id="25" name="直線矢印コネクタ 24">
+            <a:extLst>
+              <a:ext uri="{FF2B5EF4-FFF2-40B4-BE49-F238E27FC236}">
+                <a16:creationId xmlns:a16="http://schemas.microsoft.com/office/drawing/2014/main" id="{CC9627DD-3297-4807-62C3-A539E44797C7}"/>
+              </a:ext>
+            </a:extLst>
+          </p:cNvPr>
+          <p:cNvCxnSpPr>
+            <a:cxnSpLocks/>
+          </p:cNvCxnSpPr>
+          <p:nvPr/>
+        </p:nvCxnSpPr>
+        <p:spPr>
+          <a:xfrm>
+            <a:off x="6134974" y="3577093"/>
+            <a:ext cx="2943999" cy="0"/>
+          </a:xfrm>
+          <a:prstGeom prst="straightConnector1">
+            <a:avLst/>
+          </a:prstGeom>
+          <a:ln w="28575">
+            <a:solidFill>
+              <a:schemeClr val="accent1"/>
+            </a:solidFill>
+            <a:headEnd type="none" w="med" len="med"/>
+            <a:tailEnd type="arrow" w="med" len="med"/>
+          </a:ln>
+        </p:spPr>
+        <p:style>
+          <a:lnRef idx="1">
+            <a:schemeClr val="accent1"/>
+          </a:lnRef>
+          <a:fillRef idx="0">
+            <a:schemeClr val="accent1"/>
+          </a:fillRef>
+          <a:effectRef idx="0">
+            <a:schemeClr val="accent1"/>
+          </a:effectRef>
+          <a:fontRef idx="minor">
+            <a:schemeClr val="tx1"/>
+          </a:fontRef>
+        </p:style>
+      </p:cxnSp>
+      <p:pic>
+        <p:nvPicPr>
+          <p:cNvPr id="27" name="図 26">
+            <a:extLst>
+              <a:ext uri="{FF2B5EF4-FFF2-40B4-BE49-F238E27FC236}">
+                <a16:creationId xmlns:a16="http://schemas.microsoft.com/office/drawing/2014/main" id="{1FADF21C-DD64-624B-BB39-8D1942E2CD5A}"/>
+              </a:ext>
+            </a:extLst>
+          </p:cNvPr>
+          <p:cNvPicPr>
+            <a:picLocks noChangeAspect="1"/>
+          </p:cNvPicPr>
+          <p:nvPr/>
+        </p:nvPicPr>
+        <p:blipFill>
+          <a:blip r:embed="rId6">
+            <a:extLst>
+              <a:ext uri="{28A0092B-C50C-407E-A947-70E740481C1C}">
+                <a14:useLocalDpi xmlns:a14="http://schemas.microsoft.com/office/drawing/2010/main" val="0"/>
+              </a:ext>
+            </a:extLst>
+          </a:blip>
+          <a:stretch>
+            <a:fillRect/>
+          </a:stretch>
+        </p:blipFill>
+        <p:spPr>
+          <a:xfrm>
+            <a:off x="6942442" y="3225941"/>
+            <a:ext cx="644868" cy="644868"/>
+          </a:xfrm>
+          <a:prstGeom prst="rect">
+            <a:avLst/>
+          </a:prstGeom>
+        </p:spPr>
+      </p:pic>
+      <p:cxnSp>
+        <p:nvCxnSpPr>
+          <p:cNvPr id="6" name="直線矢印コネクタ 5">
+            <a:extLst>
+              <a:ext uri="{FF2B5EF4-FFF2-40B4-BE49-F238E27FC236}">
+                <a16:creationId xmlns:a16="http://schemas.microsoft.com/office/drawing/2014/main" id="{6E504DF4-D986-4DC0-231B-97D3ACF84DE6}"/>
+              </a:ext>
+            </a:extLst>
+          </p:cNvPr>
+          <p:cNvCxnSpPr>
+            <a:cxnSpLocks/>
+          </p:cNvCxnSpPr>
+          <p:nvPr/>
+        </p:nvCxnSpPr>
+        <p:spPr>
+          <a:xfrm flipV="1">
+            <a:off x="3834226" y="2129493"/>
+            <a:ext cx="841741" cy="363090"/>
+          </a:xfrm>
+          <a:prstGeom prst="straightConnector1">
+            <a:avLst/>
+          </a:prstGeom>
+          <a:ln w="28575">
+            <a:solidFill>
+              <a:schemeClr val="accent1"/>
+            </a:solidFill>
+            <a:headEnd type="none" w="med" len="med"/>
+            <a:tailEnd type="arrow" w="med" len="med"/>
+          </a:ln>
+        </p:spPr>
+        <p:style>
+          <a:lnRef idx="1">
+            <a:schemeClr val="accent1"/>
+          </a:lnRef>
+          <a:fillRef idx="0">
+            <a:schemeClr val="accent1"/>
+          </a:fillRef>
+          <a:effectRef idx="0">
+            <a:schemeClr val="accent1"/>
+          </a:effectRef>
+          <a:fontRef idx="minor">
+            <a:schemeClr val="tx1"/>
+          </a:fontRef>
+        </p:style>
+      </p:cxnSp>
+      <p:sp>
+        <p:nvSpPr>
+          <p:cNvPr id="7" name="四角形: 角を丸くする 6">
+            <a:extLst>
+              <a:ext uri="{FF2B5EF4-FFF2-40B4-BE49-F238E27FC236}">
+                <a16:creationId xmlns:a16="http://schemas.microsoft.com/office/drawing/2014/main" id="{7E8EBF37-4273-3602-9B7A-75D2B7F9DAF4}"/>
+              </a:ext>
+            </a:extLst>
+          </p:cNvPr>
+          <p:cNvSpPr/>
+          <p:nvPr/>
+        </p:nvSpPr>
+        <p:spPr>
+          <a:xfrm>
+            <a:off x="4799213" y="1820405"/>
+            <a:ext cx="1223404" cy="604237"/>
+          </a:xfrm>
+          <a:prstGeom prst="roundRect">
+            <a:avLst/>
+          </a:prstGeom>
+        </p:spPr>
+        <p:style>
+          <a:lnRef idx="1">
+            <a:schemeClr val="accent1"/>
+          </a:lnRef>
+          <a:fillRef idx="2">
+            <a:schemeClr val="accent1"/>
+          </a:fillRef>
+          <a:effectRef idx="1">
+            <a:schemeClr val="accent1"/>
+          </a:effectRef>
+          <a:fontRef idx="minor">
+            <a:schemeClr val="dk1"/>
+          </a:fontRef>
+        </p:style>
+        <p:txBody>
+          <a:bodyPr rtlCol="0" anchor="ctr"/>
+          <a:lstStyle/>
+          <a:p>
+            <a:pPr algn="ctr"/>
+            <a:r>
+              <a:rPr kumimoji="1" lang="en-US" altLang="ja-JP" sz="1400" dirty="0"/>
+              <a:t>AI Foundry</a:t>
+            </a:r>
+            <a:br>
+              <a:rPr kumimoji="1" lang="en-US" altLang="ja-JP" sz="1400" dirty="0"/>
+            </a:br>
+            <a:r>
+              <a:rPr kumimoji="1" lang="en-US" altLang="ja-JP" sz="1400" dirty="0"/>
+              <a:t>SDK</a:t>
+            </a:r>
+            <a:endParaRPr kumimoji="1" lang="ja-JP" altLang="en-US" sz="1400" dirty="0"/>
+          </a:p>
+        </p:txBody>
+      </p:sp>
+      <p:sp>
+        <p:nvSpPr>
+          <p:cNvPr id="8" name="四角形: メモ 7">
+            <a:extLst>
+              <a:ext uri="{FF2B5EF4-FFF2-40B4-BE49-F238E27FC236}">
+                <a16:creationId xmlns:a16="http://schemas.microsoft.com/office/drawing/2014/main" id="{62F37C5D-6811-4BD3-F7BD-7269823C75B5}"/>
+              </a:ext>
+            </a:extLst>
+          </p:cNvPr>
+          <p:cNvSpPr/>
+          <p:nvPr/>
+        </p:nvSpPr>
+        <p:spPr>
+          <a:xfrm>
+            <a:off x="8282880" y="1441400"/>
+            <a:ext cx="755703" cy="755703"/>
+          </a:xfrm>
+          <a:prstGeom prst="foldedCorner">
+            <a:avLst/>
+          </a:prstGeom>
+          <a:ln>
+            <a:headEnd type="none" w="med" len="med"/>
+            <a:tailEnd type="none" w="med" len="med"/>
+          </a:ln>
+        </p:spPr>
+        <p:style>
+          <a:lnRef idx="1">
+            <a:schemeClr val="accent1"/>
+          </a:lnRef>
+          <a:fillRef idx="2">
+            <a:schemeClr val="accent1"/>
+          </a:fillRef>
+          <a:effectRef idx="1">
+            <a:schemeClr val="accent1"/>
+          </a:effectRef>
+          <a:fontRef idx="minor">
+            <a:schemeClr val="dk1"/>
+          </a:fontRef>
+        </p:style>
+        <p:txBody>
+          <a:bodyPr wrap="none" rtlCol="0" anchor="ctr"/>
+          <a:lstStyle/>
+          <a:p>
+            <a:pPr algn="ctr"/>
+            <a:r>
+              <a:rPr kumimoji="1" lang="en-US" altLang="ja-JP" sz="1200" dirty="0">
+                <a:solidFill>
+                  <a:schemeClr val="dk1"/>
+                </a:solidFill>
+              </a:rPr>
+              <a:t>Instruct</a:t>
+            </a:r>
+          </a:p>
+        </p:txBody>
+      </p:sp>
+      <p:sp>
+        <p:nvSpPr>
+          <p:cNvPr id="9" name="四角形: 角を丸くする 8">
+            <a:extLst>
+              <a:ext uri="{FF2B5EF4-FFF2-40B4-BE49-F238E27FC236}">
+                <a16:creationId xmlns:a16="http://schemas.microsoft.com/office/drawing/2014/main" id="{DA8A4A67-9B97-D6B9-3C82-9FF5C00A8B84}"/>
+              </a:ext>
+            </a:extLst>
+          </p:cNvPr>
+          <p:cNvSpPr/>
+          <p:nvPr/>
+        </p:nvSpPr>
+        <p:spPr>
+          <a:xfrm>
+            <a:off x="7823191" y="1067546"/>
+            <a:ext cx="3997303" cy="1633308"/>
+          </a:xfrm>
+          <a:prstGeom prst="roundRect">
+            <a:avLst>
+              <a:gd name="adj" fmla="val 7301"/>
+            </a:avLst>
+          </a:prstGeom>
+          <a:noFill/>
+          <a:ln>
+            <a:solidFill>
+              <a:schemeClr val="accent1"/>
+            </a:solidFill>
+          </a:ln>
+        </p:spPr>
+        <p:style>
+          <a:lnRef idx="2">
+            <a:schemeClr val="accent6"/>
+          </a:lnRef>
+          <a:fillRef idx="1">
+            <a:schemeClr val="lt1"/>
+          </a:fillRef>
+          <a:effectRef idx="0">
+            <a:schemeClr val="accent6"/>
+          </a:effectRef>
+          <a:fontRef idx="minor">
+            <a:schemeClr val="dk1"/>
+          </a:fontRef>
+        </p:style>
+        <p:txBody>
+          <a:bodyPr rtlCol="0" anchor="t"/>
+          <a:lstStyle/>
+          <a:p>
+            <a:r>
+              <a:rPr lang="ja-JP" altLang="en-US" sz="1400" dirty="0"/>
+              <a:t>お天気エージェント</a:t>
+            </a:r>
+            <a:endParaRPr kumimoji="1" lang="ja-JP" altLang="en-US" sz="1400" dirty="0"/>
+          </a:p>
+        </p:txBody>
+      </p:sp>
+      <p:pic>
+        <p:nvPicPr>
+          <p:cNvPr id="10" name="Picture 2" descr="Bingの評判を全7件のユーザーレビュー・口コミで紹介">
+            <a:extLst>
+              <a:ext uri="{FF2B5EF4-FFF2-40B4-BE49-F238E27FC236}">
+                <a16:creationId xmlns:a16="http://schemas.microsoft.com/office/drawing/2014/main" id="{FFDD9B7D-6C88-90D0-3DBE-6B1FBDC2E6EC}"/>
+              </a:ext>
+            </a:extLst>
+          </p:cNvPr>
+          <p:cNvPicPr>
+            <a:picLocks noChangeAspect="1" noChangeArrowheads="1"/>
+          </p:cNvPicPr>
+          <p:nvPr/>
+        </p:nvPicPr>
+        <p:blipFill>
+          <a:blip r:embed="rId7">
+            <a:clrChange>
+              <a:clrFrom>
+                <a:srgbClr val="FFFFFF"/>
+              </a:clrFrom>
+              <a:clrTo>
+                <a:srgbClr val="FFFFFF">
+                  <a:alpha val="0"/>
+                </a:srgbClr>
+              </a:clrTo>
+            </a:clrChange>
+            <a:extLst>
+              <a:ext uri="{28A0092B-C50C-407E-A947-70E740481C1C}">
+                <a14:useLocalDpi xmlns:a14="http://schemas.microsoft.com/office/drawing/2010/main" val="0"/>
+              </a:ext>
+            </a:extLst>
+          </a:blip>
+          <a:srcRect/>
+          <a:stretch>
+            <a:fillRect/>
+          </a:stretch>
+        </p:blipFill>
+        <p:spPr bwMode="auto">
+          <a:xfrm>
+            <a:off x="10343047" y="2033700"/>
+            <a:ext cx="1185151" cy="474061"/>
+          </a:xfrm>
+          <a:prstGeom prst="rect">
+            <a:avLst/>
+          </a:prstGeom>
+          <a:noFill/>
+          <a:extLst>
+            <a:ext uri="{909E8E84-426E-40DD-AFC4-6F175D3DCCD1}">
+              <a14:hiddenFill xmlns:a14="http://schemas.microsoft.com/office/drawing/2010/main">
+                <a:solidFill>
+                  <a:srgbClr val="FFFFFF"/>
+                </a:solidFill>
+              </a14:hiddenFill>
+            </a:ext>
+          </a:extLst>
+        </p:spPr>
+      </p:pic>
+      <p:pic>
+        <p:nvPicPr>
+          <p:cNvPr id="12" name="Picture 2" descr="Using Azure Search for vector search with Azure OpenAI and LangChain ·  Clemens Siebler's Blog">
+            <a:extLst>
+              <a:ext uri="{FF2B5EF4-FFF2-40B4-BE49-F238E27FC236}">
+                <a16:creationId xmlns:a16="http://schemas.microsoft.com/office/drawing/2014/main" id="{BAC03DD6-151C-2FFE-C191-BC3929DF4DC5}"/>
+              </a:ext>
+            </a:extLst>
+          </p:cNvPr>
+          <p:cNvPicPr>
+            <a:picLocks noChangeAspect="1" noChangeArrowheads="1"/>
+          </p:cNvPicPr>
+          <p:nvPr/>
+        </p:nvPicPr>
+        <p:blipFill rotWithShape="1">
+          <a:blip r:embed="rId3">
+            <a:clrChange>
+              <a:clrFrom>
+                <a:srgbClr val="FFFFFF"/>
+              </a:clrFrom>
+              <a:clrTo>
+                <a:srgbClr val="FFFFFF">
+                  <a:alpha val="0"/>
+                </a:srgbClr>
+              </a:clrTo>
+            </a:clrChange>
+            <a:extLst>
+              <a:ext uri="{28A0092B-C50C-407E-A947-70E740481C1C}">
+                <a14:useLocalDpi xmlns:a14="http://schemas.microsoft.com/office/drawing/2010/main"/>
+              </a:ext>
+            </a:extLst>
+          </a:blip>
+          <a:srcRect/>
+          <a:stretch/>
+        </p:blipFill>
+        <p:spPr bwMode="auto">
+          <a:xfrm>
+            <a:off x="10209222" y="1394411"/>
+            <a:ext cx="647531" cy="489772"/>
+          </a:xfrm>
+          <a:prstGeom prst="rect">
+            <a:avLst/>
+          </a:prstGeom>
+          <a:noFill/>
+          <a:extLst>
+            <a:ext uri="{909E8E84-426E-40DD-AFC4-6F175D3DCCD1}">
+              <a14:hiddenFill xmlns:a14="http://schemas.microsoft.com/office/drawing/2010/main">
+                <a:solidFill>
+                  <a:srgbClr val="FFFFFF"/>
+                </a:solidFill>
+              </a14:hiddenFill>
+            </a:ext>
+          </a:extLst>
+        </p:spPr>
+      </p:pic>
+      <p:sp>
+        <p:nvSpPr>
+          <p:cNvPr id="13" name="テキスト ボックス 12">
+            <a:extLst>
+              <a:ext uri="{FF2B5EF4-FFF2-40B4-BE49-F238E27FC236}">
+                <a16:creationId xmlns:a16="http://schemas.microsoft.com/office/drawing/2014/main" id="{3B7B740E-AFD0-3F40-D815-51F2167C6B71}"/>
+              </a:ext>
+            </a:extLst>
+          </p:cNvPr>
+          <p:cNvSpPr txBox="1"/>
+          <p:nvPr/>
+        </p:nvSpPr>
+        <p:spPr>
+          <a:xfrm>
+            <a:off x="10856753" y="1417867"/>
+            <a:ext cx="886781" cy="369332"/>
+          </a:xfrm>
+          <a:prstGeom prst="rect">
+            <a:avLst/>
+          </a:prstGeom>
+          <a:noFill/>
+        </p:spPr>
+        <p:txBody>
+          <a:bodyPr wrap="none" rtlCol="0">
+            <a:spAutoFit/>
+          </a:bodyPr>
+          <a:lstStyle/>
+          <a:p>
+            <a:r>
+              <a:rPr lang="en-US" altLang="ja-JP" dirty="0"/>
+              <a:t>g</a:t>
+            </a:r>
+            <a:r>
+              <a:rPr kumimoji="1" lang="en-US" altLang="ja-JP" dirty="0"/>
+              <a:t>pt-4o</a:t>
+            </a:r>
+            <a:endParaRPr kumimoji="1" lang="ja-JP" altLang="en-US" dirty="0"/>
+          </a:p>
+        </p:txBody>
+      </p:sp>
+      <p:cxnSp>
+        <p:nvCxnSpPr>
+          <p:cNvPr id="14" name="直線矢印コネクタ 13">
+            <a:extLst>
+              <a:ext uri="{FF2B5EF4-FFF2-40B4-BE49-F238E27FC236}">
+                <a16:creationId xmlns:a16="http://schemas.microsoft.com/office/drawing/2014/main" id="{555A828E-5936-FD0E-4947-AFD4B74BAB75}"/>
+              </a:ext>
+            </a:extLst>
+          </p:cNvPr>
+          <p:cNvCxnSpPr>
+            <a:cxnSpLocks/>
+          </p:cNvCxnSpPr>
+          <p:nvPr/>
+        </p:nvCxnSpPr>
+        <p:spPr>
+          <a:xfrm flipV="1">
+            <a:off x="9204349" y="1789036"/>
+            <a:ext cx="921326" cy="190294"/>
+          </a:xfrm>
+          <a:prstGeom prst="straightConnector1">
+            <a:avLst/>
+          </a:prstGeom>
+          <a:ln w="28575">
+            <a:solidFill>
+              <a:schemeClr val="accent1"/>
+            </a:solidFill>
+            <a:prstDash val="dash"/>
+            <a:headEnd type="none" w="med" len="med"/>
+            <a:tailEnd type="arrow" w="med" len="med"/>
+          </a:ln>
+        </p:spPr>
+        <p:style>
+          <a:lnRef idx="1">
+            <a:schemeClr val="accent1"/>
+          </a:lnRef>
+          <a:fillRef idx="0">
+            <a:schemeClr val="accent1"/>
+          </a:fillRef>
+          <a:effectRef idx="0">
+            <a:schemeClr val="accent1"/>
+          </a:effectRef>
+          <a:fontRef idx="minor">
+            <a:schemeClr val="tx1"/>
+          </a:fontRef>
+        </p:style>
+      </p:cxnSp>
+      <p:pic>
+        <p:nvPicPr>
+          <p:cNvPr id="17" name="Graphic 54" descr="ソリッドフィル付きロボット">
+            <a:extLst>
+              <a:ext uri="{FF2B5EF4-FFF2-40B4-BE49-F238E27FC236}">
+                <a16:creationId xmlns:a16="http://schemas.microsoft.com/office/drawing/2014/main" id="{C3BCA0F3-5CED-4055-4575-EB5E37C08813}"/>
+              </a:ext>
+            </a:extLst>
+          </p:cNvPr>
+          <p:cNvPicPr>
+            <a:picLocks noChangeAspect="1"/>
+          </p:cNvPicPr>
+          <p:nvPr/>
+        </p:nvPicPr>
+        <p:blipFill>
+          <a:blip r:embed="rId8">
+            <a:extLst>
+              <a:ext uri="{96DAC541-7B7A-43D3-8B79-37D633B846F1}">
+                <asvg:svgBlip xmlns:asvg="http://schemas.microsoft.com/office/drawing/2016/SVG/main" r:embed="rId9"/>
+              </a:ext>
+            </a:extLst>
+          </a:blip>
+          <a:stretch>
+            <a:fillRect/>
+          </a:stretch>
+        </p:blipFill>
+        <p:spPr>
+          <a:xfrm>
+            <a:off x="7844937" y="1729577"/>
+            <a:ext cx="718873" cy="718873"/>
+          </a:xfrm>
+          <a:prstGeom prst="rect">
+            <a:avLst/>
+          </a:prstGeom>
+        </p:spPr>
+      </p:pic>
+      <p:cxnSp>
+        <p:nvCxnSpPr>
+          <p:cNvPr id="21" name="直線矢印コネクタ 20">
+            <a:extLst>
+              <a:ext uri="{FF2B5EF4-FFF2-40B4-BE49-F238E27FC236}">
+                <a16:creationId xmlns:a16="http://schemas.microsoft.com/office/drawing/2014/main" id="{5AA7A1FA-B88C-1A36-6811-51AEA394B164}"/>
+              </a:ext>
+            </a:extLst>
+          </p:cNvPr>
+          <p:cNvCxnSpPr>
+            <a:cxnSpLocks/>
+          </p:cNvCxnSpPr>
+          <p:nvPr/>
+        </p:nvCxnSpPr>
+        <p:spPr>
+          <a:xfrm>
+            <a:off x="9211921" y="2098101"/>
+            <a:ext cx="921326" cy="190294"/>
+          </a:xfrm>
+          <a:prstGeom prst="straightConnector1">
+            <a:avLst/>
+          </a:prstGeom>
+          <a:ln w="28575">
+            <a:solidFill>
+              <a:schemeClr val="accent1"/>
+            </a:solidFill>
+            <a:prstDash val="dash"/>
+            <a:headEnd type="none" w="med" len="med"/>
+            <a:tailEnd type="arrow" w="med" len="med"/>
+          </a:ln>
+        </p:spPr>
+        <p:style>
+          <a:lnRef idx="1">
+            <a:schemeClr val="accent1"/>
+          </a:lnRef>
+          <a:fillRef idx="0">
+            <a:schemeClr val="accent1"/>
+          </a:fillRef>
+          <a:effectRef idx="0">
+            <a:schemeClr val="accent1"/>
+          </a:effectRef>
+          <a:fontRef idx="minor">
+            <a:schemeClr val="tx1"/>
+          </a:fontRef>
+        </p:style>
+      </p:cxnSp>
+      <p:cxnSp>
+        <p:nvCxnSpPr>
+          <p:cNvPr id="23" name="直線矢印コネクタ 22">
+            <a:extLst>
+              <a:ext uri="{FF2B5EF4-FFF2-40B4-BE49-F238E27FC236}">
+                <a16:creationId xmlns:a16="http://schemas.microsoft.com/office/drawing/2014/main" id="{E5ABE927-8034-612D-49AA-8E9C3760D483}"/>
+              </a:ext>
+            </a:extLst>
+          </p:cNvPr>
+          <p:cNvCxnSpPr>
+            <a:cxnSpLocks/>
+          </p:cNvCxnSpPr>
+          <p:nvPr/>
+        </p:nvCxnSpPr>
+        <p:spPr>
+          <a:xfrm>
+            <a:off x="6139941" y="2119405"/>
+            <a:ext cx="1827992" cy="0"/>
+          </a:xfrm>
+          <a:prstGeom prst="straightConnector1">
+            <a:avLst/>
+          </a:prstGeom>
+          <a:ln w="28575">
+            <a:solidFill>
+              <a:schemeClr val="accent1"/>
+            </a:solidFill>
+            <a:headEnd type="none" w="med" len="med"/>
+            <a:tailEnd type="arrow" w="med" len="med"/>
+          </a:ln>
+        </p:spPr>
+        <p:style>
+          <a:lnRef idx="1">
+            <a:schemeClr val="accent1"/>
+          </a:lnRef>
+          <a:fillRef idx="0">
+            <a:schemeClr val="accent1"/>
+          </a:fillRef>
+          <a:effectRef idx="0">
+            <a:schemeClr val="accent1"/>
+          </a:effectRef>
+          <a:fontRef idx="minor">
+            <a:schemeClr val="tx1"/>
+          </a:fontRef>
+        </p:style>
+      </p:cxnSp>
+      <p:pic>
+        <p:nvPicPr>
+          <p:cNvPr id="28" name="図 27">
+            <a:extLst>
+              <a:ext uri="{FF2B5EF4-FFF2-40B4-BE49-F238E27FC236}">
+                <a16:creationId xmlns:a16="http://schemas.microsoft.com/office/drawing/2014/main" id="{2030C7F4-C6C9-2DCF-2440-9F81BB40E15B}"/>
+              </a:ext>
+            </a:extLst>
+          </p:cNvPr>
+          <p:cNvPicPr>
+            <a:picLocks noChangeAspect="1"/>
+          </p:cNvPicPr>
+          <p:nvPr/>
+        </p:nvPicPr>
+        <p:blipFill>
+          <a:blip r:embed="rId6">
+            <a:extLst>
+              <a:ext uri="{28A0092B-C50C-407E-A947-70E740481C1C}">
+                <a14:useLocalDpi xmlns:a14="http://schemas.microsoft.com/office/drawing/2010/main" val="0"/>
+              </a:ext>
+            </a:extLst>
+          </a:blip>
+          <a:stretch>
+            <a:fillRect/>
+          </a:stretch>
+        </p:blipFill>
+        <p:spPr>
+          <a:xfrm>
+            <a:off x="6845016" y="1729577"/>
+            <a:ext cx="644868" cy="644868"/>
+          </a:xfrm>
+          <a:prstGeom prst="rect">
+            <a:avLst/>
+          </a:prstGeom>
+        </p:spPr>
+      </p:pic>
+      <p:pic>
+        <p:nvPicPr>
+          <p:cNvPr id="29" name="Graphic 54" descr="ソリッドフィル付きロボット">
+            <a:extLst>
+              <a:ext uri="{FF2B5EF4-FFF2-40B4-BE49-F238E27FC236}">
+                <a16:creationId xmlns:a16="http://schemas.microsoft.com/office/drawing/2014/main" id="{3E2879F2-F622-C1E9-6AC2-AEC6FB493367}"/>
+              </a:ext>
+            </a:extLst>
+          </p:cNvPr>
+          <p:cNvPicPr>
+            <a:picLocks noChangeAspect="1"/>
+          </p:cNvPicPr>
+          <p:nvPr/>
+        </p:nvPicPr>
+        <p:blipFill>
+          <a:blip r:embed="rId10">
+            <a:extLst>
+              <a:ext uri="{96DAC541-7B7A-43D3-8B79-37D633B846F1}">
+                <asvg:svgBlip xmlns:asvg="http://schemas.microsoft.com/office/drawing/2016/SVG/main" r:embed="rId11"/>
+              </a:ext>
+            </a:extLst>
+          </a:blip>
+          <a:stretch>
+            <a:fillRect/>
+          </a:stretch>
+        </p:blipFill>
+        <p:spPr>
+          <a:xfrm>
+            <a:off x="4495315" y="2023233"/>
+            <a:ext cx="718873" cy="718873"/>
+          </a:xfrm>
+          <a:prstGeom prst="rect">
+            <a:avLst/>
+          </a:prstGeom>
+        </p:spPr>
+      </p:pic>
+    </p:spTree>
+    <p:extLst>
+      <p:ext uri="{BB962C8B-B14F-4D97-AF65-F5344CB8AC3E}">
+        <p14:creationId xmlns:p14="http://schemas.microsoft.com/office/powerpoint/2010/main" val="3872464963"/>
       </p:ext>
     </p:extLst>
   </p:cSld>

</xml_diff>